<commit_message>
Add GitHub Actions workflow and update code analysis examples
- Add Laravel CI workflow with comprehensive checks
- Update CodeAnalysisController with improvements
- Add Larastan detection analysis documentation
- Update Node.js dashboard and app components
- Add production bugs test file
- Update sharing session materials

🤖 Generated with [Claude Code](https://claude.ai/code)

Co-Authored-By: Claude <noreply@anthropic.com>
</commit_message>
<xml_diff>
--- a/slides/JNO - Sharing Session Code Analysis.pptx
+++ b/slides/JNO - Sharing Session Code Analysis.pptx
@@ -3976,8 +3976,8 @@
         </p:nvSpPr>
         <p:spPr>
           <a:xfrm>
-            <a:off x="666069" y="1837140"/>
-            <a:ext cx="11283193" cy="2862322"/>
+            <a:off x="3098798" y="1456139"/>
+            <a:ext cx="6706999" cy="3139321"/>
           </a:xfrm>
           <a:prstGeom prst="rect">
             <a:avLst/>
@@ -4087,17 +4087,15 @@
             <a:pPr algn="ctr"/>
             <a:r>
               <a:rPr lang="en-US" sz="6600" dirty="0"/>
-              <a:t>CODE ANALYSIS PROJECT</a:t>
-            </a:r>
-            <a:br>
+              <a:t>Code Quality </a:t>
+            </a:r>
+            <a:r>
+              <a:rPr lang="en-US" sz="6600" dirty="0" err="1"/>
+              <a:t>dengan</a:t>
+            </a:r>
+            <a:r>
               <a:rPr lang="en-US" sz="6600" dirty="0"/>
-            </a:br>
-            <a:br>
-              <a:rPr lang="en-US" sz="6600" dirty="0"/>
-            </a:br>
-            <a:r>
-              <a:rPr lang="en-US" sz="4800" dirty="0"/>
-              <a:t>Julio Notodiprodyo</a:t>
+              <a:t> Laravel &amp; Node.js</a:t>
             </a:r>
             <a:endParaRPr lang="en-ID" sz="4800" dirty="0"/>
           </a:p>
@@ -4116,6 +4114,138 @@
   <p:transition spd="slow">
     <p:push dir="u"/>
   </p:transition>
+  <p:timing>
+    <p:tnLst>
+      <p:par>
+        <p:cTn id="1" dur="indefinite" restart="never" nodeType="tmRoot">
+          <p:childTnLst>
+            <p:seq concurrent="1" nextAc="seek">
+              <p:cTn id="2" dur="indefinite" nodeType="mainSeq">
+                <p:childTnLst>
+                  <p:par>
+                    <p:cTn id="3" fill="hold">
+                      <p:stCondLst>
+                        <p:cond delay="indefinite"/>
+                      </p:stCondLst>
+                      <p:childTnLst>
+                        <p:par>
+                          <p:cTn id="4" fill="hold">
+                            <p:stCondLst>
+                              <p:cond delay="0"/>
+                            </p:stCondLst>
+                            <p:childTnLst>
+                              <p:par>
+                                <p:cTn id="5" presetID="42" presetClass="entr" presetSubtype="0" fill="hold" grpId="0" nodeType="clickEffect">
+                                  <p:stCondLst>
+                                    <p:cond delay="0"/>
+                                  </p:stCondLst>
+                                  <p:childTnLst>
+                                    <p:set>
+                                      <p:cBhvr>
+                                        <p:cTn id="6" dur="1" fill="hold">
+                                          <p:stCondLst>
+                                            <p:cond delay="0"/>
+                                          </p:stCondLst>
+                                        </p:cTn>
+                                        <p:tgtEl>
+                                          <p:spTgt spid="3"/>
+                                        </p:tgtEl>
+                                        <p:attrNameLst>
+                                          <p:attrName>style.visibility</p:attrName>
+                                        </p:attrNameLst>
+                                      </p:cBhvr>
+                                      <p:to>
+                                        <p:strVal val="visible"/>
+                                      </p:to>
+                                    </p:set>
+                                    <p:animEffect transition="in" filter="fade">
+                                      <p:cBhvr>
+                                        <p:cTn id="7" dur="1000"/>
+                                        <p:tgtEl>
+                                          <p:spTgt spid="3"/>
+                                        </p:tgtEl>
+                                      </p:cBhvr>
+                                    </p:animEffect>
+                                    <p:anim calcmode="lin" valueType="num">
+                                      <p:cBhvr>
+                                        <p:cTn id="8" dur="1000" fill="hold"/>
+                                        <p:tgtEl>
+                                          <p:spTgt spid="3"/>
+                                        </p:tgtEl>
+                                        <p:attrNameLst>
+                                          <p:attrName>ppt_x</p:attrName>
+                                        </p:attrNameLst>
+                                      </p:cBhvr>
+                                      <p:tavLst>
+                                        <p:tav tm="0">
+                                          <p:val>
+                                            <p:strVal val="#ppt_x"/>
+                                          </p:val>
+                                        </p:tav>
+                                        <p:tav tm="100000">
+                                          <p:val>
+                                            <p:strVal val="#ppt_x"/>
+                                          </p:val>
+                                        </p:tav>
+                                      </p:tavLst>
+                                    </p:anim>
+                                    <p:anim calcmode="lin" valueType="num">
+                                      <p:cBhvr>
+                                        <p:cTn id="9" dur="1000" fill="hold"/>
+                                        <p:tgtEl>
+                                          <p:spTgt spid="3"/>
+                                        </p:tgtEl>
+                                        <p:attrNameLst>
+                                          <p:attrName>ppt_y</p:attrName>
+                                        </p:attrNameLst>
+                                      </p:cBhvr>
+                                      <p:tavLst>
+                                        <p:tav tm="0">
+                                          <p:val>
+                                            <p:strVal val="#ppt_y+.1"/>
+                                          </p:val>
+                                        </p:tav>
+                                        <p:tav tm="100000">
+                                          <p:val>
+                                            <p:strVal val="#ppt_y"/>
+                                          </p:val>
+                                        </p:tav>
+                                      </p:tavLst>
+                                    </p:anim>
+                                  </p:childTnLst>
+                                </p:cTn>
+                              </p:par>
+                            </p:childTnLst>
+                          </p:cTn>
+                        </p:par>
+                      </p:childTnLst>
+                    </p:cTn>
+                  </p:par>
+                </p:childTnLst>
+              </p:cTn>
+              <p:prevCondLst>
+                <p:cond evt="onPrev" delay="0">
+                  <p:tgtEl>
+                    <p:sldTgt/>
+                  </p:tgtEl>
+                </p:cond>
+              </p:prevCondLst>
+              <p:nextCondLst>
+                <p:cond evt="onNext" delay="0">
+                  <p:tgtEl>
+                    <p:sldTgt/>
+                  </p:tgtEl>
+                </p:cond>
+              </p:nextCondLst>
+            </p:seq>
+          </p:childTnLst>
+        </p:cTn>
+      </p:par>
+    </p:tnLst>
+    <p:bldLst>
+      <p:bldP spid="3" grpId="0"/>
+    </p:bldLst>
+  </p:timing>
 </p:sld>
 </file>
 
@@ -4233,10 +4363,9 @@
           <a:lstStyle/>
           <a:p>
             <a:r>
-              <a:rPr lang="en-US"/>
-              <a:t>Gimana Sih Cara Bikin Code Quality yang Bagus? 🚀</a:t>
-            </a:r>
-            <a:endParaRPr lang="en-US" dirty="0"/>
+              <a:rPr lang="en-US" dirty="0"/>
+              <a:t>📋 Agenda</a:t>
+            </a:r>
           </a:p>
         </p:txBody>
       </p:sp>
@@ -4254,8 +4383,8 @@
         </p:nvSpPr>
         <p:spPr>
           <a:xfrm>
-            <a:off x="838200" y="2505670"/>
-            <a:ext cx="4292600" cy="923330"/>
+            <a:off x="838200" y="2319403"/>
+            <a:ext cx="10329333" cy="1754326"/>
           </a:xfrm>
           <a:prstGeom prst="rect">
             <a:avLst/>
@@ -4269,22 +4398,71 @@
           <a:lstStyle/>
           <a:p>
             <a:r>
-              <a:rPr lang="en-US"/>
-              <a:t>- Kenapa code quality penting?</a:t>
-            </a:r>
-          </a:p>
-          <a:p>
-            <a:r>
-              <a:rPr lang="en-US"/>
-              <a:t>- Tool apa aja yang bisa kita pakai?</a:t>
-            </a:r>
-          </a:p>
-          <a:p>
-            <a:r>
-              <a:rPr lang="en-US"/>
-              <a:t>- Demo real project yang udah jalan</a:t>
-            </a:r>
-            <a:endParaRPr lang="en-US" dirty="0"/>
+              <a:rPr lang="en-US" dirty="0"/>
+              <a:t>1. Problem Statement - </a:t>
+            </a:r>
+            <a:r>
+              <a:rPr lang="en-US" dirty="0" err="1"/>
+              <a:t>Masalah</a:t>
+            </a:r>
+            <a:r>
+              <a:rPr lang="en-US" dirty="0"/>
+              <a:t> code quality di </a:t>
+            </a:r>
+            <a:r>
+              <a:rPr lang="en-US" dirty="0" err="1"/>
+              <a:t>tim</a:t>
+            </a:r>
+            <a:r>
+              <a:rPr lang="en-US" dirty="0"/>
+              <a:t> development</a:t>
+            </a:r>
+          </a:p>
+          <a:p>
+            <a:r>
+              <a:rPr lang="en-US" dirty="0"/>
+              <a:t>2. Solution Overview - Automated code analysis pipeline</a:t>
+            </a:r>
+          </a:p>
+          <a:p>
+            <a:r>
+              <a:rPr lang="en-US" dirty="0"/>
+              <a:t>3. Tools &amp; Implementation - </a:t>
+            </a:r>
+            <a:r>
+              <a:rPr lang="en-US" dirty="0" err="1"/>
+              <a:t>PHPStan</a:t>
+            </a:r>
+            <a:r>
+              <a:rPr lang="en-US" dirty="0"/>
+              <a:t>, Laravel Pint, </a:t>
+            </a:r>
+            <a:r>
+              <a:rPr lang="en-US" dirty="0" err="1"/>
+              <a:t>ESLint</a:t>
+            </a:r>
+            <a:r>
+              <a:rPr lang="en-US" dirty="0"/>
+              <a:t>, Pre-commit hooks</a:t>
+            </a:r>
+          </a:p>
+          <a:p>
+            <a:r>
+              <a:rPr lang="en-US" dirty="0"/>
+              <a:t>4. Live Demo - Real bug detection dan fixing</a:t>
+            </a:r>
+          </a:p>
+          <a:p>
+            <a:r>
+              <a:rPr lang="en-US" dirty="0"/>
+              <a:t>5. Practical Setup - Cara implement di project kalian</a:t>
+            </a:r>
+          </a:p>
+          <a:p>
+            <a:r>
+              <a:rPr lang="en-US" dirty="0"/>
+              <a:t>6. Q&amp;A &amp; Best Practices</a:t>
+            </a:r>
           </a:p>
         </p:txBody>
       </p:sp>
@@ -4298,6 +4476,192 @@
   <p:clrMapOvr>
     <a:masterClrMapping/>
   </p:clrMapOvr>
+  <p:timing>
+    <p:tnLst>
+      <p:par>
+        <p:cTn id="1" dur="indefinite" restart="never" nodeType="tmRoot">
+          <p:childTnLst>
+            <p:seq concurrent="1" nextAc="seek">
+              <p:cTn id="2" dur="indefinite" nodeType="mainSeq">
+                <p:childTnLst>
+                  <p:par>
+                    <p:cTn id="3" fill="hold">
+                      <p:stCondLst>
+                        <p:cond delay="indefinite"/>
+                      </p:stCondLst>
+                      <p:childTnLst>
+                        <p:par>
+                          <p:cTn id="4" fill="hold">
+                            <p:stCondLst>
+                              <p:cond delay="0"/>
+                            </p:stCondLst>
+                            <p:childTnLst>
+                              <p:par>
+                                <p:cTn id="5" presetID="16" presetClass="entr" presetSubtype="21" fill="hold" grpId="0" nodeType="clickEffect">
+                                  <p:stCondLst>
+                                    <p:cond delay="0"/>
+                                  </p:stCondLst>
+                                  <p:childTnLst>
+                                    <p:set>
+                                      <p:cBhvr>
+                                        <p:cTn id="6" dur="1" fill="hold">
+                                          <p:stCondLst>
+                                            <p:cond delay="0"/>
+                                          </p:stCondLst>
+                                        </p:cTn>
+                                        <p:tgtEl>
+                                          <p:spTgt spid="2"/>
+                                        </p:tgtEl>
+                                        <p:attrNameLst>
+                                          <p:attrName>style.visibility</p:attrName>
+                                        </p:attrNameLst>
+                                      </p:cBhvr>
+                                      <p:to>
+                                        <p:strVal val="visible"/>
+                                      </p:to>
+                                    </p:set>
+                                    <p:animEffect transition="in" filter="barn(inVertical)">
+                                      <p:cBhvr>
+                                        <p:cTn id="7" dur="500"/>
+                                        <p:tgtEl>
+                                          <p:spTgt spid="2"/>
+                                        </p:tgtEl>
+                                      </p:cBhvr>
+                                    </p:animEffect>
+                                  </p:childTnLst>
+                                </p:cTn>
+                              </p:par>
+                            </p:childTnLst>
+                          </p:cTn>
+                        </p:par>
+                      </p:childTnLst>
+                    </p:cTn>
+                  </p:par>
+                  <p:par>
+                    <p:cTn id="8" fill="hold">
+                      <p:stCondLst>
+                        <p:cond delay="indefinite"/>
+                      </p:stCondLst>
+                      <p:childTnLst>
+                        <p:par>
+                          <p:cTn id="9" fill="hold">
+                            <p:stCondLst>
+                              <p:cond delay="0"/>
+                            </p:stCondLst>
+                            <p:childTnLst>
+                              <p:par>
+                                <p:cTn id="10" presetID="53" presetClass="entr" presetSubtype="16" fill="hold" grpId="0" nodeType="clickEffect">
+                                  <p:stCondLst>
+                                    <p:cond delay="0"/>
+                                  </p:stCondLst>
+                                  <p:childTnLst>
+                                    <p:set>
+                                      <p:cBhvr>
+                                        <p:cTn id="11" dur="1" fill="hold">
+                                          <p:stCondLst>
+                                            <p:cond delay="0"/>
+                                          </p:stCondLst>
+                                        </p:cTn>
+                                        <p:tgtEl>
+                                          <p:spTgt spid="4"/>
+                                        </p:tgtEl>
+                                        <p:attrNameLst>
+                                          <p:attrName>style.visibility</p:attrName>
+                                        </p:attrNameLst>
+                                      </p:cBhvr>
+                                      <p:to>
+                                        <p:strVal val="visible"/>
+                                      </p:to>
+                                    </p:set>
+                                    <p:anim calcmode="lin" valueType="num">
+                                      <p:cBhvr>
+                                        <p:cTn id="12" dur="500" fill="hold"/>
+                                        <p:tgtEl>
+                                          <p:spTgt spid="4"/>
+                                        </p:tgtEl>
+                                        <p:attrNameLst>
+                                          <p:attrName>ppt_w</p:attrName>
+                                        </p:attrNameLst>
+                                      </p:cBhvr>
+                                      <p:tavLst>
+                                        <p:tav tm="0">
+                                          <p:val>
+                                            <p:fltVal val="0"/>
+                                          </p:val>
+                                        </p:tav>
+                                        <p:tav tm="100000">
+                                          <p:val>
+                                            <p:strVal val="#ppt_w"/>
+                                          </p:val>
+                                        </p:tav>
+                                      </p:tavLst>
+                                    </p:anim>
+                                    <p:anim calcmode="lin" valueType="num">
+                                      <p:cBhvr>
+                                        <p:cTn id="13" dur="500" fill="hold"/>
+                                        <p:tgtEl>
+                                          <p:spTgt spid="4"/>
+                                        </p:tgtEl>
+                                        <p:attrNameLst>
+                                          <p:attrName>ppt_h</p:attrName>
+                                        </p:attrNameLst>
+                                      </p:cBhvr>
+                                      <p:tavLst>
+                                        <p:tav tm="0">
+                                          <p:val>
+                                            <p:fltVal val="0"/>
+                                          </p:val>
+                                        </p:tav>
+                                        <p:tav tm="100000">
+                                          <p:val>
+                                            <p:strVal val="#ppt_h"/>
+                                          </p:val>
+                                        </p:tav>
+                                      </p:tavLst>
+                                    </p:anim>
+                                    <p:animEffect transition="in" filter="fade">
+                                      <p:cBhvr>
+                                        <p:cTn id="14" dur="500"/>
+                                        <p:tgtEl>
+                                          <p:spTgt spid="4"/>
+                                        </p:tgtEl>
+                                      </p:cBhvr>
+                                    </p:animEffect>
+                                  </p:childTnLst>
+                                </p:cTn>
+                              </p:par>
+                            </p:childTnLst>
+                          </p:cTn>
+                        </p:par>
+                      </p:childTnLst>
+                    </p:cTn>
+                  </p:par>
+                </p:childTnLst>
+              </p:cTn>
+              <p:prevCondLst>
+                <p:cond evt="onPrev" delay="0">
+                  <p:tgtEl>
+                    <p:sldTgt/>
+                  </p:tgtEl>
+                </p:cond>
+              </p:prevCondLst>
+              <p:nextCondLst>
+                <p:cond evt="onNext" delay="0">
+                  <p:tgtEl>
+                    <p:sldTgt/>
+                  </p:tgtEl>
+                </p:cond>
+              </p:nextCondLst>
+            </p:seq>
+          </p:childTnLst>
+        </p:cTn>
+      </p:par>
+    </p:tnLst>
+    <p:bldLst>
+      <p:bldP spid="2" grpId="0"/>
+      <p:bldP spid="4" grpId="0"/>
+    </p:bldLst>
+  </p:timing>
 </p:sld>
 </file>
 
@@ -4340,18 +4704,9 @@
           <a:lstStyle/>
           <a:p>
             <a:r>
-              <a:rPr lang="en-US" dirty="0" err="1"/>
-              <a:t>Masalah</a:t>
-            </a:r>
-            <a:r>
-              <a:rPr lang="en-US" dirty="0"/>
-              <a:t> yang Sering Kita </a:t>
-            </a:r>
-            <a:r>
-              <a:rPr lang="en-US" dirty="0" err="1"/>
-              <a:t>Hadapi</a:t>
-            </a:r>
-            <a:endParaRPr lang="en-US" dirty="0"/>
+              <a:rPr lang="en-US" dirty="0"/>
+              <a:t>🎯 1. Problem Statement</a:t>
+            </a:r>
           </a:p>
         </p:txBody>
       </p:sp>
@@ -4374,67 +4729,34 @@
         <p:spPr>
           <a:xfrm>
             <a:off x="838200" y="1825624"/>
-            <a:ext cx="5029202" cy="3482975"/>
+            <a:ext cx="3191933" cy="3482975"/>
           </a:xfrm>
         </p:spPr>
         <p:txBody>
           <a:bodyPr>
-            <a:normAutofit fontScale="62500" lnSpcReduction="20000"/>
+            <a:normAutofit fontScale="77500" lnSpcReduction="20000"/>
           </a:bodyPr>
           <a:lstStyle/>
           <a:p>
-            <a:pPr marL="0" indent="0">
-              <a:buNone/>
-            </a:pPr>
-            <a:r>
-              <a:rPr lang="en-US" dirty="0"/>
-              <a:t>❌ Code yang </a:t>
+            <a:r>
+              <a:rPr lang="en-US" dirty="0"/>
+              <a:t>❌ Code Quality Issues:</a:t>
+            </a:r>
+          </a:p>
+          <a:p>
+            <a:r>
+              <a:rPr lang="en-US" dirty="0"/>
+              <a:t>- Variable undefined yang crash production</a:t>
+            </a:r>
+          </a:p>
+          <a:p>
+            <a:r>
+              <a:rPr lang="en-US" dirty="0"/>
+              <a:t>- Format code </a:t>
             </a:r>
             <a:r>
               <a:rPr lang="en-US" dirty="0" err="1"/>
-              <a:t>berantakan</a:t>
-            </a:r>
-            <a:r>
-              <a:rPr lang="en-US" dirty="0"/>
-              <a:t>:</a:t>
-            </a:r>
-          </a:p>
-          <a:p>
-            <a:pPr marL="0" indent="0">
-              <a:buNone/>
-            </a:pPr>
-            <a:r>
-              <a:rPr lang="en-US" dirty="0"/>
-              <a:t>- Variable undefined yang </a:t>
-            </a:r>
-            <a:r>
-              <a:rPr lang="en-US" dirty="0" err="1"/>
-              <a:t>bikin</a:t>
-            </a:r>
-            <a:r>
-              <a:rPr lang="en-US" dirty="0"/>
-              <a:t> </a:t>
-            </a:r>
-            <a:r>
-              <a:rPr lang="en-US" dirty="0" err="1"/>
-              <a:t>aplikasi</a:t>
-            </a:r>
-            <a:r>
-              <a:rPr lang="en-US" dirty="0"/>
-              <a:t> crash</a:t>
-            </a:r>
-          </a:p>
-          <a:p>
-            <a:pPr marL="0" indent="0">
-              <a:buNone/>
-            </a:pPr>
-            <a:r>
-              <a:rPr lang="en-US" dirty="0"/>
-              <a:t>- Format code yang </a:t>
-            </a:r>
-            <a:r>
-              <a:rPr lang="en-US" dirty="0" err="1"/>
-              <a:t>nggak</a:t>
+              <a:t>tidak</a:t>
             </a:r>
             <a:r>
               <a:rPr lang="en-US" dirty="0"/>
@@ -4454,16 +4776,13 @@
             </a:r>
             <a:r>
               <a:rPr lang="en-US" dirty="0"/>
-              <a:t> developer</a:t>
-            </a:r>
-          </a:p>
-          <a:p>
-            <a:pPr marL="0" indent="0">
-              <a:buNone/>
-            </a:pPr>
-            <a:r>
-              <a:rPr lang="en-US" dirty="0"/>
-              <a:t>- Bug yang </a:t>
+              <a:t> developer  </a:t>
+            </a:r>
+          </a:p>
+          <a:p>
+            <a:r>
+              <a:rPr lang="en-US" dirty="0"/>
+              <a:t>- Bug </a:t>
             </a:r>
             <a:r>
               <a:rPr lang="en-US" dirty="0" err="1"/>
@@ -4479,20 +4798,25 @@
             </a:r>
             <a:r>
               <a:rPr lang="en-US" dirty="0"/>
-              <a:t> pas production</a:t>
-            </a:r>
-          </a:p>
-          <a:p>
-            <a:pPr marL="0" indent="0">
-              <a:buNone/>
-            </a:pPr>
-            <a:r>
-              <a:rPr lang="en-US" dirty="0"/>
-              <a:t>- Code review yang lama </a:t>
+              <a:t> pas </a:t>
             </a:r>
             <a:r>
               <a:rPr lang="en-US" dirty="0" err="1"/>
-              <a:t>karena</a:t>
+              <a:t>sudah</a:t>
+            </a:r>
+            <a:r>
+              <a:rPr lang="en-US" dirty="0"/>
+              <a:t> production</a:t>
+            </a:r>
+          </a:p>
+          <a:p>
+            <a:r>
+              <a:rPr lang="en-US" dirty="0"/>
+              <a:t>- Type error yang </a:t>
+            </a:r>
+            <a:r>
+              <a:rPr lang="en-US" dirty="0" err="1"/>
+              <a:t>seharusnya</a:t>
             </a:r>
             <a:r>
               <a:rPr lang="en-US" dirty="0"/>
@@ -4500,7 +4824,7 @@
             </a:r>
             <a:r>
               <a:rPr lang="en-US" dirty="0" err="1"/>
-              <a:t>banyak</a:t>
+              <a:t>bisa</a:t>
             </a:r>
             <a:r>
               <a:rPr lang="en-US" dirty="0"/>
@@ -4508,111 +4832,18 @@
             </a:r>
             <a:r>
               <a:rPr lang="en-US" dirty="0" err="1"/>
-              <a:t>masalah</a:t>
-            </a:r>
-            <a:r>
-              <a:rPr lang="en-US" dirty="0"/>
-              <a:t> basic</a:t>
-            </a:r>
-          </a:p>
-          <a:p>
-            <a:pPr marL="0" indent="0">
-              <a:buNone/>
-            </a:pPr>
+              <a:t>dicegah</a:t>
+            </a:r>
             <a:endParaRPr lang="en-US" dirty="0"/>
-          </a:p>
-          <a:p>
-            <a:pPr marL="0" indent="0">
-              <a:buNone/>
-            </a:pPr>
-            <a:r>
-              <a:rPr lang="en-US" dirty="0"/>
-              <a:t>❌ Workflow development yang </a:t>
-            </a:r>
-            <a:r>
-              <a:rPr lang="en-US" dirty="0" err="1"/>
-              <a:t>nggak</a:t>
-            </a:r>
-            <a:r>
-              <a:rPr lang="en-US" dirty="0"/>
-              <a:t> </a:t>
-            </a:r>
-            <a:r>
-              <a:rPr lang="en-US" dirty="0" err="1"/>
-              <a:t>efisien</a:t>
-            </a:r>
-            <a:r>
-              <a:rPr lang="en-US" dirty="0"/>
-              <a:t>:</a:t>
-            </a:r>
-          </a:p>
-          <a:p>
-            <a:pPr marL="0" indent="0">
-              <a:buNone/>
-            </a:pPr>
-            <a:r>
-              <a:rPr lang="en-US" dirty="0"/>
-              <a:t>- Manual check code quality </a:t>
-            </a:r>
-            <a:r>
-              <a:rPr lang="en-US" dirty="0" err="1"/>
-              <a:t>sebelum</a:t>
-            </a:r>
-            <a:r>
-              <a:rPr lang="en-US" dirty="0"/>
-              <a:t> commit</a:t>
-            </a:r>
-          </a:p>
-          <a:p>
-            <a:pPr marL="0" indent="0">
-              <a:buNone/>
-            </a:pPr>
-            <a:r>
-              <a:rPr lang="en-US" dirty="0"/>
-              <a:t>- Lupa </a:t>
-            </a:r>
-            <a:r>
-              <a:rPr lang="en-US" dirty="0" err="1"/>
-              <a:t>jalanin</a:t>
-            </a:r>
-            <a:r>
-              <a:rPr lang="en-US" dirty="0"/>
-              <a:t> linter/formatter</a:t>
-            </a:r>
-          </a:p>
-          <a:p>
-            <a:pPr marL="0" indent="0">
-              <a:buNone/>
-            </a:pPr>
-            <a:r>
-              <a:rPr lang="en-US" dirty="0"/>
-              <a:t>- PR yang </a:t>
-            </a:r>
-            <a:r>
-              <a:rPr lang="en-US" dirty="0" err="1"/>
-              <a:t>ditolak</a:t>
-            </a:r>
-            <a:r>
-              <a:rPr lang="en-US" dirty="0"/>
-              <a:t> </a:t>
-            </a:r>
-            <a:r>
-              <a:rPr lang="en-US" dirty="0" err="1"/>
-              <a:t>karena</a:t>
-            </a:r>
-            <a:r>
-              <a:rPr lang="en-US" dirty="0"/>
-              <a:t> coding standard</a:t>
-            </a:r>
           </a:p>
         </p:txBody>
       </p:sp>
       <p:sp>
         <p:nvSpPr>
-          <p:cNvPr id="5" name="TextBox 4">
+          <p:cNvPr id="6" name="TextBox 5">
             <a:extLst>
               <a:ext uri="{FF2B5EF4-FFF2-40B4-BE49-F238E27FC236}">
-                <a16:creationId xmlns:a16="http://schemas.microsoft.com/office/drawing/2014/main" id="{3B037448-BA9F-9444-F56A-A8E50CF2799E}"/>
+                <a16:creationId xmlns:a16="http://schemas.microsoft.com/office/drawing/2014/main" id="{444E7ED8-1D7B-E7EE-7E94-DA494E2D689B}"/>
               </a:ext>
             </a:extLst>
           </p:cNvPr>
@@ -4621,8 +4852,8 @@
         </p:nvSpPr>
         <p:spPr>
           <a:xfrm>
-            <a:off x="6324600" y="2920780"/>
-            <a:ext cx="5308601" cy="646331"/>
+            <a:off x="4174067" y="1752306"/>
+            <a:ext cx="3564466" cy="2862322"/>
           </a:xfrm>
           <a:prstGeom prst="rect">
             <a:avLst/>
@@ -4637,11 +4868,53 @@
           <a:p>
             <a:r>
               <a:rPr lang="en-US" dirty="0"/>
-              <a:t>"</a:t>
+              <a:t>❌ Development Workflow:</a:t>
+            </a:r>
+          </a:p>
+          <a:p>
+            <a:r>
+              <a:rPr lang="en-US" dirty="0"/>
+              <a:t>- Manual code review yang lama dan </a:t>
             </a:r>
             <a:r>
               <a:rPr lang="en-US" dirty="0" err="1"/>
-              <a:t>Gimana</a:t>
+              <a:t>tidak</a:t>
+            </a:r>
+            <a:r>
+              <a:rPr lang="en-US" dirty="0"/>
+              <a:t> thorough</a:t>
+            </a:r>
+          </a:p>
+          <a:p>
+            <a:r>
+              <a:rPr lang="en-US" dirty="0"/>
+              <a:t>- Lupa </a:t>
+            </a:r>
+            <a:r>
+              <a:rPr lang="en-US" dirty="0" err="1"/>
+              <a:t>menjalankan</a:t>
+            </a:r>
+            <a:r>
+              <a:rPr lang="en-US" dirty="0"/>
+              <a:t> linter/formatter </a:t>
+            </a:r>
+            <a:r>
+              <a:rPr lang="en-US" dirty="0" err="1"/>
+              <a:t>sebelum</a:t>
+            </a:r>
+            <a:r>
+              <a:rPr lang="en-US" dirty="0"/>
+              <a:t> commit</a:t>
+            </a:r>
+          </a:p>
+          <a:p>
+            <a:r>
+              <a:rPr lang="en-US" dirty="0"/>
+              <a:t>- Pull Request </a:t>
+            </a:r>
+            <a:r>
+              <a:rPr lang="en-US" dirty="0" err="1"/>
+              <a:t>ditolak</a:t>
             </a:r>
             <a:r>
               <a:rPr lang="en-US" dirty="0"/>
@@ -4649,7 +4922,21 @@
             </a:r>
             <a:r>
               <a:rPr lang="en-US" dirty="0" err="1"/>
-              <a:t>caranya</a:t>
+              <a:t>karena</a:t>
+            </a:r>
+            <a:r>
+              <a:rPr lang="en-US" dirty="0"/>
+              <a:t> coding standard</a:t>
+            </a:r>
+          </a:p>
+          <a:p>
+            <a:r>
+              <a:rPr lang="en-US" dirty="0"/>
+              <a:t>- Debugging production issues yang </a:t>
+            </a:r>
+            <a:r>
+              <a:rPr lang="en-US" dirty="0" err="1"/>
+              <a:t>bisa</a:t>
             </a:r>
             <a:r>
               <a:rPr lang="en-US" dirty="0"/>
@@ -4657,20 +4944,115 @@
             </a:r>
             <a:r>
               <a:rPr lang="en-US" dirty="0" err="1"/>
-              <a:t>supaya</a:t>
-            </a:r>
-            <a:r>
-              <a:rPr lang="en-US" dirty="0"/>
-              <a:t> code </a:t>
+              <a:t>dicegah</a:t>
+            </a:r>
+            <a:endParaRPr lang="en-US" dirty="0"/>
+          </a:p>
+          <a:p>
+            <a:endParaRPr lang="en-US" dirty="0"/>
+          </a:p>
+        </p:txBody>
+      </p:sp>
+      <p:sp>
+        <p:nvSpPr>
+          <p:cNvPr id="8" name="TextBox 7">
+            <a:extLst>
+              <a:ext uri="{FF2B5EF4-FFF2-40B4-BE49-F238E27FC236}">
+                <a16:creationId xmlns:a16="http://schemas.microsoft.com/office/drawing/2014/main" id="{D2F2EE77-6609-9C73-A92B-4A9372D79616}"/>
+              </a:ext>
+            </a:extLst>
+          </p:cNvPr>
+          <p:cNvSpPr txBox="1"/>
+          <p:nvPr/>
+        </p:nvSpPr>
+        <p:spPr>
+          <a:xfrm>
+            <a:off x="7789334" y="1749661"/>
+            <a:ext cx="3564466" cy="2031325"/>
+          </a:xfrm>
+          <a:prstGeom prst="rect">
+            <a:avLst/>
+          </a:prstGeom>
+          <a:noFill/>
+        </p:spPr>
+        <p:txBody>
+          <a:bodyPr wrap="square">
+            <a:spAutoFit/>
+          </a:bodyPr>
+          <a:lstStyle/>
+          <a:p>
+            <a:r>
+              <a:rPr lang="en-US" dirty="0"/>
+              <a:t>Real Impact:</a:t>
+            </a:r>
+          </a:p>
+          <a:p>
+            <a:r>
+              <a:rPr lang="en-US" dirty="0"/>
+              <a:t>- 3-4 jam debugging issues yang </a:t>
             </a:r>
             <a:r>
               <a:rPr lang="en-US" dirty="0" err="1"/>
-              <a:t>kita</a:t>
-            </a:r>
-            <a:r>
-              <a:rPr lang="en-US" dirty="0"/>
-              <a:t> always clean and bug-free?"</a:t>
-            </a:r>
+              <a:t>seharusnya</a:t>
+            </a:r>
+            <a:r>
+              <a:rPr lang="en-US" dirty="0"/>
+              <a:t> </a:t>
+            </a:r>
+            <a:r>
+              <a:rPr lang="en-US" dirty="0" err="1"/>
+              <a:t>terdeteksi</a:t>
+            </a:r>
+            <a:r>
+              <a:rPr lang="en-US" dirty="0"/>
+              <a:t> </a:t>
+            </a:r>
+            <a:r>
+              <a:rPr lang="en-US" dirty="0" err="1"/>
+              <a:t>dini</a:t>
+            </a:r>
+            <a:endParaRPr lang="en-US" dirty="0"/>
+          </a:p>
+          <a:p>
+            <a:r>
+              <a:rPr lang="en-US" dirty="0"/>
+              <a:t>- 2-3 kali code review cycle </a:t>
+            </a:r>
+            <a:r>
+              <a:rPr lang="en-US" dirty="0" err="1"/>
+              <a:t>untuk</a:t>
+            </a:r>
+            <a:r>
+              <a:rPr lang="en-US" dirty="0"/>
+              <a:t> </a:t>
+            </a:r>
+            <a:r>
+              <a:rPr lang="en-US" dirty="0" err="1"/>
+              <a:t>masalah</a:t>
+            </a:r>
+            <a:r>
+              <a:rPr lang="en-US" dirty="0"/>
+              <a:t> basic</a:t>
+            </a:r>
+          </a:p>
+          <a:p>
+            <a:r>
+              <a:rPr lang="en-US" dirty="0"/>
+              <a:t>- Production hotfixes </a:t>
+            </a:r>
+            <a:r>
+              <a:rPr lang="en-US" dirty="0" err="1"/>
+              <a:t>untuk</a:t>
+            </a:r>
+            <a:r>
+              <a:rPr lang="en-US" dirty="0"/>
+              <a:t> bug </a:t>
+            </a:r>
+            <a:r>
+              <a:rPr lang="en-US" dirty="0" err="1"/>
+              <a:t>sederhana</a:t>
+            </a:r>
+            <a:endParaRPr lang="en-US" dirty="0"/>
           </a:p>
         </p:txBody>
       </p:sp>
@@ -4705,7 +5087,7 @@
                             </p:stCondLst>
                             <p:childTnLst>
                               <p:par>
-                                <p:cTn id="5" presetID="1" presetClass="entr" presetSubtype="0" fill="hold" grpId="0" nodeType="clickEffect">
+                                <p:cTn id="5" presetID="16" presetClass="entr" presetSubtype="21" fill="hold" grpId="0" nodeType="clickEffect">
                                   <p:stCondLst>
                                     <p:cond delay="0"/>
                                   </p:stCondLst>
@@ -4718,11 +5100,7 @@
                                           </p:stCondLst>
                                         </p:cTn>
                                         <p:tgtEl>
-                                          <p:spTgt spid="3">
-                                            <p:txEl>
-                                              <p:pRg st="0" end="0"/>
-                                            </p:txEl>
-                                          </p:spTgt>
+                                          <p:spTgt spid="2"/>
                                         </p:tgtEl>
                                         <p:attrNameLst>
                                           <p:attrName>style.visibility</p:attrName>
@@ -4732,6 +5110,14 @@
                                         <p:strVal val="visible"/>
                                       </p:to>
                                     </p:set>
+                                    <p:animEffect transition="in" filter="barn(inVertical)">
+                                      <p:cBhvr>
+                                        <p:cTn id="7" dur="500"/>
+                                        <p:tgtEl>
+                                          <p:spTgt spid="2"/>
+                                        </p:tgtEl>
+                                      </p:cBhvr>
+                                    </p:animEffect>
                                   </p:childTnLst>
                                 </p:cTn>
                               </p:par>
@@ -4742,26 +5128,26 @@
                     </p:cTn>
                   </p:par>
                   <p:par>
-                    <p:cTn id="7" fill="hold">
+                    <p:cTn id="8" fill="hold">
                       <p:stCondLst>
                         <p:cond delay="indefinite"/>
                       </p:stCondLst>
                       <p:childTnLst>
                         <p:par>
-                          <p:cTn id="8" fill="hold">
+                          <p:cTn id="9" fill="hold">
                             <p:stCondLst>
                               <p:cond delay="0"/>
                             </p:stCondLst>
                             <p:childTnLst>
                               <p:par>
-                                <p:cTn id="9" presetID="1" presetClass="entr" presetSubtype="0" fill="hold" grpId="0" nodeType="clickEffect">
+                                <p:cTn id="10" presetID="10" presetClass="entr" presetSubtype="0" fill="hold" grpId="0" nodeType="clickEffect">
                                   <p:stCondLst>
                                     <p:cond delay="0"/>
                                   </p:stCondLst>
                                   <p:childTnLst>
                                     <p:set>
                                       <p:cBhvr>
-                                        <p:cTn id="10" dur="1" fill="hold">
+                                        <p:cTn id="11" dur="1" fill="hold">
                                           <p:stCondLst>
                                             <p:cond delay="0"/>
                                           </p:stCondLst>
@@ -4769,7 +5155,7 @@
                                         <p:tgtEl>
                                           <p:spTgt spid="3">
                                             <p:txEl>
-                                              <p:pRg st="1" end="1"/>
+                                              <p:pRg st="0" end="0"/>
                                             </p:txEl>
                                           </p:spTgt>
                                         </p:tgtEl>
@@ -4781,6 +5167,18 @@
                                         <p:strVal val="visible"/>
                                       </p:to>
                                     </p:set>
+                                    <p:animEffect transition="in" filter="fade">
+                                      <p:cBhvr>
+                                        <p:cTn id="12" dur="500"/>
+                                        <p:tgtEl>
+                                          <p:spTgt spid="3">
+                                            <p:txEl>
+                                              <p:pRg st="0" end="0"/>
+                                            </p:txEl>
+                                          </p:spTgt>
+                                        </p:tgtEl>
+                                      </p:cBhvr>
+                                    </p:animEffect>
                                   </p:childTnLst>
                                 </p:cTn>
                               </p:par>
@@ -4791,26 +5189,26 @@
                     </p:cTn>
                   </p:par>
                   <p:par>
-                    <p:cTn id="11" fill="hold">
+                    <p:cTn id="13" fill="hold">
                       <p:stCondLst>
                         <p:cond delay="indefinite"/>
                       </p:stCondLst>
                       <p:childTnLst>
                         <p:par>
-                          <p:cTn id="12" fill="hold">
+                          <p:cTn id="14" fill="hold">
                             <p:stCondLst>
                               <p:cond delay="0"/>
                             </p:stCondLst>
                             <p:childTnLst>
                               <p:par>
-                                <p:cTn id="13" presetID="1" presetClass="entr" presetSubtype="0" fill="hold" grpId="0" nodeType="clickEffect">
+                                <p:cTn id="15" presetID="10" presetClass="entr" presetSubtype="0" fill="hold" grpId="0" nodeType="clickEffect">
                                   <p:stCondLst>
                                     <p:cond delay="0"/>
                                   </p:stCondLst>
                                   <p:childTnLst>
                                     <p:set>
                                       <p:cBhvr>
-                                        <p:cTn id="14" dur="1" fill="hold">
+                                        <p:cTn id="16" dur="1" fill="hold">
                                           <p:stCondLst>
                                             <p:cond delay="0"/>
                                           </p:stCondLst>
@@ -4818,7 +5216,7 @@
                                         <p:tgtEl>
                                           <p:spTgt spid="3">
                                             <p:txEl>
-                                              <p:pRg st="2" end="2"/>
+                                              <p:pRg st="1" end="1"/>
                                             </p:txEl>
                                           </p:spTgt>
                                         </p:tgtEl>
@@ -4830,6 +5228,18 @@
                                         <p:strVal val="visible"/>
                                       </p:to>
                                     </p:set>
+                                    <p:animEffect transition="in" filter="fade">
+                                      <p:cBhvr>
+                                        <p:cTn id="17" dur="500"/>
+                                        <p:tgtEl>
+                                          <p:spTgt spid="3">
+                                            <p:txEl>
+                                              <p:pRg st="1" end="1"/>
+                                            </p:txEl>
+                                          </p:spTgt>
+                                        </p:tgtEl>
+                                      </p:cBhvr>
+                                    </p:animEffect>
                                   </p:childTnLst>
                                 </p:cTn>
                               </p:par>
@@ -4840,26 +5250,26 @@
                     </p:cTn>
                   </p:par>
                   <p:par>
-                    <p:cTn id="15" fill="hold">
+                    <p:cTn id="18" fill="hold">
                       <p:stCondLst>
                         <p:cond delay="indefinite"/>
                       </p:stCondLst>
                       <p:childTnLst>
                         <p:par>
-                          <p:cTn id="16" fill="hold">
+                          <p:cTn id="19" fill="hold">
                             <p:stCondLst>
                               <p:cond delay="0"/>
                             </p:stCondLst>
                             <p:childTnLst>
                               <p:par>
-                                <p:cTn id="17" presetID="1" presetClass="entr" presetSubtype="0" fill="hold" grpId="0" nodeType="clickEffect">
+                                <p:cTn id="20" presetID="10" presetClass="entr" presetSubtype="0" fill="hold" grpId="0" nodeType="clickEffect">
                                   <p:stCondLst>
                                     <p:cond delay="0"/>
                                   </p:stCondLst>
                                   <p:childTnLst>
                                     <p:set>
                                       <p:cBhvr>
-                                        <p:cTn id="18" dur="1" fill="hold">
+                                        <p:cTn id="21" dur="1" fill="hold">
                                           <p:stCondLst>
                                             <p:cond delay="0"/>
                                           </p:stCondLst>
@@ -4867,7 +5277,7 @@
                                         <p:tgtEl>
                                           <p:spTgt spid="3">
                                             <p:txEl>
-                                              <p:pRg st="3" end="3"/>
+                                              <p:pRg st="2" end="2"/>
                                             </p:txEl>
                                           </p:spTgt>
                                         </p:tgtEl>
@@ -4879,55 +5289,18 @@
                                         <p:strVal val="visible"/>
                                       </p:to>
                                     </p:set>
-                                  </p:childTnLst>
-                                </p:cTn>
-                              </p:par>
-                            </p:childTnLst>
-                          </p:cTn>
-                        </p:par>
-                      </p:childTnLst>
-                    </p:cTn>
-                  </p:par>
-                  <p:par>
-                    <p:cTn id="19" fill="hold">
-                      <p:stCondLst>
-                        <p:cond delay="indefinite"/>
-                      </p:stCondLst>
-                      <p:childTnLst>
-                        <p:par>
-                          <p:cTn id="20" fill="hold">
-                            <p:stCondLst>
-                              <p:cond delay="0"/>
-                            </p:stCondLst>
-                            <p:childTnLst>
-                              <p:par>
-                                <p:cTn id="21" presetID="1" presetClass="entr" presetSubtype="0" fill="hold" grpId="0" nodeType="clickEffect">
-                                  <p:stCondLst>
-                                    <p:cond delay="0"/>
-                                  </p:stCondLst>
-                                  <p:childTnLst>
-                                    <p:set>
+                                    <p:animEffect transition="in" filter="fade">
                                       <p:cBhvr>
-                                        <p:cTn id="22" dur="1" fill="hold">
-                                          <p:stCondLst>
-                                            <p:cond delay="0"/>
-                                          </p:stCondLst>
-                                        </p:cTn>
+                                        <p:cTn id="22" dur="500"/>
                                         <p:tgtEl>
                                           <p:spTgt spid="3">
                                             <p:txEl>
-                                              <p:pRg st="4" end="4"/>
+                                              <p:pRg st="2" end="2"/>
                                             </p:txEl>
                                           </p:spTgt>
                                         </p:tgtEl>
-                                        <p:attrNameLst>
-                                          <p:attrName>style.visibility</p:attrName>
-                                        </p:attrNameLst>
-                                      </p:cBhvr>
-                                      <p:to>
-                                        <p:strVal val="visible"/>
-                                      </p:to>
-                                    </p:set>
+                                      </p:cBhvr>
+                                    </p:animEffect>
                                   </p:childTnLst>
                                 </p:cTn>
                               </p:par>
@@ -4950,7 +5323,7 @@
                             </p:stCondLst>
                             <p:childTnLst>
                               <p:par>
-                                <p:cTn id="25" presetID="1" presetClass="entr" presetSubtype="0" fill="hold" grpId="0" nodeType="clickEffect">
+                                <p:cTn id="25" presetID="10" presetClass="entr" presetSubtype="0" fill="hold" grpId="0" nodeType="clickEffect">
                                   <p:stCondLst>
                                     <p:cond delay="0"/>
                                   </p:stCondLst>
@@ -4965,7 +5338,7 @@
                                         <p:tgtEl>
                                           <p:spTgt spid="3">
                                             <p:txEl>
-                                              <p:pRg st="6" end="6"/>
+                                              <p:pRg st="3" end="3"/>
                                             </p:txEl>
                                           </p:spTgt>
                                         </p:tgtEl>
@@ -4977,6 +5350,18 @@
                                         <p:strVal val="visible"/>
                                       </p:to>
                                     </p:set>
+                                    <p:animEffect transition="in" filter="fade">
+                                      <p:cBhvr>
+                                        <p:cTn id="27" dur="500"/>
+                                        <p:tgtEl>
+                                          <p:spTgt spid="3">
+                                            <p:txEl>
+                                              <p:pRg st="3" end="3"/>
+                                            </p:txEl>
+                                          </p:spTgt>
+                                        </p:tgtEl>
+                                      </p:cBhvr>
+                                    </p:animEffect>
                                   </p:childTnLst>
                                 </p:cTn>
                               </p:par>
@@ -4987,26 +5372,26 @@
                     </p:cTn>
                   </p:par>
                   <p:par>
-                    <p:cTn id="27" fill="hold">
+                    <p:cTn id="28" fill="hold">
                       <p:stCondLst>
                         <p:cond delay="indefinite"/>
                       </p:stCondLst>
                       <p:childTnLst>
                         <p:par>
-                          <p:cTn id="28" fill="hold">
+                          <p:cTn id="29" fill="hold">
                             <p:stCondLst>
                               <p:cond delay="0"/>
                             </p:stCondLst>
                             <p:childTnLst>
                               <p:par>
-                                <p:cTn id="29" presetID="1" presetClass="entr" presetSubtype="0" fill="hold" grpId="0" nodeType="clickEffect">
+                                <p:cTn id="30" presetID="10" presetClass="entr" presetSubtype="0" fill="hold" grpId="0" nodeType="clickEffect">
                                   <p:stCondLst>
                                     <p:cond delay="0"/>
                                   </p:stCondLst>
                                   <p:childTnLst>
                                     <p:set>
                                       <p:cBhvr>
-                                        <p:cTn id="30" dur="1" fill="hold">
+                                        <p:cTn id="31" dur="1" fill="hold">
                                           <p:stCondLst>
                                             <p:cond delay="0"/>
                                           </p:stCondLst>
@@ -5014,7 +5399,7 @@
                                         <p:tgtEl>
                                           <p:spTgt spid="3">
                                             <p:txEl>
-                                              <p:pRg st="7" end="7"/>
+                                              <p:pRg st="4" end="4"/>
                                             </p:txEl>
                                           </p:spTgt>
                                         </p:tgtEl>
@@ -5026,6 +5411,18 @@
                                         <p:strVal val="visible"/>
                                       </p:to>
                                     </p:set>
+                                    <p:animEffect transition="in" filter="fade">
+                                      <p:cBhvr>
+                                        <p:cTn id="32" dur="500"/>
+                                        <p:tgtEl>
+                                          <p:spTgt spid="3">
+                                            <p:txEl>
+                                              <p:pRg st="4" end="4"/>
+                                            </p:txEl>
+                                          </p:spTgt>
+                                        </p:tgtEl>
+                                      </p:cBhvr>
+                                    </p:animEffect>
                                   </p:childTnLst>
                                 </p:cTn>
                               </p:par>
@@ -5036,36 +5433,32 @@
                     </p:cTn>
                   </p:par>
                   <p:par>
-                    <p:cTn id="31" fill="hold">
+                    <p:cTn id="33" fill="hold">
                       <p:stCondLst>
                         <p:cond delay="indefinite"/>
                       </p:stCondLst>
                       <p:childTnLst>
                         <p:par>
-                          <p:cTn id="32" fill="hold">
+                          <p:cTn id="34" fill="hold">
                             <p:stCondLst>
                               <p:cond delay="0"/>
                             </p:stCondLst>
                             <p:childTnLst>
                               <p:par>
-                                <p:cTn id="33" presetID="1" presetClass="entr" presetSubtype="0" fill="hold" grpId="0" nodeType="clickEffect">
+                                <p:cTn id="35" presetID="10" presetClass="entr" presetSubtype="0" fill="hold" grpId="0" nodeType="clickEffect">
                                   <p:stCondLst>
                                     <p:cond delay="0"/>
                                   </p:stCondLst>
                                   <p:childTnLst>
                                     <p:set>
                                       <p:cBhvr>
-                                        <p:cTn id="34" dur="1" fill="hold">
+                                        <p:cTn id="36" dur="1" fill="hold">
                                           <p:stCondLst>
                                             <p:cond delay="0"/>
                                           </p:stCondLst>
                                         </p:cTn>
                                         <p:tgtEl>
-                                          <p:spTgt spid="3">
-                                            <p:txEl>
-                                              <p:pRg st="8" end="8"/>
-                                            </p:txEl>
-                                          </p:spTgt>
+                                          <p:spTgt spid="6"/>
                                         </p:tgtEl>
                                         <p:attrNameLst>
                                           <p:attrName>style.visibility</p:attrName>
@@ -5075,6 +5468,14 @@
                                         <p:strVal val="visible"/>
                                       </p:to>
                                     </p:set>
+                                    <p:animEffect transition="in" filter="fade">
+                                      <p:cBhvr>
+                                        <p:cTn id="37" dur="500"/>
+                                        <p:tgtEl>
+                                          <p:spTgt spid="6"/>
+                                        </p:tgtEl>
+                                      </p:cBhvr>
+                                    </p:animEffect>
                                   </p:childTnLst>
                                 </p:cTn>
                               </p:par>
@@ -5085,36 +5486,32 @@
                     </p:cTn>
                   </p:par>
                   <p:par>
-                    <p:cTn id="35" fill="hold">
+                    <p:cTn id="38" fill="hold">
                       <p:stCondLst>
                         <p:cond delay="indefinite"/>
                       </p:stCondLst>
                       <p:childTnLst>
                         <p:par>
-                          <p:cTn id="36" fill="hold">
+                          <p:cTn id="39" fill="hold">
                             <p:stCondLst>
                               <p:cond delay="0"/>
                             </p:stCondLst>
                             <p:childTnLst>
                               <p:par>
-                                <p:cTn id="37" presetID="1" presetClass="entr" presetSubtype="0" fill="hold" grpId="0" nodeType="clickEffect">
+                                <p:cTn id="40" presetID="10" presetClass="entr" presetSubtype="0" fill="hold" grpId="0" nodeType="clickEffect">
                                   <p:stCondLst>
                                     <p:cond delay="0"/>
                                   </p:stCondLst>
                                   <p:childTnLst>
                                     <p:set>
                                       <p:cBhvr>
-                                        <p:cTn id="38" dur="1" fill="hold">
+                                        <p:cTn id="41" dur="1" fill="hold">
                                           <p:stCondLst>
                                             <p:cond delay="0"/>
                                           </p:stCondLst>
                                         </p:cTn>
                                         <p:tgtEl>
-                                          <p:spTgt spid="3">
-                                            <p:txEl>
-                                              <p:pRg st="9" end="9"/>
-                                            </p:txEl>
-                                          </p:spTgt>
+                                          <p:spTgt spid="8"/>
                                         </p:tgtEl>
                                         <p:attrNameLst>
                                           <p:attrName>style.visibility</p:attrName>
@@ -5124,97 +5521,14 @@
                                         <p:strVal val="visible"/>
                                       </p:to>
                                     </p:set>
-                                  </p:childTnLst>
-                                </p:cTn>
-                              </p:par>
-                            </p:childTnLst>
-                          </p:cTn>
-                        </p:par>
-                      </p:childTnLst>
-                    </p:cTn>
-                  </p:par>
-                  <p:par>
-                    <p:cTn id="39" fill="hold">
-                      <p:stCondLst>
-                        <p:cond delay="indefinite"/>
-                      </p:stCondLst>
-                      <p:childTnLst>
-                        <p:par>
-                          <p:cTn id="40" fill="hold">
-                            <p:stCondLst>
-                              <p:cond delay="0"/>
-                            </p:stCondLst>
-                            <p:childTnLst>
-                              <p:par>
-                                <p:cTn id="41" presetID="2" presetClass="entr" presetSubtype="4" fill="hold" grpId="0" nodeType="clickEffect">
-                                  <p:stCondLst>
-                                    <p:cond delay="0"/>
-                                  </p:stCondLst>
-                                  <p:childTnLst>
-                                    <p:set>
+                                    <p:animEffect transition="in" filter="fade">
                                       <p:cBhvr>
-                                        <p:cTn id="42" dur="1" fill="hold">
-                                          <p:stCondLst>
-                                            <p:cond delay="0"/>
-                                          </p:stCondLst>
-                                        </p:cTn>
-                                        <p:tgtEl>
-                                          <p:spTgt spid="5"/>
-                                        </p:tgtEl>
-                                        <p:attrNameLst>
-                                          <p:attrName>style.visibility</p:attrName>
-                                        </p:attrNameLst>
-                                      </p:cBhvr>
-                                      <p:to>
-                                        <p:strVal val="visible"/>
-                                      </p:to>
-                                    </p:set>
-                                    <p:anim calcmode="lin" valueType="num">
-                                      <p:cBhvr additive="base">
-                                        <p:cTn id="43" dur="500" fill="hold"/>
-                                        <p:tgtEl>
-                                          <p:spTgt spid="5"/>
-                                        </p:tgtEl>
-                                        <p:attrNameLst>
-                                          <p:attrName>ppt_x</p:attrName>
-                                        </p:attrNameLst>
-                                      </p:cBhvr>
-                                      <p:tavLst>
-                                        <p:tav tm="0">
-                                          <p:val>
-                                            <p:strVal val="#ppt_x"/>
-                                          </p:val>
-                                        </p:tav>
-                                        <p:tav tm="100000">
-                                          <p:val>
-                                            <p:strVal val="#ppt_x"/>
-                                          </p:val>
-                                        </p:tav>
-                                      </p:tavLst>
-                                    </p:anim>
-                                    <p:anim calcmode="lin" valueType="num">
-                                      <p:cBhvr additive="base">
-                                        <p:cTn id="44" dur="500" fill="hold"/>
-                                        <p:tgtEl>
-                                          <p:spTgt spid="5"/>
-                                        </p:tgtEl>
-                                        <p:attrNameLst>
-                                          <p:attrName>ppt_y</p:attrName>
-                                        </p:attrNameLst>
-                                      </p:cBhvr>
-                                      <p:tavLst>
-                                        <p:tav tm="0">
-                                          <p:val>
-                                            <p:strVal val="1+#ppt_h/2"/>
-                                          </p:val>
-                                        </p:tav>
-                                        <p:tav tm="100000">
-                                          <p:val>
-                                            <p:strVal val="#ppt_y"/>
-                                          </p:val>
-                                        </p:tav>
-                                      </p:tavLst>
-                                    </p:anim>
+                                        <p:cTn id="42" dur="500"/>
+                                        <p:tgtEl>
+                                          <p:spTgt spid="8"/>
+                                        </p:tgtEl>
+                                      </p:cBhvr>
+                                    </p:animEffect>
                                   </p:childTnLst>
                                 </p:cTn>
                               </p:par>
@@ -5246,8 +5560,10 @@
       </p:par>
     </p:tnLst>
     <p:bldLst>
+      <p:bldP spid="2" grpId="0"/>
       <p:bldP spid="3" grpId="0" build="p"/>
-      <p:bldP spid="5" grpId="0"/>
+      <p:bldP spid="6" grpId="0"/>
+      <p:bldP spid="8" grpId="0"/>
     </p:bldLst>
   </p:timing>
 </p:sld>
@@ -5292,30 +5608,9 @@
           <a:lstStyle/>
           <a:p>
             <a:r>
-              <a:rPr lang="fr-FR" dirty="0" err="1"/>
-              <a:t>Solusi</a:t>
-            </a:r>
-            <a:r>
-              <a:rPr lang="fr-FR" dirty="0"/>
-              <a:t>: </a:t>
-            </a:r>
-            <a:r>
-              <a:rPr lang="fr-FR" dirty="0" err="1"/>
-              <a:t>Automated</a:t>
-            </a:r>
-            <a:r>
-              <a:rPr lang="fr-FR" dirty="0"/>
-              <a:t> Code </a:t>
-            </a:r>
-            <a:r>
-              <a:rPr lang="fr-FR" dirty="0" err="1"/>
-              <a:t>Analysis</a:t>
-            </a:r>
-            <a:r>
-              <a:rPr lang="fr-FR" dirty="0"/>
-              <a:t> Pipeline</a:t>
-            </a:r>
-            <a:endParaRPr lang="en-US" dirty="0"/>
+              <a:rPr lang="en-US" dirty="0"/>
+              <a:t>✅ 2. Solution Overview</a:t>
+            </a:r>
           </a:p>
         </p:txBody>
       </p:sp>
@@ -5335,47 +5630,83 @@
             <p:ph idx="1"/>
           </p:nvPr>
         </p:nvSpPr>
-        <p:spPr/>
+        <p:spPr>
+          <a:xfrm>
+            <a:off x="838200" y="1825625"/>
+            <a:ext cx="3953933" cy="4351338"/>
+          </a:xfrm>
+        </p:spPr>
         <p:txBody>
           <a:bodyPr>
-            <a:normAutofit fontScale="55000" lnSpcReduction="20000"/>
+            <a:normAutofit/>
           </a:bodyPr>
           <a:lstStyle/>
           <a:p>
-            <a:pPr marL="0" indent="0">
-              <a:buNone/>
-            </a:pPr>
-            <a:r>
-              <a:rPr lang="en-US" dirty="0"/>
-              <a:t>✅ Automated Code Quality Check:</a:t>
-            </a:r>
-          </a:p>
-          <a:p>
-            <a:pPr marL="0" indent="0">
-              <a:buNone/>
-            </a:pPr>
-            <a:r>
-              <a:rPr lang="en-US" dirty="0"/>
-              <a:t>- Laravel Pint </a:t>
-            </a:r>
-            <a:r>
-              <a:rPr lang="en-US" dirty="0" err="1"/>
-              <a:t>untuk</a:t>
-            </a:r>
-            <a:r>
-              <a:rPr lang="en-US" dirty="0"/>
-              <a:t> format PHP </a:t>
-            </a:r>
-            <a:r>
-              <a:rPr lang="en-US" dirty="0" err="1"/>
-              <a:t>otomatis</a:t>
-            </a:r>
-            <a:endParaRPr lang="en-US" dirty="0"/>
-          </a:p>
-          <a:p>
-            <a:pPr marL="0" indent="0">
-              <a:buNone/>
-            </a:pPr>
+            <a:r>
+              <a:rPr lang="en-US" sz="1800" dirty="0"/>
+              <a:t>Automated Code Analysis Pipeline:</a:t>
+            </a:r>
+          </a:p>
+          <a:p>
+            <a:r>
+              <a:rPr lang="en-US" sz="1800" dirty="0"/>
+              <a:t>Developer Code → Pre-commit Hook → Code Analysis</a:t>
+            </a:r>
+          </a:p>
+          <a:p>
+            <a:r>
+              <a:rPr lang="en-US" sz="1800" dirty="0"/>
+              <a:t>    ↳ Pass: Commit Success</a:t>
+            </a:r>
+          </a:p>
+          <a:p>
+            <a:r>
+              <a:rPr lang="en-US" sz="1800" dirty="0"/>
+              <a:t>    ↳ Fail: Block Commit + Show Errors → Fix → Retry</a:t>
+            </a:r>
+          </a:p>
+        </p:txBody>
+      </p:sp>
+      <p:sp>
+        <p:nvSpPr>
+          <p:cNvPr id="5" name="TextBox 4">
+            <a:extLst>
+              <a:ext uri="{FF2B5EF4-FFF2-40B4-BE49-F238E27FC236}">
+                <a16:creationId xmlns:a16="http://schemas.microsoft.com/office/drawing/2014/main" id="{77D5EBC1-22F3-BBA1-4B27-0E974FD9761D}"/>
+              </a:ext>
+            </a:extLst>
+          </p:cNvPr>
+          <p:cNvSpPr txBox="1"/>
+          <p:nvPr/>
+        </p:nvSpPr>
+        <p:spPr>
+          <a:xfrm>
+            <a:off x="4792133" y="1797050"/>
+            <a:ext cx="3547533" cy="2031325"/>
+          </a:xfrm>
+          <a:prstGeom prst="rect">
+            <a:avLst/>
+          </a:prstGeom>
+          <a:noFill/>
+        </p:spPr>
+        <p:txBody>
+          <a:bodyPr wrap="square">
+            <a:spAutoFit/>
+          </a:bodyPr>
+          <a:lstStyle/>
+          <a:p>
+            <a:r>
+              <a:rPr lang="en-US" dirty="0"/>
+              <a:t>Key Components:</a:t>
+            </a:r>
+          </a:p>
+          <a:p>
+            <a:r>
+              <a:rPr lang="en-US" dirty="0"/>
+              <a:t>- Laravel Pint</a:t>
+            </a:r>
+          </a:p>
+          <a:p>
             <a:r>
               <a:rPr lang="en-US" dirty="0"/>
               <a:t>- </a:t>
@@ -5392,23 +5723,9 @@
               <a:rPr lang="en-US" dirty="0" err="1"/>
               <a:t>Larastan</a:t>
             </a:r>
-            <a:r>
-              <a:rPr lang="en-US" dirty="0"/>
-              <a:t> </a:t>
-            </a:r>
-            <a:r>
-              <a:rPr lang="en-US" dirty="0" err="1"/>
-              <a:t>untuk</a:t>
-            </a:r>
-            <a:r>
-              <a:rPr lang="en-US" dirty="0"/>
-              <a:t> static analysis</a:t>
-            </a:r>
-          </a:p>
-          <a:p>
-            <a:pPr marL="0" indent="0">
-              <a:buNone/>
-            </a:pPr>
+            <a:endParaRPr lang="en-US" dirty="0"/>
+          </a:p>
+          <a:p>
             <a:r>
               <a:rPr lang="en-US" dirty="0"/>
               <a:t>- </a:t>
@@ -5417,158 +5734,80 @@
               <a:rPr lang="en-US" dirty="0" err="1"/>
               <a:t>ESLint</a:t>
             </a:r>
-            <a:r>
-              <a:rPr lang="en-US" dirty="0"/>
-              <a:t> </a:t>
-            </a:r>
-            <a:r>
-              <a:rPr lang="en-US" dirty="0" err="1"/>
-              <a:t>untuk</a:t>
-            </a:r>
-            <a:r>
-              <a:rPr lang="en-US" dirty="0"/>
-              <a:t> JavaScript/Node.js</a:t>
-            </a:r>
-          </a:p>
-          <a:p>
-            <a:pPr marL="0" indent="0">
-              <a:buNone/>
-            </a:pPr>
-            <a:r>
-              <a:rPr lang="en-US" dirty="0"/>
-              <a:t>- Pre-commit hooks yang </a:t>
-            </a:r>
-            <a:r>
-              <a:rPr lang="en-US" dirty="0" err="1"/>
-              <a:t>nggak</a:t>
-            </a:r>
-            <a:r>
-              <a:rPr lang="en-US" dirty="0"/>
-              <a:t> </a:t>
-            </a:r>
-            <a:r>
-              <a:rPr lang="en-US" dirty="0" err="1"/>
-              <a:t>bisa</a:t>
-            </a:r>
-            <a:r>
-              <a:rPr lang="en-US" dirty="0"/>
-              <a:t> di-skip</a:t>
-            </a:r>
-          </a:p>
-          <a:p>
-            <a:pPr marL="0" indent="0">
-              <a:buNone/>
-            </a:pPr>
             <a:endParaRPr lang="en-US" dirty="0"/>
           </a:p>
           <a:p>
-            <a:pPr marL="0" indent="0">
-              <a:buNone/>
-            </a:pPr>
-            <a:r>
-              <a:rPr lang="en-US" dirty="0"/>
-              <a:t>✅ Real-time Quality Feedback:</a:t>
-            </a:r>
-          </a:p>
-          <a:p>
-            <a:pPr marL="0" indent="0">
-              <a:buNone/>
-            </a:pPr>
-            <a:r>
-              <a:rPr lang="en-US" dirty="0"/>
-              <a:t>- Error detection </a:t>
-            </a:r>
-            <a:r>
-              <a:rPr lang="en-US" dirty="0" err="1"/>
-              <a:t>sebelum</a:t>
-            </a:r>
-            <a:r>
-              <a:rPr lang="en-US" dirty="0"/>
-              <a:t> commit</a:t>
-            </a:r>
-          </a:p>
-          <a:p>
-            <a:pPr marL="0" indent="0">
-              <a:buNone/>
-            </a:pPr>
-            <a:r>
-              <a:rPr lang="en-US" dirty="0"/>
-              <a:t>- Auto-fix </a:t>
-            </a:r>
-            <a:r>
-              <a:rPr lang="en-US" dirty="0" err="1"/>
-              <a:t>untuk</a:t>
-            </a:r>
-            <a:r>
-              <a:rPr lang="en-US" dirty="0"/>
-              <a:t> </a:t>
-            </a:r>
-            <a:r>
-              <a:rPr lang="en-US" dirty="0" err="1"/>
-              <a:t>masalah</a:t>
-            </a:r>
-            <a:r>
-              <a:rPr lang="en-US" dirty="0"/>
-              <a:t> formatting</a:t>
-            </a:r>
-          </a:p>
-          <a:p>
-            <a:pPr marL="0" indent="0">
-              <a:buNone/>
-            </a:pPr>
-            <a:r>
-              <a:rPr lang="en-US" dirty="0"/>
-              <a:t>- Detailed report </a:t>
-            </a:r>
-            <a:r>
-              <a:rPr lang="en-US" dirty="0" err="1"/>
-              <a:t>untuk</a:t>
-            </a:r>
-            <a:r>
-              <a:rPr lang="en-US" dirty="0"/>
-              <a:t> complex issues</a:t>
-            </a:r>
-          </a:p>
-          <a:p>
-            <a:pPr marL="0" indent="0">
-              <a:buNone/>
-            </a:pPr>
+            <a:r>
+              <a:rPr lang="en-US" dirty="0"/>
+              <a:t>- Pre-commit Hooks</a:t>
+            </a:r>
+          </a:p>
+          <a:p>
+            <a:r>
+              <a:rPr lang="en-US" dirty="0"/>
+              <a:t>- Docker</a:t>
+            </a:r>
+          </a:p>
+          <a:p>
             <a:endParaRPr lang="en-US" dirty="0"/>
           </a:p>
-          <a:p>
-            <a:pPr marL="0" indent="0">
-              <a:buNone/>
-            </a:pPr>
-            <a:r>
-              <a:rPr lang="en-US" dirty="0"/>
-              <a:t>✅ Developer Experience yang smooth:</a:t>
-            </a:r>
-          </a:p>
-          <a:p>
-            <a:pPr marL="0" indent="0">
-              <a:buNone/>
-            </a:pPr>
-            <a:r>
-              <a:rPr lang="en-US" dirty="0"/>
-              <a:t>- Docker-based tools (consistent environment)</a:t>
-            </a:r>
-          </a:p>
-          <a:p>
-            <a:pPr marL="0" indent="0">
-              <a:buNone/>
-            </a:pPr>
-            <a:r>
-              <a:rPr lang="en-US" dirty="0"/>
-              <a:t>- Easy setup dan configuration</a:t>
-            </a:r>
-          </a:p>
-          <a:p>
-            <a:pPr marL="0" indent="0">
-              <a:buNone/>
-            </a:pPr>
-            <a:r>
-              <a:rPr lang="en-US" dirty="0"/>
-              <a:t>- Clear error messages dan suggestions</a:t>
+        </p:txBody>
+      </p:sp>
+      <p:sp>
+        <p:nvSpPr>
+          <p:cNvPr id="7" name="TextBox 6">
+            <a:extLst>
+              <a:ext uri="{FF2B5EF4-FFF2-40B4-BE49-F238E27FC236}">
+                <a16:creationId xmlns:a16="http://schemas.microsoft.com/office/drawing/2014/main" id="{7EC89ACD-6359-584C-F04D-AB501FC25168}"/>
+              </a:ext>
+            </a:extLst>
+          </p:cNvPr>
+          <p:cNvSpPr txBox="1"/>
+          <p:nvPr/>
+        </p:nvSpPr>
+        <p:spPr>
+          <a:xfrm>
+            <a:off x="7628465" y="1769005"/>
+            <a:ext cx="3183467" cy="1477328"/>
+          </a:xfrm>
+          <a:prstGeom prst="rect">
+            <a:avLst/>
+          </a:prstGeom>
+          <a:noFill/>
+        </p:spPr>
+        <p:txBody>
+          <a:bodyPr wrap="square">
+            <a:spAutoFit/>
+          </a:bodyPr>
+          <a:lstStyle/>
+          <a:p>
+            <a:r>
+              <a:rPr lang="en-US" dirty="0"/>
+              <a:t>Benefits:</a:t>
+            </a:r>
+          </a:p>
+          <a:p>
+            <a:r>
+              <a:rPr lang="en-US" dirty="0"/>
+              <a:t>- Zero manual intervention</a:t>
+            </a:r>
+          </a:p>
+          <a:p>
+            <a:r>
+              <a:rPr lang="en-US" dirty="0"/>
+              <a:t>- 99% bug detection</a:t>
+            </a:r>
+          </a:p>
+          <a:p>
+            <a:r>
+              <a:rPr lang="en-US" dirty="0"/>
+              <a:t>- Consistent code style</a:t>
+            </a:r>
+          </a:p>
+          <a:p>
+            <a:r>
+              <a:rPr lang="en-US" dirty="0"/>
+              <a:t>- Faster code reviews</a:t>
             </a:r>
           </a:p>
         </p:txBody>
@@ -5604,7 +5843,7 @@
                             </p:stCondLst>
                             <p:childTnLst>
                               <p:par>
-                                <p:cTn id="5" presetID="10" presetClass="entr" presetSubtype="0" fill="hold" grpId="0" nodeType="clickEffect">
+                                <p:cTn id="5" presetID="16" presetClass="entr" presetSubtype="21" fill="hold" grpId="0" nodeType="clickEffect">
                                   <p:stCondLst>
                                     <p:cond delay="0"/>
                                   </p:stCondLst>
@@ -5617,11 +5856,7 @@
                                           </p:stCondLst>
                                         </p:cTn>
                                         <p:tgtEl>
-                                          <p:spTgt spid="3">
-                                            <p:txEl>
-                                              <p:pRg st="0" end="0"/>
-                                            </p:txEl>
-                                          </p:spTgt>
+                                          <p:spTgt spid="2"/>
                                         </p:tgtEl>
                                         <p:attrNameLst>
                                           <p:attrName>style.visibility</p:attrName>
@@ -5631,15 +5866,11 @@
                                         <p:strVal val="visible"/>
                                       </p:to>
                                     </p:set>
-                                    <p:animEffect transition="in" filter="fade">
+                                    <p:animEffect transition="in" filter="barn(inVertical)">
                                       <p:cBhvr>
                                         <p:cTn id="7" dur="500"/>
                                         <p:tgtEl>
-                                          <p:spTgt spid="3">
-                                            <p:txEl>
-                                              <p:pRg st="0" end="0"/>
-                                            </p:txEl>
-                                          </p:spTgt>
+                                          <p:spTgt spid="2"/>
                                         </p:tgtEl>
                                       </p:cBhvr>
                                     </p:animEffect>
@@ -5680,7 +5911,7 @@
                                         <p:tgtEl>
                                           <p:spTgt spid="3">
                                             <p:txEl>
-                                              <p:pRg st="1" end="1"/>
+                                              <p:pRg st="0" end="0"/>
                                             </p:txEl>
                                           </p:spTgt>
                                         </p:tgtEl>
@@ -5698,7 +5929,7 @@
                                         <p:tgtEl>
                                           <p:spTgt spid="3">
                                             <p:txEl>
-                                              <p:pRg st="1" end="1"/>
+                                              <p:pRg st="0" end="0"/>
                                             </p:txEl>
                                           </p:spTgt>
                                         </p:tgtEl>
@@ -5741,7 +5972,7 @@
                                         <p:tgtEl>
                                           <p:spTgt spid="3">
                                             <p:txEl>
-                                              <p:pRg st="2" end="2"/>
+                                              <p:pRg st="1" end="1"/>
                                             </p:txEl>
                                           </p:spTgt>
                                         </p:tgtEl>
@@ -5759,7 +5990,7 @@
                                         <p:tgtEl>
                                           <p:spTgt spid="3">
                                             <p:txEl>
-                                              <p:pRg st="2" end="2"/>
+                                              <p:pRg st="1" end="1"/>
                                             </p:txEl>
                                           </p:spTgt>
                                         </p:tgtEl>
@@ -5802,7 +6033,7 @@
                                         <p:tgtEl>
                                           <p:spTgt spid="3">
                                             <p:txEl>
-                                              <p:pRg st="3" end="3"/>
+                                              <p:pRg st="2" end="2"/>
                                             </p:txEl>
                                           </p:spTgt>
                                         </p:tgtEl>
@@ -5820,7 +6051,7 @@
                                         <p:tgtEl>
                                           <p:spTgt spid="3">
                                             <p:txEl>
-                                              <p:pRg st="3" end="3"/>
+                                              <p:pRg st="2" end="2"/>
                                             </p:txEl>
                                           </p:spTgt>
                                         </p:tgtEl>
@@ -5863,7 +6094,7 @@
                                         <p:tgtEl>
                                           <p:spTgt spid="3">
                                             <p:txEl>
-                                              <p:pRg st="4" end="4"/>
+                                              <p:pRg st="3" end="3"/>
                                             </p:txEl>
                                           </p:spTgt>
                                         </p:tgtEl>
@@ -5881,7 +6112,7 @@
                                         <p:tgtEl>
                                           <p:spTgt spid="3">
                                             <p:txEl>
-                                              <p:pRg st="4" end="4"/>
+                                              <p:pRg st="3" end="3"/>
                                             </p:txEl>
                                           </p:spTgt>
                                         </p:tgtEl>
@@ -5922,11 +6153,7 @@
                                           </p:stCondLst>
                                         </p:cTn>
                                         <p:tgtEl>
-                                          <p:spTgt spid="3">
-                                            <p:txEl>
-                                              <p:pRg st="6" end="6"/>
-                                            </p:txEl>
-                                          </p:spTgt>
+                                          <p:spTgt spid="5"/>
                                         </p:tgtEl>
                                         <p:attrNameLst>
                                           <p:attrName>style.visibility</p:attrName>
@@ -5940,11 +6167,7 @@
                                       <p:cBhvr>
                                         <p:cTn id="32" dur="500"/>
                                         <p:tgtEl>
-                                          <p:spTgt spid="3">
-                                            <p:txEl>
-                                              <p:pRg st="6" end="6"/>
-                                            </p:txEl>
-                                          </p:spTgt>
+                                          <p:spTgt spid="5"/>
                                         </p:tgtEl>
                                       </p:cBhvr>
                                     </p:animEffect>
@@ -5983,11 +6206,7 @@
                                           </p:stCondLst>
                                         </p:cTn>
                                         <p:tgtEl>
-                                          <p:spTgt spid="3">
-                                            <p:txEl>
-                                              <p:pRg st="7" end="7"/>
-                                            </p:txEl>
-                                          </p:spTgt>
+                                          <p:spTgt spid="7"/>
                                         </p:tgtEl>
                                         <p:attrNameLst>
                                           <p:attrName>style.visibility</p:attrName>
@@ -6001,377 +6220,7 @@
                                       <p:cBhvr>
                                         <p:cTn id="37" dur="500"/>
                                         <p:tgtEl>
-                                          <p:spTgt spid="3">
-                                            <p:txEl>
-                                              <p:pRg st="7" end="7"/>
-                                            </p:txEl>
-                                          </p:spTgt>
-                                        </p:tgtEl>
-                                      </p:cBhvr>
-                                    </p:animEffect>
-                                  </p:childTnLst>
-                                </p:cTn>
-                              </p:par>
-                            </p:childTnLst>
-                          </p:cTn>
-                        </p:par>
-                      </p:childTnLst>
-                    </p:cTn>
-                  </p:par>
-                  <p:par>
-                    <p:cTn id="38" fill="hold">
-                      <p:stCondLst>
-                        <p:cond delay="indefinite"/>
-                      </p:stCondLst>
-                      <p:childTnLst>
-                        <p:par>
-                          <p:cTn id="39" fill="hold">
-                            <p:stCondLst>
-                              <p:cond delay="0"/>
-                            </p:stCondLst>
-                            <p:childTnLst>
-                              <p:par>
-                                <p:cTn id="40" presetID="10" presetClass="entr" presetSubtype="0" fill="hold" grpId="0" nodeType="clickEffect">
-                                  <p:stCondLst>
-                                    <p:cond delay="0"/>
-                                  </p:stCondLst>
-                                  <p:childTnLst>
-                                    <p:set>
-                                      <p:cBhvr>
-                                        <p:cTn id="41" dur="1" fill="hold">
-                                          <p:stCondLst>
-                                            <p:cond delay="0"/>
-                                          </p:stCondLst>
-                                        </p:cTn>
-                                        <p:tgtEl>
-                                          <p:spTgt spid="3">
-                                            <p:txEl>
-                                              <p:pRg st="8" end="8"/>
-                                            </p:txEl>
-                                          </p:spTgt>
-                                        </p:tgtEl>
-                                        <p:attrNameLst>
-                                          <p:attrName>style.visibility</p:attrName>
-                                        </p:attrNameLst>
-                                      </p:cBhvr>
-                                      <p:to>
-                                        <p:strVal val="visible"/>
-                                      </p:to>
-                                    </p:set>
-                                    <p:animEffect transition="in" filter="fade">
-                                      <p:cBhvr>
-                                        <p:cTn id="42" dur="500"/>
-                                        <p:tgtEl>
-                                          <p:spTgt spid="3">
-                                            <p:txEl>
-                                              <p:pRg st="8" end="8"/>
-                                            </p:txEl>
-                                          </p:spTgt>
-                                        </p:tgtEl>
-                                      </p:cBhvr>
-                                    </p:animEffect>
-                                  </p:childTnLst>
-                                </p:cTn>
-                              </p:par>
-                            </p:childTnLst>
-                          </p:cTn>
-                        </p:par>
-                      </p:childTnLst>
-                    </p:cTn>
-                  </p:par>
-                  <p:par>
-                    <p:cTn id="43" fill="hold">
-                      <p:stCondLst>
-                        <p:cond delay="indefinite"/>
-                      </p:stCondLst>
-                      <p:childTnLst>
-                        <p:par>
-                          <p:cTn id="44" fill="hold">
-                            <p:stCondLst>
-                              <p:cond delay="0"/>
-                            </p:stCondLst>
-                            <p:childTnLst>
-                              <p:par>
-                                <p:cTn id="45" presetID="10" presetClass="entr" presetSubtype="0" fill="hold" grpId="0" nodeType="clickEffect">
-                                  <p:stCondLst>
-                                    <p:cond delay="0"/>
-                                  </p:stCondLst>
-                                  <p:childTnLst>
-                                    <p:set>
-                                      <p:cBhvr>
-                                        <p:cTn id="46" dur="1" fill="hold">
-                                          <p:stCondLst>
-                                            <p:cond delay="0"/>
-                                          </p:stCondLst>
-                                        </p:cTn>
-                                        <p:tgtEl>
-                                          <p:spTgt spid="3">
-                                            <p:txEl>
-                                              <p:pRg st="9" end="9"/>
-                                            </p:txEl>
-                                          </p:spTgt>
-                                        </p:tgtEl>
-                                        <p:attrNameLst>
-                                          <p:attrName>style.visibility</p:attrName>
-                                        </p:attrNameLst>
-                                      </p:cBhvr>
-                                      <p:to>
-                                        <p:strVal val="visible"/>
-                                      </p:to>
-                                    </p:set>
-                                    <p:animEffect transition="in" filter="fade">
-                                      <p:cBhvr>
-                                        <p:cTn id="47" dur="500"/>
-                                        <p:tgtEl>
-                                          <p:spTgt spid="3">
-                                            <p:txEl>
-                                              <p:pRg st="9" end="9"/>
-                                            </p:txEl>
-                                          </p:spTgt>
-                                        </p:tgtEl>
-                                      </p:cBhvr>
-                                    </p:animEffect>
-                                  </p:childTnLst>
-                                </p:cTn>
-                              </p:par>
-                            </p:childTnLst>
-                          </p:cTn>
-                        </p:par>
-                      </p:childTnLst>
-                    </p:cTn>
-                  </p:par>
-                  <p:par>
-                    <p:cTn id="48" fill="hold">
-                      <p:stCondLst>
-                        <p:cond delay="indefinite"/>
-                      </p:stCondLst>
-                      <p:childTnLst>
-                        <p:par>
-                          <p:cTn id="49" fill="hold">
-                            <p:stCondLst>
-                              <p:cond delay="0"/>
-                            </p:stCondLst>
-                            <p:childTnLst>
-                              <p:par>
-                                <p:cTn id="50" presetID="10" presetClass="entr" presetSubtype="0" fill="hold" grpId="0" nodeType="clickEffect">
-                                  <p:stCondLst>
-                                    <p:cond delay="0"/>
-                                  </p:stCondLst>
-                                  <p:childTnLst>
-                                    <p:set>
-                                      <p:cBhvr>
-                                        <p:cTn id="51" dur="1" fill="hold">
-                                          <p:stCondLst>
-                                            <p:cond delay="0"/>
-                                          </p:stCondLst>
-                                        </p:cTn>
-                                        <p:tgtEl>
-                                          <p:spTgt spid="3">
-                                            <p:txEl>
-                                              <p:pRg st="11" end="11"/>
-                                            </p:txEl>
-                                          </p:spTgt>
-                                        </p:tgtEl>
-                                        <p:attrNameLst>
-                                          <p:attrName>style.visibility</p:attrName>
-                                        </p:attrNameLst>
-                                      </p:cBhvr>
-                                      <p:to>
-                                        <p:strVal val="visible"/>
-                                      </p:to>
-                                    </p:set>
-                                    <p:animEffect transition="in" filter="fade">
-                                      <p:cBhvr>
-                                        <p:cTn id="52" dur="500"/>
-                                        <p:tgtEl>
-                                          <p:spTgt spid="3">
-                                            <p:txEl>
-                                              <p:pRg st="11" end="11"/>
-                                            </p:txEl>
-                                          </p:spTgt>
-                                        </p:tgtEl>
-                                      </p:cBhvr>
-                                    </p:animEffect>
-                                  </p:childTnLst>
-                                </p:cTn>
-                              </p:par>
-                            </p:childTnLst>
-                          </p:cTn>
-                        </p:par>
-                      </p:childTnLst>
-                    </p:cTn>
-                  </p:par>
-                  <p:par>
-                    <p:cTn id="53" fill="hold">
-                      <p:stCondLst>
-                        <p:cond delay="indefinite"/>
-                      </p:stCondLst>
-                      <p:childTnLst>
-                        <p:par>
-                          <p:cTn id="54" fill="hold">
-                            <p:stCondLst>
-                              <p:cond delay="0"/>
-                            </p:stCondLst>
-                            <p:childTnLst>
-                              <p:par>
-                                <p:cTn id="55" presetID="10" presetClass="entr" presetSubtype="0" fill="hold" grpId="0" nodeType="clickEffect">
-                                  <p:stCondLst>
-                                    <p:cond delay="0"/>
-                                  </p:stCondLst>
-                                  <p:childTnLst>
-                                    <p:set>
-                                      <p:cBhvr>
-                                        <p:cTn id="56" dur="1" fill="hold">
-                                          <p:stCondLst>
-                                            <p:cond delay="0"/>
-                                          </p:stCondLst>
-                                        </p:cTn>
-                                        <p:tgtEl>
-                                          <p:spTgt spid="3">
-                                            <p:txEl>
-                                              <p:pRg st="12" end="12"/>
-                                            </p:txEl>
-                                          </p:spTgt>
-                                        </p:tgtEl>
-                                        <p:attrNameLst>
-                                          <p:attrName>style.visibility</p:attrName>
-                                        </p:attrNameLst>
-                                      </p:cBhvr>
-                                      <p:to>
-                                        <p:strVal val="visible"/>
-                                      </p:to>
-                                    </p:set>
-                                    <p:animEffect transition="in" filter="fade">
-                                      <p:cBhvr>
-                                        <p:cTn id="57" dur="500"/>
-                                        <p:tgtEl>
-                                          <p:spTgt spid="3">
-                                            <p:txEl>
-                                              <p:pRg st="12" end="12"/>
-                                            </p:txEl>
-                                          </p:spTgt>
-                                        </p:tgtEl>
-                                      </p:cBhvr>
-                                    </p:animEffect>
-                                  </p:childTnLst>
-                                </p:cTn>
-                              </p:par>
-                            </p:childTnLst>
-                          </p:cTn>
-                        </p:par>
-                      </p:childTnLst>
-                    </p:cTn>
-                  </p:par>
-                  <p:par>
-                    <p:cTn id="58" fill="hold">
-                      <p:stCondLst>
-                        <p:cond delay="indefinite"/>
-                      </p:stCondLst>
-                      <p:childTnLst>
-                        <p:par>
-                          <p:cTn id="59" fill="hold">
-                            <p:stCondLst>
-                              <p:cond delay="0"/>
-                            </p:stCondLst>
-                            <p:childTnLst>
-                              <p:par>
-                                <p:cTn id="60" presetID="10" presetClass="entr" presetSubtype="0" fill="hold" grpId="0" nodeType="clickEffect">
-                                  <p:stCondLst>
-                                    <p:cond delay="0"/>
-                                  </p:stCondLst>
-                                  <p:childTnLst>
-                                    <p:set>
-                                      <p:cBhvr>
-                                        <p:cTn id="61" dur="1" fill="hold">
-                                          <p:stCondLst>
-                                            <p:cond delay="0"/>
-                                          </p:stCondLst>
-                                        </p:cTn>
-                                        <p:tgtEl>
-                                          <p:spTgt spid="3">
-                                            <p:txEl>
-                                              <p:pRg st="13" end="13"/>
-                                            </p:txEl>
-                                          </p:spTgt>
-                                        </p:tgtEl>
-                                        <p:attrNameLst>
-                                          <p:attrName>style.visibility</p:attrName>
-                                        </p:attrNameLst>
-                                      </p:cBhvr>
-                                      <p:to>
-                                        <p:strVal val="visible"/>
-                                      </p:to>
-                                    </p:set>
-                                    <p:animEffect transition="in" filter="fade">
-                                      <p:cBhvr>
-                                        <p:cTn id="62" dur="500"/>
-                                        <p:tgtEl>
-                                          <p:spTgt spid="3">
-                                            <p:txEl>
-                                              <p:pRg st="13" end="13"/>
-                                            </p:txEl>
-                                          </p:spTgt>
-                                        </p:tgtEl>
-                                      </p:cBhvr>
-                                    </p:animEffect>
-                                  </p:childTnLst>
-                                </p:cTn>
-                              </p:par>
-                            </p:childTnLst>
-                          </p:cTn>
-                        </p:par>
-                      </p:childTnLst>
-                    </p:cTn>
-                  </p:par>
-                  <p:par>
-                    <p:cTn id="63" fill="hold">
-                      <p:stCondLst>
-                        <p:cond delay="indefinite"/>
-                      </p:stCondLst>
-                      <p:childTnLst>
-                        <p:par>
-                          <p:cTn id="64" fill="hold">
-                            <p:stCondLst>
-                              <p:cond delay="0"/>
-                            </p:stCondLst>
-                            <p:childTnLst>
-                              <p:par>
-                                <p:cTn id="65" presetID="10" presetClass="entr" presetSubtype="0" fill="hold" grpId="0" nodeType="clickEffect">
-                                  <p:stCondLst>
-                                    <p:cond delay="0"/>
-                                  </p:stCondLst>
-                                  <p:childTnLst>
-                                    <p:set>
-                                      <p:cBhvr>
-                                        <p:cTn id="66" dur="1" fill="hold">
-                                          <p:stCondLst>
-                                            <p:cond delay="0"/>
-                                          </p:stCondLst>
-                                        </p:cTn>
-                                        <p:tgtEl>
-                                          <p:spTgt spid="3">
-                                            <p:txEl>
-                                              <p:pRg st="14" end="14"/>
-                                            </p:txEl>
-                                          </p:spTgt>
-                                        </p:tgtEl>
-                                        <p:attrNameLst>
-                                          <p:attrName>style.visibility</p:attrName>
-                                        </p:attrNameLst>
-                                      </p:cBhvr>
-                                      <p:to>
-                                        <p:strVal val="visible"/>
-                                      </p:to>
-                                    </p:set>
-                                    <p:animEffect transition="in" filter="fade">
-                                      <p:cBhvr>
-                                        <p:cTn id="67" dur="500"/>
-                                        <p:tgtEl>
-                                          <p:spTgt spid="3">
-                                            <p:txEl>
-                                              <p:pRg st="14" end="14"/>
-                                            </p:txEl>
-                                          </p:spTgt>
+                                          <p:spTgt spid="7"/>
                                         </p:tgtEl>
                                       </p:cBhvr>
                                     </p:animEffect>
@@ -6406,7 +6255,10 @@
       </p:par>
     </p:tnLst>
     <p:bldLst>
+      <p:bldP spid="2" grpId="0"/>
       <p:bldP spid="3" grpId="0" build="p"/>
+      <p:bldP spid="5" grpId="0"/>
+      <p:bldP spid="7" grpId="0"/>
     </p:bldLst>
   </p:timing>
 </p:sld>
@@ -8119,6 +7971,59 @@
                       </p:childTnLst>
                     </p:cTn>
                   </p:par>
+                  <p:par>
+                    <p:cTn id="86" fill="hold">
+                      <p:stCondLst>
+                        <p:cond delay="indefinite"/>
+                      </p:stCondLst>
+                      <p:childTnLst>
+                        <p:par>
+                          <p:cTn id="87" fill="hold">
+                            <p:stCondLst>
+                              <p:cond delay="0"/>
+                            </p:stCondLst>
+                            <p:childTnLst>
+                              <p:par>
+                                <p:cTn id="88" presetID="16" presetClass="entr" presetSubtype="21" fill="hold" grpId="0" nodeType="clickEffect">
+                                  <p:stCondLst>
+                                    <p:cond delay="0"/>
+                                  </p:stCondLst>
+                                  <p:childTnLst>
+                                    <p:set>
+                                      <p:cBhvr>
+                                        <p:cTn id="89" dur="1" fill="hold">
+                                          <p:stCondLst>
+                                            <p:cond delay="0"/>
+                                          </p:stCondLst>
+                                        </p:cTn>
+                                        <p:tgtEl>
+                                          <p:spTgt spid="2"/>
+                                        </p:tgtEl>
+                                        <p:attrNameLst>
+                                          <p:attrName>style.visibility</p:attrName>
+                                        </p:attrNameLst>
+                                      </p:cBhvr>
+                                      <p:to>
+                                        <p:strVal val="visible"/>
+                                      </p:to>
+                                    </p:set>
+                                    <p:animEffect transition="in" filter="barn(inVertical)">
+                                      <p:cBhvr>
+                                        <p:cTn id="90" dur="500"/>
+                                        <p:tgtEl>
+                                          <p:spTgt spid="2"/>
+                                        </p:tgtEl>
+                                      </p:cBhvr>
+                                    </p:animEffect>
+                                  </p:childTnLst>
+                                </p:cTn>
+                              </p:par>
+                            </p:childTnLst>
+                          </p:cTn>
+                        </p:par>
+                      </p:childTnLst>
+                    </p:cTn>
+                  </p:par>
                 </p:childTnLst>
               </p:cTn>
               <p:prevCondLst>
@@ -8141,6 +8046,7 @@
       </p:par>
     </p:tnLst>
     <p:bldLst>
+      <p:bldP spid="2" grpId="0"/>
       <p:bldP spid="3" grpId="0" build="p"/>
       <p:bldP spid="5" grpId="0"/>
     </p:bldLst>
@@ -8431,6 +8337,947 @@
   <p:clrMapOvr>
     <a:masterClrMapping/>
   </p:clrMapOvr>
+  <p:timing>
+    <p:tnLst>
+      <p:par>
+        <p:cTn id="1" dur="indefinite" restart="never" nodeType="tmRoot">
+          <p:childTnLst>
+            <p:seq concurrent="1" nextAc="seek">
+              <p:cTn id="2" dur="indefinite" nodeType="mainSeq">
+                <p:childTnLst>
+                  <p:par>
+                    <p:cTn id="3" fill="hold">
+                      <p:stCondLst>
+                        <p:cond delay="indefinite"/>
+                      </p:stCondLst>
+                      <p:childTnLst>
+                        <p:par>
+                          <p:cTn id="4" fill="hold">
+                            <p:stCondLst>
+                              <p:cond delay="0"/>
+                            </p:stCondLst>
+                            <p:childTnLst>
+                              <p:par>
+                                <p:cTn id="5" presetID="16" presetClass="entr" presetSubtype="21" fill="hold" grpId="0" nodeType="clickEffect">
+                                  <p:stCondLst>
+                                    <p:cond delay="0"/>
+                                  </p:stCondLst>
+                                  <p:childTnLst>
+                                    <p:set>
+                                      <p:cBhvr>
+                                        <p:cTn id="6" dur="1" fill="hold">
+                                          <p:stCondLst>
+                                            <p:cond delay="0"/>
+                                          </p:stCondLst>
+                                        </p:cTn>
+                                        <p:tgtEl>
+                                          <p:spTgt spid="2"/>
+                                        </p:tgtEl>
+                                        <p:attrNameLst>
+                                          <p:attrName>style.visibility</p:attrName>
+                                        </p:attrNameLst>
+                                      </p:cBhvr>
+                                      <p:to>
+                                        <p:strVal val="visible"/>
+                                      </p:to>
+                                    </p:set>
+                                    <p:animEffect transition="in" filter="barn(inVertical)">
+                                      <p:cBhvr>
+                                        <p:cTn id="7" dur="500"/>
+                                        <p:tgtEl>
+                                          <p:spTgt spid="2"/>
+                                        </p:tgtEl>
+                                      </p:cBhvr>
+                                    </p:animEffect>
+                                  </p:childTnLst>
+                                </p:cTn>
+                              </p:par>
+                            </p:childTnLst>
+                          </p:cTn>
+                        </p:par>
+                      </p:childTnLst>
+                    </p:cTn>
+                  </p:par>
+                  <p:par>
+                    <p:cTn id="8" fill="hold">
+                      <p:stCondLst>
+                        <p:cond delay="indefinite"/>
+                      </p:stCondLst>
+                      <p:childTnLst>
+                        <p:par>
+                          <p:cTn id="9" fill="hold">
+                            <p:stCondLst>
+                              <p:cond delay="0"/>
+                            </p:stCondLst>
+                            <p:childTnLst>
+                              <p:par>
+                                <p:cTn id="10" presetID="10" presetClass="entr" presetSubtype="0" fill="hold" grpId="0" nodeType="clickEffect">
+                                  <p:stCondLst>
+                                    <p:cond delay="0"/>
+                                  </p:stCondLst>
+                                  <p:childTnLst>
+                                    <p:set>
+                                      <p:cBhvr>
+                                        <p:cTn id="11" dur="1" fill="hold">
+                                          <p:stCondLst>
+                                            <p:cond delay="0"/>
+                                          </p:stCondLst>
+                                        </p:cTn>
+                                        <p:tgtEl>
+                                          <p:spTgt spid="3">
+                                            <p:txEl>
+                                              <p:pRg st="0" end="0"/>
+                                            </p:txEl>
+                                          </p:spTgt>
+                                        </p:tgtEl>
+                                        <p:attrNameLst>
+                                          <p:attrName>style.visibility</p:attrName>
+                                        </p:attrNameLst>
+                                      </p:cBhvr>
+                                      <p:to>
+                                        <p:strVal val="visible"/>
+                                      </p:to>
+                                    </p:set>
+                                    <p:animEffect transition="in" filter="fade">
+                                      <p:cBhvr>
+                                        <p:cTn id="12" dur="500"/>
+                                        <p:tgtEl>
+                                          <p:spTgt spid="3">
+                                            <p:txEl>
+                                              <p:pRg st="0" end="0"/>
+                                            </p:txEl>
+                                          </p:spTgt>
+                                        </p:tgtEl>
+                                      </p:cBhvr>
+                                    </p:animEffect>
+                                  </p:childTnLst>
+                                </p:cTn>
+                              </p:par>
+                            </p:childTnLst>
+                          </p:cTn>
+                        </p:par>
+                      </p:childTnLst>
+                    </p:cTn>
+                  </p:par>
+                  <p:par>
+                    <p:cTn id="13" fill="hold">
+                      <p:stCondLst>
+                        <p:cond delay="indefinite"/>
+                      </p:stCondLst>
+                      <p:childTnLst>
+                        <p:par>
+                          <p:cTn id="14" fill="hold">
+                            <p:stCondLst>
+                              <p:cond delay="0"/>
+                            </p:stCondLst>
+                            <p:childTnLst>
+                              <p:par>
+                                <p:cTn id="15" presetID="10" presetClass="entr" presetSubtype="0" fill="hold" grpId="0" nodeType="clickEffect">
+                                  <p:stCondLst>
+                                    <p:cond delay="0"/>
+                                  </p:stCondLst>
+                                  <p:childTnLst>
+                                    <p:set>
+                                      <p:cBhvr>
+                                        <p:cTn id="16" dur="1" fill="hold">
+                                          <p:stCondLst>
+                                            <p:cond delay="0"/>
+                                          </p:stCondLst>
+                                        </p:cTn>
+                                        <p:tgtEl>
+                                          <p:spTgt spid="3">
+                                            <p:txEl>
+                                              <p:pRg st="1" end="1"/>
+                                            </p:txEl>
+                                          </p:spTgt>
+                                        </p:tgtEl>
+                                        <p:attrNameLst>
+                                          <p:attrName>style.visibility</p:attrName>
+                                        </p:attrNameLst>
+                                      </p:cBhvr>
+                                      <p:to>
+                                        <p:strVal val="visible"/>
+                                      </p:to>
+                                    </p:set>
+                                    <p:animEffect transition="in" filter="fade">
+                                      <p:cBhvr>
+                                        <p:cTn id="17" dur="500"/>
+                                        <p:tgtEl>
+                                          <p:spTgt spid="3">
+                                            <p:txEl>
+                                              <p:pRg st="1" end="1"/>
+                                            </p:txEl>
+                                          </p:spTgt>
+                                        </p:tgtEl>
+                                      </p:cBhvr>
+                                    </p:animEffect>
+                                  </p:childTnLst>
+                                </p:cTn>
+                              </p:par>
+                            </p:childTnLst>
+                          </p:cTn>
+                        </p:par>
+                      </p:childTnLst>
+                    </p:cTn>
+                  </p:par>
+                  <p:par>
+                    <p:cTn id="18" fill="hold">
+                      <p:stCondLst>
+                        <p:cond delay="indefinite"/>
+                      </p:stCondLst>
+                      <p:childTnLst>
+                        <p:par>
+                          <p:cTn id="19" fill="hold">
+                            <p:stCondLst>
+                              <p:cond delay="0"/>
+                            </p:stCondLst>
+                            <p:childTnLst>
+                              <p:par>
+                                <p:cTn id="20" presetID="10" presetClass="entr" presetSubtype="0" fill="hold" grpId="0" nodeType="clickEffect">
+                                  <p:stCondLst>
+                                    <p:cond delay="0"/>
+                                  </p:stCondLst>
+                                  <p:childTnLst>
+                                    <p:set>
+                                      <p:cBhvr>
+                                        <p:cTn id="21" dur="1" fill="hold">
+                                          <p:stCondLst>
+                                            <p:cond delay="0"/>
+                                          </p:stCondLst>
+                                        </p:cTn>
+                                        <p:tgtEl>
+                                          <p:spTgt spid="3">
+                                            <p:txEl>
+                                              <p:pRg st="2" end="2"/>
+                                            </p:txEl>
+                                          </p:spTgt>
+                                        </p:tgtEl>
+                                        <p:attrNameLst>
+                                          <p:attrName>style.visibility</p:attrName>
+                                        </p:attrNameLst>
+                                      </p:cBhvr>
+                                      <p:to>
+                                        <p:strVal val="visible"/>
+                                      </p:to>
+                                    </p:set>
+                                    <p:animEffect transition="in" filter="fade">
+                                      <p:cBhvr>
+                                        <p:cTn id="22" dur="500"/>
+                                        <p:tgtEl>
+                                          <p:spTgt spid="3">
+                                            <p:txEl>
+                                              <p:pRg st="2" end="2"/>
+                                            </p:txEl>
+                                          </p:spTgt>
+                                        </p:tgtEl>
+                                      </p:cBhvr>
+                                    </p:animEffect>
+                                  </p:childTnLst>
+                                </p:cTn>
+                              </p:par>
+                            </p:childTnLst>
+                          </p:cTn>
+                        </p:par>
+                      </p:childTnLst>
+                    </p:cTn>
+                  </p:par>
+                  <p:par>
+                    <p:cTn id="23" fill="hold">
+                      <p:stCondLst>
+                        <p:cond delay="indefinite"/>
+                      </p:stCondLst>
+                      <p:childTnLst>
+                        <p:par>
+                          <p:cTn id="24" fill="hold">
+                            <p:stCondLst>
+                              <p:cond delay="0"/>
+                            </p:stCondLst>
+                            <p:childTnLst>
+                              <p:par>
+                                <p:cTn id="25" presetID="10" presetClass="entr" presetSubtype="0" fill="hold" grpId="0" nodeType="clickEffect">
+                                  <p:stCondLst>
+                                    <p:cond delay="0"/>
+                                  </p:stCondLst>
+                                  <p:childTnLst>
+                                    <p:set>
+                                      <p:cBhvr>
+                                        <p:cTn id="26" dur="1" fill="hold">
+                                          <p:stCondLst>
+                                            <p:cond delay="0"/>
+                                          </p:stCondLst>
+                                        </p:cTn>
+                                        <p:tgtEl>
+                                          <p:spTgt spid="3">
+                                            <p:txEl>
+                                              <p:pRg st="3" end="3"/>
+                                            </p:txEl>
+                                          </p:spTgt>
+                                        </p:tgtEl>
+                                        <p:attrNameLst>
+                                          <p:attrName>style.visibility</p:attrName>
+                                        </p:attrNameLst>
+                                      </p:cBhvr>
+                                      <p:to>
+                                        <p:strVal val="visible"/>
+                                      </p:to>
+                                    </p:set>
+                                    <p:animEffect transition="in" filter="fade">
+                                      <p:cBhvr>
+                                        <p:cTn id="27" dur="500"/>
+                                        <p:tgtEl>
+                                          <p:spTgt spid="3">
+                                            <p:txEl>
+                                              <p:pRg st="3" end="3"/>
+                                            </p:txEl>
+                                          </p:spTgt>
+                                        </p:tgtEl>
+                                      </p:cBhvr>
+                                    </p:animEffect>
+                                  </p:childTnLst>
+                                </p:cTn>
+                              </p:par>
+                            </p:childTnLst>
+                          </p:cTn>
+                        </p:par>
+                      </p:childTnLst>
+                    </p:cTn>
+                  </p:par>
+                  <p:par>
+                    <p:cTn id="28" fill="hold">
+                      <p:stCondLst>
+                        <p:cond delay="indefinite"/>
+                      </p:stCondLst>
+                      <p:childTnLst>
+                        <p:par>
+                          <p:cTn id="29" fill="hold">
+                            <p:stCondLst>
+                              <p:cond delay="0"/>
+                            </p:stCondLst>
+                            <p:childTnLst>
+                              <p:par>
+                                <p:cTn id="30" presetID="10" presetClass="entr" presetSubtype="0" fill="hold" grpId="0" nodeType="clickEffect">
+                                  <p:stCondLst>
+                                    <p:cond delay="0"/>
+                                  </p:stCondLst>
+                                  <p:childTnLst>
+                                    <p:set>
+                                      <p:cBhvr>
+                                        <p:cTn id="31" dur="1" fill="hold">
+                                          <p:stCondLst>
+                                            <p:cond delay="0"/>
+                                          </p:stCondLst>
+                                        </p:cTn>
+                                        <p:tgtEl>
+                                          <p:spTgt spid="3">
+                                            <p:txEl>
+                                              <p:pRg st="4" end="4"/>
+                                            </p:txEl>
+                                          </p:spTgt>
+                                        </p:tgtEl>
+                                        <p:attrNameLst>
+                                          <p:attrName>style.visibility</p:attrName>
+                                        </p:attrNameLst>
+                                      </p:cBhvr>
+                                      <p:to>
+                                        <p:strVal val="visible"/>
+                                      </p:to>
+                                    </p:set>
+                                    <p:animEffect transition="in" filter="fade">
+                                      <p:cBhvr>
+                                        <p:cTn id="32" dur="500"/>
+                                        <p:tgtEl>
+                                          <p:spTgt spid="3">
+                                            <p:txEl>
+                                              <p:pRg st="4" end="4"/>
+                                            </p:txEl>
+                                          </p:spTgt>
+                                        </p:tgtEl>
+                                      </p:cBhvr>
+                                    </p:animEffect>
+                                  </p:childTnLst>
+                                </p:cTn>
+                              </p:par>
+                            </p:childTnLst>
+                          </p:cTn>
+                        </p:par>
+                      </p:childTnLst>
+                    </p:cTn>
+                  </p:par>
+                  <p:par>
+                    <p:cTn id="33" fill="hold">
+                      <p:stCondLst>
+                        <p:cond delay="indefinite"/>
+                      </p:stCondLst>
+                      <p:childTnLst>
+                        <p:par>
+                          <p:cTn id="34" fill="hold">
+                            <p:stCondLst>
+                              <p:cond delay="0"/>
+                            </p:stCondLst>
+                            <p:childTnLst>
+                              <p:par>
+                                <p:cTn id="35" presetID="10" presetClass="entr" presetSubtype="0" fill="hold" grpId="0" nodeType="clickEffect">
+                                  <p:stCondLst>
+                                    <p:cond delay="0"/>
+                                  </p:stCondLst>
+                                  <p:childTnLst>
+                                    <p:set>
+                                      <p:cBhvr>
+                                        <p:cTn id="36" dur="1" fill="hold">
+                                          <p:stCondLst>
+                                            <p:cond delay="0"/>
+                                          </p:stCondLst>
+                                        </p:cTn>
+                                        <p:tgtEl>
+                                          <p:spTgt spid="3">
+                                            <p:txEl>
+                                              <p:pRg st="6" end="6"/>
+                                            </p:txEl>
+                                          </p:spTgt>
+                                        </p:tgtEl>
+                                        <p:attrNameLst>
+                                          <p:attrName>style.visibility</p:attrName>
+                                        </p:attrNameLst>
+                                      </p:cBhvr>
+                                      <p:to>
+                                        <p:strVal val="visible"/>
+                                      </p:to>
+                                    </p:set>
+                                    <p:animEffect transition="in" filter="fade">
+                                      <p:cBhvr>
+                                        <p:cTn id="37" dur="500"/>
+                                        <p:tgtEl>
+                                          <p:spTgt spid="3">
+                                            <p:txEl>
+                                              <p:pRg st="6" end="6"/>
+                                            </p:txEl>
+                                          </p:spTgt>
+                                        </p:tgtEl>
+                                      </p:cBhvr>
+                                    </p:animEffect>
+                                  </p:childTnLst>
+                                </p:cTn>
+                              </p:par>
+                            </p:childTnLst>
+                          </p:cTn>
+                        </p:par>
+                      </p:childTnLst>
+                    </p:cTn>
+                  </p:par>
+                  <p:par>
+                    <p:cTn id="38" fill="hold">
+                      <p:stCondLst>
+                        <p:cond delay="indefinite"/>
+                      </p:stCondLst>
+                      <p:childTnLst>
+                        <p:par>
+                          <p:cTn id="39" fill="hold">
+                            <p:stCondLst>
+                              <p:cond delay="0"/>
+                            </p:stCondLst>
+                            <p:childTnLst>
+                              <p:par>
+                                <p:cTn id="40" presetID="10" presetClass="entr" presetSubtype="0" fill="hold" grpId="0" nodeType="clickEffect">
+                                  <p:stCondLst>
+                                    <p:cond delay="0"/>
+                                  </p:stCondLst>
+                                  <p:childTnLst>
+                                    <p:set>
+                                      <p:cBhvr>
+                                        <p:cTn id="41" dur="1" fill="hold">
+                                          <p:stCondLst>
+                                            <p:cond delay="0"/>
+                                          </p:stCondLst>
+                                        </p:cTn>
+                                        <p:tgtEl>
+                                          <p:spTgt spid="3">
+                                            <p:txEl>
+                                              <p:pRg st="7" end="7"/>
+                                            </p:txEl>
+                                          </p:spTgt>
+                                        </p:tgtEl>
+                                        <p:attrNameLst>
+                                          <p:attrName>style.visibility</p:attrName>
+                                        </p:attrNameLst>
+                                      </p:cBhvr>
+                                      <p:to>
+                                        <p:strVal val="visible"/>
+                                      </p:to>
+                                    </p:set>
+                                    <p:animEffect transition="in" filter="fade">
+                                      <p:cBhvr>
+                                        <p:cTn id="42" dur="500"/>
+                                        <p:tgtEl>
+                                          <p:spTgt spid="3">
+                                            <p:txEl>
+                                              <p:pRg st="7" end="7"/>
+                                            </p:txEl>
+                                          </p:spTgt>
+                                        </p:tgtEl>
+                                      </p:cBhvr>
+                                    </p:animEffect>
+                                  </p:childTnLst>
+                                </p:cTn>
+                              </p:par>
+                            </p:childTnLst>
+                          </p:cTn>
+                        </p:par>
+                      </p:childTnLst>
+                    </p:cTn>
+                  </p:par>
+                  <p:par>
+                    <p:cTn id="43" fill="hold">
+                      <p:stCondLst>
+                        <p:cond delay="indefinite"/>
+                      </p:stCondLst>
+                      <p:childTnLst>
+                        <p:par>
+                          <p:cTn id="44" fill="hold">
+                            <p:stCondLst>
+                              <p:cond delay="0"/>
+                            </p:stCondLst>
+                            <p:childTnLst>
+                              <p:par>
+                                <p:cTn id="45" presetID="10" presetClass="entr" presetSubtype="0" fill="hold" grpId="0" nodeType="clickEffect">
+                                  <p:stCondLst>
+                                    <p:cond delay="0"/>
+                                  </p:stCondLst>
+                                  <p:childTnLst>
+                                    <p:set>
+                                      <p:cBhvr>
+                                        <p:cTn id="46" dur="1" fill="hold">
+                                          <p:stCondLst>
+                                            <p:cond delay="0"/>
+                                          </p:stCondLst>
+                                        </p:cTn>
+                                        <p:tgtEl>
+                                          <p:spTgt spid="3">
+                                            <p:txEl>
+                                              <p:pRg st="8" end="8"/>
+                                            </p:txEl>
+                                          </p:spTgt>
+                                        </p:tgtEl>
+                                        <p:attrNameLst>
+                                          <p:attrName>style.visibility</p:attrName>
+                                        </p:attrNameLst>
+                                      </p:cBhvr>
+                                      <p:to>
+                                        <p:strVal val="visible"/>
+                                      </p:to>
+                                    </p:set>
+                                    <p:animEffect transition="in" filter="fade">
+                                      <p:cBhvr>
+                                        <p:cTn id="47" dur="500"/>
+                                        <p:tgtEl>
+                                          <p:spTgt spid="3">
+                                            <p:txEl>
+                                              <p:pRg st="8" end="8"/>
+                                            </p:txEl>
+                                          </p:spTgt>
+                                        </p:tgtEl>
+                                      </p:cBhvr>
+                                    </p:animEffect>
+                                  </p:childTnLst>
+                                </p:cTn>
+                              </p:par>
+                            </p:childTnLst>
+                          </p:cTn>
+                        </p:par>
+                      </p:childTnLst>
+                    </p:cTn>
+                  </p:par>
+                  <p:par>
+                    <p:cTn id="48" fill="hold">
+                      <p:stCondLst>
+                        <p:cond delay="indefinite"/>
+                      </p:stCondLst>
+                      <p:childTnLst>
+                        <p:par>
+                          <p:cTn id="49" fill="hold">
+                            <p:stCondLst>
+                              <p:cond delay="0"/>
+                            </p:stCondLst>
+                            <p:childTnLst>
+                              <p:par>
+                                <p:cTn id="50" presetID="10" presetClass="entr" presetSubtype="0" fill="hold" grpId="0" nodeType="clickEffect">
+                                  <p:stCondLst>
+                                    <p:cond delay="0"/>
+                                  </p:stCondLst>
+                                  <p:childTnLst>
+                                    <p:set>
+                                      <p:cBhvr>
+                                        <p:cTn id="51" dur="1" fill="hold">
+                                          <p:stCondLst>
+                                            <p:cond delay="0"/>
+                                          </p:stCondLst>
+                                        </p:cTn>
+                                        <p:tgtEl>
+                                          <p:spTgt spid="3">
+                                            <p:txEl>
+                                              <p:pRg st="9" end="9"/>
+                                            </p:txEl>
+                                          </p:spTgt>
+                                        </p:tgtEl>
+                                        <p:attrNameLst>
+                                          <p:attrName>style.visibility</p:attrName>
+                                        </p:attrNameLst>
+                                      </p:cBhvr>
+                                      <p:to>
+                                        <p:strVal val="visible"/>
+                                      </p:to>
+                                    </p:set>
+                                    <p:animEffect transition="in" filter="fade">
+                                      <p:cBhvr>
+                                        <p:cTn id="52" dur="500"/>
+                                        <p:tgtEl>
+                                          <p:spTgt spid="3">
+                                            <p:txEl>
+                                              <p:pRg st="9" end="9"/>
+                                            </p:txEl>
+                                          </p:spTgt>
+                                        </p:tgtEl>
+                                      </p:cBhvr>
+                                    </p:animEffect>
+                                  </p:childTnLst>
+                                </p:cTn>
+                              </p:par>
+                            </p:childTnLst>
+                          </p:cTn>
+                        </p:par>
+                      </p:childTnLst>
+                    </p:cTn>
+                  </p:par>
+                  <p:par>
+                    <p:cTn id="53" fill="hold">
+                      <p:stCondLst>
+                        <p:cond delay="indefinite"/>
+                      </p:stCondLst>
+                      <p:childTnLst>
+                        <p:par>
+                          <p:cTn id="54" fill="hold">
+                            <p:stCondLst>
+                              <p:cond delay="0"/>
+                            </p:stCondLst>
+                            <p:childTnLst>
+                              <p:par>
+                                <p:cTn id="55" presetID="10" presetClass="entr" presetSubtype="0" fill="hold" grpId="0" nodeType="clickEffect">
+                                  <p:stCondLst>
+                                    <p:cond delay="0"/>
+                                  </p:stCondLst>
+                                  <p:childTnLst>
+                                    <p:set>
+                                      <p:cBhvr>
+                                        <p:cTn id="56" dur="1" fill="hold">
+                                          <p:stCondLst>
+                                            <p:cond delay="0"/>
+                                          </p:stCondLst>
+                                        </p:cTn>
+                                        <p:tgtEl>
+                                          <p:spTgt spid="3">
+                                            <p:txEl>
+                                              <p:pRg st="10" end="10"/>
+                                            </p:txEl>
+                                          </p:spTgt>
+                                        </p:tgtEl>
+                                        <p:attrNameLst>
+                                          <p:attrName>style.visibility</p:attrName>
+                                        </p:attrNameLst>
+                                      </p:cBhvr>
+                                      <p:to>
+                                        <p:strVal val="visible"/>
+                                      </p:to>
+                                    </p:set>
+                                    <p:animEffect transition="in" filter="fade">
+                                      <p:cBhvr>
+                                        <p:cTn id="57" dur="500"/>
+                                        <p:tgtEl>
+                                          <p:spTgt spid="3">
+                                            <p:txEl>
+                                              <p:pRg st="10" end="10"/>
+                                            </p:txEl>
+                                          </p:spTgt>
+                                        </p:tgtEl>
+                                      </p:cBhvr>
+                                    </p:animEffect>
+                                  </p:childTnLst>
+                                </p:cTn>
+                              </p:par>
+                            </p:childTnLst>
+                          </p:cTn>
+                        </p:par>
+                      </p:childTnLst>
+                    </p:cTn>
+                  </p:par>
+                  <p:par>
+                    <p:cTn id="58" fill="hold">
+                      <p:stCondLst>
+                        <p:cond delay="indefinite"/>
+                      </p:stCondLst>
+                      <p:childTnLst>
+                        <p:par>
+                          <p:cTn id="59" fill="hold">
+                            <p:stCondLst>
+                              <p:cond delay="0"/>
+                            </p:stCondLst>
+                            <p:childTnLst>
+                              <p:par>
+                                <p:cTn id="60" presetID="10" presetClass="entr" presetSubtype="0" fill="hold" grpId="0" nodeType="clickEffect">
+                                  <p:stCondLst>
+                                    <p:cond delay="0"/>
+                                  </p:stCondLst>
+                                  <p:childTnLst>
+                                    <p:set>
+                                      <p:cBhvr>
+                                        <p:cTn id="61" dur="1" fill="hold">
+                                          <p:stCondLst>
+                                            <p:cond delay="0"/>
+                                          </p:stCondLst>
+                                        </p:cTn>
+                                        <p:tgtEl>
+                                          <p:spTgt spid="3">
+                                            <p:txEl>
+                                              <p:pRg st="12" end="12"/>
+                                            </p:txEl>
+                                          </p:spTgt>
+                                        </p:tgtEl>
+                                        <p:attrNameLst>
+                                          <p:attrName>style.visibility</p:attrName>
+                                        </p:attrNameLst>
+                                      </p:cBhvr>
+                                      <p:to>
+                                        <p:strVal val="visible"/>
+                                      </p:to>
+                                    </p:set>
+                                    <p:animEffect transition="in" filter="fade">
+                                      <p:cBhvr>
+                                        <p:cTn id="62" dur="500"/>
+                                        <p:tgtEl>
+                                          <p:spTgt spid="3">
+                                            <p:txEl>
+                                              <p:pRg st="12" end="12"/>
+                                            </p:txEl>
+                                          </p:spTgt>
+                                        </p:tgtEl>
+                                      </p:cBhvr>
+                                    </p:animEffect>
+                                  </p:childTnLst>
+                                </p:cTn>
+                              </p:par>
+                            </p:childTnLst>
+                          </p:cTn>
+                        </p:par>
+                      </p:childTnLst>
+                    </p:cTn>
+                  </p:par>
+                  <p:par>
+                    <p:cTn id="63" fill="hold">
+                      <p:stCondLst>
+                        <p:cond delay="indefinite"/>
+                      </p:stCondLst>
+                      <p:childTnLst>
+                        <p:par>
+                          <p:cTn id="64" fill="hold">
+                            <p:stCondLst>
+                              <p:cond delay="0"/>
+                            </p:stCondLst>
+                            <p:childTnLst>
+                              <p:par>
+                                <p:cTn id="65" presetID="10" presetClass="entr" presetSubtype="0" fill="hold" grpId="0" nodeType="clickEffect">
+                                  <p:stCondLst>
+                                    <p:cond delay="0"/>
+                                  </p:stCondLst>
+                                  <p:childTnLst>
+                                    <p:set>
+                                      <p:cBhvr>
+                                        <p:cTn id="66" dur="1" fill="hold">
+                                          <p:stCondLst>
+                                            <p:cond delay="0"/>
+                                          </p:stCondLst>
+                                        </p:cTn>
+                                        <p:tgtEl>
+                                          <p:spTgt spid="3">
+                                            <p:txEl>
+                                              <p:pRg st="13" end="13"/>
+                                            </p:txEl>
+                                          </p:spTgt>
+                                        </p:tgtEl>
+                                        <p:attrNameLst>
+                                          <p:attrName>style.visibility</p:attrName>
+                                        </p:attrNameLst>
+                                      </p:cBhvr>
+                                      <p:to>
+                                        <p:strVal val="visible"/>
+                                      </p:to>
+                                    </p:set>
+                                    <p:animEffect transition="in" filter="fade">
+                                      <p:cBhvr>
+                                        <p:cTn id="67" dur="500"/>
+                                        <p:tgtEl>
+                                          <p:spTgt spid="3">
+                                            <p:txEl>
+                                              <p:pRg st="13" end="13"/>
+                                            </p:txEl>
+                                          </p:spTgt>
+                                        </p:tgtEl>
+                                      </p:cBhvr>
+                                    </p:animEffect>
+                                  </p:childTnLst>
+                                </p:cTn>
+                              </p:par>
+                            </p:childTnLst>
+                          </p:cTn>
+                        </p:par>
+                      </p:childTnLst>
+                    </p:cTn>
+                  </p:par>
+                  <p:par>
+                    <p:cTn id="68" fill="hold">
+                      <p:stCondLst>
+                        <p:cond delay="indefinite"/>
+                      </p:stCondLst>
+                      <p:childTnLst>
+                        <p:par>
+                          <p:cTn id="69" fill="hold">
+                            <p:stCondLst>
+                              <p:cond delay="0"/>
+                            </p:stCondLst>
+                            <p:childTnLst>
+                              <p:par>
+                                <p:cTn id="70" presetID="10" presetClass="entr" presetSubtype="0" fill="hold" grpId="0" nodeType="clickEffect">
+                                  <p:stCondLst>
+                                    <p:cond delay="0"/>
+                                  </p:stCondLst>
+                                  <p:childTnLst>
+                                    <p:set>
+                                      <p:cBhvr>
+                                        <p:cTn id="71" dur="1" fill="hold">
+                                          <p:stCondLst>
+                                            <p:cond delay="0"/>
+                                          </p:stCondLst>
+                                        </p:cTn>
+                                        <p:tgtEl>
+                                          <p:spTgt spid="3">
+                                            <p:txEl>
+                                              <p:pRg st="14" end="14"/>
+                                            </p:txEl>
+                                          </p:spTgt>
+                                        </p:tgtEl>
+                                        <p:attrNameLst>
+                                          <p:attrName>style.visibility</p:attrName>
+                                        </p:attrNameLst>
+                                      </p:cBhvr>
+                                      <p:to>
+                                        <p:strVal val="visible"/>
+                                      </p:to>
+                                    </p:set>
+                                    <p:animEffect transition="in" filter="fade">
+                                      <p:cBhvr>
+                                        <p:cTn id="72" dur="500"/>
+                                        <p:tgtEl>
+                                          <p:spTgt spid="3">
+                                            <p:txEl>
+                                              <p:pRg st="14" end="14"/>
+                                            </p:txEl>
+                                          </p:spTgt>
+                                        </p:tgtEl>
+                                      </p:cBhvr>
+                                    </p:animEffect>
+                                  </p:childTnLst>
+                                </p:cTn>
+                              </p:par>
+                            </p:childTnLst>
+                          </p:cTn>
+                        </p:par>
+                      </p:childTnLst>
+                    </p:cTn>
+                  </p:par>
+                  <p:par>
+                    <p:cTn id="73" fill="hold">
+                      <p:stCondLst>
+                        <p:cond delay="indefinite"/>
+                      </p:stCondLst>
+                      <p:childTnLst>
+                        <p:par>
+                          <p:cTn id="74" fill="hold">
+                            <p:stCondLst>
+                              <p:cond delay="0"/>
+                            </p:stCondLst>
+                            <p:childTnLst>
+                              <p:par>
+                                <p:cTn id="75" presetID="10" presetClass="entr" presetSubtype="0" fill="hold" grpId="0" nodeType="clickEffect">
+                                  <p:stCondLst>
+                                    <p:cond delay="0"/>
+                                  </p:stCondLst>
+                                  <p:childTnLst>
+                                    <p:set>
+                                      <p:cBhvr>
+                                        <p:cTn id="76" dur="1" fill="hold">
+                                          <p:stCondLst>
+                                            <p:cond delay="0"/>
+                                          </p:stCondLst>
+                                        </p:cTn>
+                                        <p:tgtEl>
+                                          <p:spTgt spid="3">
+                                            <p:txEl>
+                                              <p:pRg st="15" end="15"/>
+                                            </p:txEl>
+                                          </p:spTgt>
+                                        </p:tgtEl>
+                                        <p:attrNameLst>
+                                          <p:attrName>style.visibility</p:attrName>
+                                        </p:attrNameLst>
+                                      </p:cBhvr>
+                                      <p:to>
+                                        <p:strVal val="visible"/>
+                                      </p:to>
+                                    </p:set>
+                                    <p:animEffect transition="in" filter="fade">
+                                      <p:cBhvr>
+                                        <p:cTn id="77" dur="500"/>
+                                        <p:tgtEl>
+                                          <p:spTgt spid="3">
+                                            <p:txEl>
+                                              <p:pRg st="15" end="15"/>
+                                            </p:txEl>
+                                          </p:spTgt>
+                                        </p:tgtEl>
+                                      </p:cBhvr>
+                                    </p:animEffect>
+                                  </p:childTnLst>
+                                </p:cTn>
+                              </p:par>
+                            </p:childTnLst>
+                          </p:cTn>
+                        </p:par>
+                      </p:childTnLst>
+                    </p:cTn>
+                  </p:par>
+                </p:childTnLst>
+              </p:cTn>
+              <p:prevCondLst>
+                <p:cond evt="onPrev" delay="0">
+                  <p:tgtEl>
+                    <p:sldTgt/>
+                  </p:tgtEl>
+                </p:cond>
+              </p:prevCondLst>
+              <p:nextCondLst>
+                <p:cond evt="onNext" delay="0">
+                  <p:tgtEl>
+                    <p:sldTgt/>
+                  </p:tgtEl>
+                </p:cond>
+              </p:nextCondLst>
+            </p:seq>
+          </p:childTnLst>
+        </p:cTn>
+      </p:par>
+    </p:tnLst>
+    <p:bldLst>
+      <p:bldP spid="2" grpId="0"/>
+      <p:bldP spid="3" grpId="0" build="p"/>
+    </p:bldLst>
+  </p:timing>
 </p:sld>
 </file>
 
@@ -8501,13 +9348,13 @@
         </p:nvSpPr>
         <p:spPr>
           <a:xfrm>
-            <a:off x="770467" y="3674532"/>
-            <a:ext cx="10515600" cy="2646363"/>
+            <a:off x="804333" y="3943084"/>
+            <a:ext cx="10515600" cy="2104495"/>
           </a:xfrm>
         </p:spPr>
         <p:txBody>
           <a:bodyPr>
-            <a:normAutofit/>
+            <a:normAutofit fontScale="92500" lnSpcReduction="20000"/>
           </a:bodyPr>
           <a:lstStyle/>
           <a:p>
@@ -8585,13 +9432,13 @@
           <p:nvPr>
             <p:extLst>
               <p:ext uri="{D42A27DB-BD31-4B8C-83A1-F6EECF244321}">
-                <p14:modId xmlns:p14="http://schemas.microsoft.com/office/powerpoint/2010/main" val="3259907964"/>
+                <p14:modId xmlns:p14="http://schemas.microsoft.com/office/powerpoint/2010/main" val="1661135412"/>
               </p:ext>
             </p:extLst>
           </p:nvPr>
         </p:nvGraphicFramePr>
         <p:xfrm>
-          <a:off x="838200" y="1690688"/>
+          <a:off x="838200" y="1438010"/>
           <a:ext cx="10515600" cy="2489200"/>
         </p:xfrm>
         <a:graphic>
@@ -8914,6 +9761,390 @@
   <p:clrMapOvr>
     <a:masterClrMapping/>
   </p:clrMapOvr>
+  <p:timing>
+    <p:tnLst>
+      <p:par>
+        <p:cTn id="1" dur="indefinite" restart="never" nodeType="tmRoot">
+          <p:childTnLst>
+            <p:seq concurrent="1" nextAc="seek">
+              <p:cTn id="2" dur="indefinite" nodeType="mainSeq">
+                <p:childTnLst>
+                  <p:par>
+                    <p:cTn id="3" fill="hold">
+                      <p:stCondLst>
+                        <p:cond delay="indefinite"/>
+                      </p:stCondLst>
+                      <p:childTnLst>
+                        <p:par>
+                          <p:cTn id="4" fill="hold">
+                            <p:stCondLst>
+                              <p:cond delay="0"/>
+                            </p:stCondLst>
+                            <p:childTnLst>
+                              <p:par>
+                                <p:cTn id="5" presetID="16" presetClass="entr" presetSubtype="21" fill="hold" grpId="0" nodeType="clickEffect">
+                                  <p:stCondLst>
+                                    <p:cond delay="0"/>
+                                  </p:stCondLst>
+                                  <p:childTnLst>
+                                    <p:set>
+                                      <p:cBhvr>
+                                        <p:cTn id="6" dur="1" fill="hold">
+                                          <p:stCondLst>
+                                            <p:cond delay="0"/>
+                                          </p:stCondLst>
+                                        </p:cTn>
+                                        <p:tgtEl>
+                                          <p:spTgt spid="2"/>
+                                        </p:tgtEl>
+                                        <p:attrNameLst>
+                                          <p:attrName>style.visibility</p:attrName>
+                                        </p:attrNameLst>
+                                      </p:cBhvr>
+                                      <p:to>
+                                        <p:strVal val="visible"/>
+                                      </p:to>
+                                    </p:set>
+                                    <p:animEffect transition="in" filter="barn(inVertical)">
+                                      <p:cBhvr>
+                                        <p:cTn id="7" dur="500"/>
+                                        <p:tgtEl>
+                                          <p:spTgt spid="2"/>
+                                        </p:tgtEl>
+                                      </p:cBhvr>
+                                    </p:animEffect>
+                                  </p:childTnLst>
+                                </p:cTn>
+                              </p:par>
+                            </p:childTnLst>
+                          </p:cTn>
+                        </p:par>
+                      </p:childTnLst>
+                    </p:cTn>
+                  </p:par>
+                  <p:par>
+                    <p:cTn id="8" fill="hold">
+                      <p:stCondLst>
+                        <p:cond delay="indefinite"/>
+                      </p:stCondLst>
+                      <p:childTnLst>
+                        <p:par>
+                          <p:cTn id="9" fill="hold">
+                            <p:stCondLst>
+                              <p:cond delay="0"/>
+                            </p:stCondLst>
+                            <p:childTnLst>
+                              <p:par>
+                                <p:cTn id="10" presetID="22" presetClass="entr" presetSubtype="4" fill="hold" nodeType="clickEffect">
+                                  <p:stCondLst>
+                                    <p:cond delay="0"/>
+                                  </p:stCondLst>
+                                  <p:childTnLst>
+                                    <p:set>
+                                      <p:cBhvr>
+                                        <p:cTn id="11" dur="1" fill="hold">
+                                          <p:stCondLst>
+                                            <p:cond delay="0"/>
+                                          </p:stCondLst>
+                                        </p:cTn>
+                                        <p:tgtEl>
+                                          <p:spTgt spid="5"/>
+                                        </p:tgtEl>
+                                        <p:attrNameLst>
+                                          <p:attrName>style.visibility</p:attrName>
+                                        </p:attrNameLst>
+                                      </p:cBhvr>
+                                      <p:to>
+                                        <p:strVal val="visible"/>
+                                      </p:to>
+                                    </p:set>
+                                    <p:animEffect transition="in" filter="wipe(down)">
+                                      <p:cBhvr>
+                                        <p:cTn id="12" dur="500"/>
+                                        <p:tgtEl>
+                                          <p:spTgt spid="5"/>
+                                        </p:tgtEl>
+                                      </p:cBhvr>
+                                    </p:animEffect>
+                                  </p:childTnLst>
+                                </p:cTn>
+                              </p:par>
+                            </p:childTnLst>
+                          </p:cTn>
+                        </p:par>
+                      </p:childTnLst>
+                    </p:cTn>
+                  </p:par>
+                  <p:par>
+                    <p:cTn id="13" fill="hold">
+                      <p:stCondLst>
+                        <p:cond delay="indefinite"/>
+                      </p:stCondLst>
+                      <p:childTnLst>
+                        <p:par>
+                          <p:cTn id="14" fill="hold">
+                            <p:stCondLst>
+                              <p:cond delay="0"/>
+                            </p:stCondLst>
+                            <p:childTnLst>
+                              <p:par>
+                                <p:cTn id="15" presetID="10" presetClass="entr" presetSubtype="0" fill="hold" grpId="0" nodeType="clickEffect">
+                                  <p:stCondLst>
+                                    <p:cond delay="0"/>
+                                  </p:stCondLst>
+                                  <p:childTnLst>
+                                    <p:set>
+                                      <p:cBhvr>
+                                        <p:cTn id="16" dur="1" fill="hold">
+                                          <p:stCondLst>
+                                            <p:cond delay="0"/>
+                                          </p:stCondLst>
+                                        </p:cTn>
+                                        <p:tgtEl>
+                                          <p:spTgt spid="3">
+                                            <p:txEl>
+                                              <p:pRg st="1" end="1"/>
+                                            </p:txEl>
+                                          </p:spTgt>
+                                        </p:tgtEl>
+                                        <p:attrNameLst>
+                                          <p:attrName>style.visibility</p:attrName>
+                                        </p:attrNameLst>
+                                      </p:cBhvr>
+                                      <p:to>
+                                        <p:strVal val="visible"/>
+                                      </p:to>
+                                    </p:set>
+                                    <p:animEffect transition="in" filter="fade">
+                                      <p:cBhvr>
+                                        <p:cTn id="17" dur="500"/>
+                                        <p:tgtEl>
+                                          <p:spTgt spid="3">
+                                            <p:txEl>
+                                              <p:pRg st="1" end="1"/>
+                                            </p:txEl>
+                                          </p:spTgt>
+                                        </p:tgtEl>
+                                      </p:cBhvr>
+                                    </p:animEffect>
+                                  </p:childTnLst>
+                                </p:cTn>
+                              </p:par>
+                            </p:childTnLst>
+                          </p:cTn>
+                        </p:par>
+                      </p:childTnLst>
+                    </p:cTn>
+                  </p:par>
+                  <p:par>
+                    <p:cTn id="18" fill="hold">
+                      <p:stCondLst>
+                        <p:cond delay="indefinite"/>
+                      </p:stCondLst>
+                      <p:childTnLst>
+                        <p:par>
+                          <p:cTn id="19" fill="hold">
+                            <p:stCondLst>
+                              <p:cond delay="0"/>
+                            </p:stCondLst>
+                            <p:childTnLst>
+                              <p:par>
+                                <p:cTn id="20" presetID="10" presetClass="entr" presetSubtype="0" fill="hold" grpId="0" nodeType="clickEffect">
+                                  <p:stCondLst>
+                                    <p:cond delay="0"/>
+                                  </p:stCondLst>
+                                  <p:childTnLst>
+                                    <p:set>
+                                      <p:cBhvr>
+                                        <p:cTn id="21" dur="1" fill="hold">
+                                          <p:stCondLst>
+                                            <p:cond delay="0"/>
+                                          </p:stCondLst>
+                                        </p:cTn>
+                                        <p:tgtEl>
+                                          <p:spTgt spid="3">
+                                            <p:txEl>
+                                              <p:pRg st="2" end="2"/>
+                                            </p:txEl>
+                                          </p:spTgt>
+                                        </p:tgtEl>
+                                        <p:attrNameLst>
+                                          <p:attrName>style.visibility</p:attrName>
+                                        </p:attrNameLst>
+                                      </p:cBhvr>
+                                      <p:to>
+                                        <p:strVal val="visible"/>
+                                      </p:to>
+                                    </p:set>
+                                    <p:animEffect transition="in" filter="fade">
+                                      <p:cBhvr>
+                                        <p:cTn id="22" dur="500"/>
+                                        <p:tgtEl>
+                                          <p:spTgt spid="3">
+                                            <p:txEl>
+                                              <p:pRg st="2" end="2"/>
+                                            </p:txEl>
+                                          </p:spTgt>
+                                        </p:tgtEl>
+                                      </p:cBhvr>
+                                    </p:animEffect>
+                                  </p:childTnLst>
+                                </p:cTn>
+                              </p:par>
+                            </p:childTnLst>
+                          </p:cTn>
+                        </p:par>
+                      </p:childTnLst>
+                    </p:cTn>
+                  </p:par>
+                  <p:par>
+                    <p:cTn id="23" fill="hold">
+                      <p:stCondLst>
+                        <p:cond delay="indefinite"/>
+                      </p:stCondLst>
+                      <p:childTnLst>
+                        <p:par>
+                          <p:cTn id="24" fill="hold">
+                            <p:stCondLst>
+                              <p:cond delay="0"/>
+                            </p:stCondLst>
+                            <p:childTnLst>
+                              <p:par>
+                                <p:cTn id="25" presetID="10" presetClass="entr" presetSubtype="0" fill="hold" grpId="0" nodeType="clickEffect">
+                                  <p:stCondLst>
+                                    <p:cond delay="0"/>
+                                  </p:stCondLst>
+                                  <p:childTnLst>
+                                    <p:set>
+                                      <p:cBhvr>
+                                        <p:cTn id="26" dur="1" fill="hold">
+                                          <p:stCondLst>
+                                            <p:cond delay="0"/>
+                                          </p:stCondLst>
+                                        </p:cTn>
+                                        <p:tgtEl>
+                                          <p:spTgt spid="3">
+                                            <p:txEl>
+                                              <p:pRg st="3" end="3"/>
+                                            </p:txEl>
+                                          </p:spTgt>
+                                        </p:tgtEl>
+                                        <p:attrNameLst>
+                                          <p:attrName>style.visibility</p:attrName>
+                                        </p:attrNameLst>
+                                      </p:cBhvr>
+                                      <p:to>
+                                        <p:strVal val="visible"/>
+                                      </p:to>
+                                    </p:set>
+                                    <p:animEffect transition="in" filter="fade">
+                                      <p:cBhvr>
+                                        <p:cTn id="27" dur="500"/>
+                                        <p:tgtEl>
+                                          <p:spTgt spid="3">
+                                            <p:txEl>
+                                              <p:pRg st="3" end="3"/>
+                                            </p:txEl>
+                                          </p:spTgt>
+                                        </p:tgtEl>
+                                      </p:cBhvr>
+                                    </p:animEffect>
+                                  </p:childTnLst>
+                                </p:cTn>
+                              </p:par>
+                            </p:childTnLst>
+                          </p:cTn>
+                        </p:par>
+                      </p:childTnLst>
+                    </p:cTn>
+                  </p:par>
+                  <p:par>
+                    <p:cTn id="28" fill="hold">
+                      <p:stCondLst>
+                        <p:cond delay="indefinite"/>
+                      </p:stCondLst>
+                      <p:childTnLst>
+                        <p:par>
+                          <p:cTn id="29" fill="hold">
+                            <p:stCondLst>
+                              <p:cond delay="0"/>
+                            </p:stCondLst>
+                            <p:childTnLst>
+                              <p:par>
+                                <p:cTn id="30" presetID="10" presetClass="entr" presetSubtype="0" fill="hold" grpId="0" nodeType="clickEffect">
+                                  <p:stCondLst>
+                                    <p:cond delay="0"/>
+                                  </p:stCondLst>
+                                  <p:childTnLst>
+                                    <p:set>
+                                      <p:cBhvr>
+                                        <p:cTn id="31" dur="1" fill="hold">
+                                          <p:stCondLst>
+                                            <p:cond delay="0"/>
+                                          </p:stCondLst>
+                                        </p:cTn>
+                                        <p:tgtEl>
+                                          <p:spTgt spid="3">
+                                            <p:txEl>
+                                              <p:pRg st="4" end="4"/>
+                                            </p:txEl>
+                                          </p:spTgt>
+                                        </p:tgtEl>
+                                        <p:attrNameLst>
+                                          <p:attrName>style.visibility</p:attrName>
+                                        </p:attrNameLst>
+                                      </p:cBhvr>
+                                      <p:to>
+                                        <p:strVal val="visible"/>
+                                      </p:to>
+                                    </p:set>
+                                    <p:animEffect transition="in" filter="fade">
+                                      <p:cBhvr>
+                                        <p:cTn id="32" dur="500"/>
+                                        <p:tgtEl>
+                                          <p:spTgt spid="3">
+                                            <p:txEl>
+                                              <p:pRg st="4" end="4"/>
+                                            </p:txEl>
+                                          </p:spTgt>
+                                        </p:tgtEl>
+                                      </p:cBhvr>
+                                    </p:animEffect>
+                                  </p:childTnLst>
+                                </p:cTn>
+                              </p:par>
+                            </p:childTnLst>
+                          </p:cTn>
+                        </p:par>
+                      </p:childTnLst>
+                    </p:cTn>
+                  </p:par>
+                </p:childTnLst>
+              </p:cTn>
+              <p:prevCondLst>
+                <p:cond evt="onPrev" delay="0">
+                  <p:tgtEl>
+                    <p:sldTgt/>
+                  </p:tgtEl>
+                </p:cond>
+              </p:prevCondLst>
+              <p:nextCondLst>
+                <p:cond evt="onNext" delay="0">
+                  <p:tgtEl>
+                    <p:sldTgt/>
+                  </p:tgtEl>
+                </p:cond>
+              </p:nextCondLst>
+            </p:seq>
+          </p:childTnLst>
+        </p:cTn>
+      </p:par>
+    </p:tnLst>
+    <p:bldLst>
+      <p:bldP spid="2" grpId="0"/>
+      <p:bldP spid="3" grpId="0" build="p"/>
+    </p:bldLst>
+  </p:timing>
 </p:sld>
 </file>
 
@@ -9234,6 +10465,825 @@
   <p:clrMapOvr>
     <a:masterClrMapping/>
   </p:clrMapOvr>
+  <p:timing>
+    <p:tnLst>
+      <p:par>
+        <p:cTn id="1" dur="indefinite" restart="never" nodeType="tmRoot">
+          <p:childTnLst>
+            <p:seq concurrent="1" nextAc="seek">
+              <p:cTn id="2" dur="indefinite" nodeType="mainSeq">
+                <p:childTnLst>
+                  <p:par>
+                    <p:cTn id="3" fill="hold">
+                      <p:stCondLst>
+                        <p:cond delay="indefinite"/>
+                      </p:stCondLst>
+                      <p:childTnLst>
+                        <p:par>
+                          <p:cTn id="4" fill="hold">
+                            <p:stCondLst>
+                              <p:cond delay="0"/>
+                            </p:stCondLst>
+                            <p:childTnLst>
+                              <p:par>
+                                <p:cTn id="5" presetID="16" presetClass="entr" presetSubtype="21" fill="hold" grpId="0" nodeType="clickEffect">
+                                  <p:stCondLst>
+                                    <p:cond delay="0"/>
+                                  </p:stCondLst>
+                                  <p:childTnLst>
+                                    <p:set>
+                                      <p:cBhvr>
+                                        <p:cTn id="6" dur="1" fill="hold">
+                                          <p:stCondLst>
+                                            <p:cond delay="0"/>
+                                          </p:stCondLst>
+                                        </p:cTn>
+                                        <p:tgtEl>
+                                          <p:spTgt spid="2"/>
+                                        </p:tgtEl>
+                                        <p:attrNameLst>
+                                          <p:attrName>style.visibility</p:attrName>
+                                        </p:attrNameLst>
+                                      </p:cBhvr>
+                                      <p:to>
+                                        <p:strVal val="visible"/>
+                                      </p:to>
+                                    </p:set>
+                                    <p:animEffect transition="in" filter="barn(inVertical)">
+                                      <p:cBhvr>
+                                        <p:cTn id="7" dur="500"/>
+                                        <p:tgtEl>
+                                          <p:spTgt spid="2"/>
+                                        </p:tgtEl>
+                                      </p:cBhvr>
+                                    </p:animEffect>
+                                  </p:childTnLst>
+                                </p:cTn>
+                              </p:par>
+                            </p:childTnLst>
+                          </p:cTn>
+                        </p:par>
+                      </p:childTnLst>
+                    </p:cTn>
+                  </p:par>
+                  <p:par>
+                    <p:cTn id="8" fill="hold">
+                      <p:stCondLst>
+                        <p:cond delay="indefinite"/>
+                      </p:stCondLst>
+                      <p:childTnLst>
+                        <p:par>
+                          <p:cTn id="9" fill="hold">
+                            <p:stCondLst>
+                              <p:cond delay="0"/>
+                            </p:stCondLst>
+                            <p:childTnLst>
+                              <p:par>
+                                <p:cTn id="10" presetID="22" presetClass="entr" presetSubtype="4" fill="hold" grpId="0" nodeType="clickEffect">
+                                  <p:stCondLst>
+                                    <p:cond delay="0"/>
+                                  </p:stCondLst>
+                                  <p:childTnLst>
+                                    <p:set>
+                                      <p:cBhvr>
+                                        <p:cTn id="11" dur="1" fill="hold">
+                                          <p:stCondLst>
+                                            <p:cond delay="0"/>
+                                          </p:stCondLst>
+                                        </p:cTn>
+                                        <p:tgtEl>
+                                          <p:spTgt spid="3">
+                                            <p:txEl>
+                                              <p:pRg st="0" end="0"/>
+                                            </p:txEl>
+                                          </p:spTgt>
+                                        </p:tgtEl>
+                                        <p:attrNameLst>
+                                          <p:attrName>style.visibility</p:attrName>
+                                        </p:attrNameLst>
+                                      </p:cBhvr>
+                                      <p:to>
+                                        <p:strVal val="visible"/>
+                                      </p:to>
+                                    </p:set>
+                                    <p:animEffect transition="in" filter="wipe(down)">
+                                      <p:cBhvr>
+                                        <p:cTn id="12" dur="500"/>
+                                        <p:tgtEl>
+                                          <p:spTgt spid="3">
+                                            <p:txEl>
+                                              <p:pRg st="0" end="0"/>
+                                            </p:txEl>
+                                          </p:spTgt>
+                                        </p:tgtEl>
+                                      </p:cBhvr>
+                                    </p:animEffect>
+                                  </p:childTnLst>
+                                </p:cTn>
+                              </p:par>
+                            </p:childTnLst>
+                          </p:cTn>
+                        </p:par>
+                      </p:childTnLst>
+                    </p:cTn>
+                  </p:par>
+                  <p:par>
+                    <p:cTn id="13" fill="hold">
+                      <p:stCondLst>
+                        <p:cond delay="indefinite"/>
+                      </p:stCondLst>
+                      <p:childTnLst>
+                        <p:par>
+                          <p:cTn id="14" fill="hold">
+                            <p:stCondLst>
+                              <p:cond delay="0"/>
+                            </p:stCondLst>
+                            <p:childTnLst>
+                              <p:par>
+                                <p:cTn id="15" presetID="22" presetClass="entr" presetSubtype="4" fill="hold" grpId="0" nodeType="clickEffect">
+                                  <p:stCondLst>
+                                    <p:cond delay="0"/>
+                                  </p:stCondLst>
+                                  <p:childTnLst>
+                                    <p:set>
+                                      <p:cBhvr>
+                                        <p:cTn id="16" dur="1" fill="hold">
+                                          <p:stCondLst>
+                                            <p:cond delay="0"/>
+                                          </p:stCondLst>
+                                        </p:cTn>
+                                        <p:tgtEl>
+                                          <p:spTgt spid="3">
+                                            <p:txEl>
+                                              <p:pRg st="2" end="2"/>
+                                            </p:txEl>
+                                          </p:spTgt>
+                                        </p:tgtEl>
+                                        <p:attrNameLst>
+                                          <p:attrName>style.visibility</p:attrName>
+                                        </p:attrNameLst>
+                                      </p:cBhvr>
+                                      <p:to>
+                                        <p:strVal val="visible"/>
+                                      </p:to>
+                                    </p:set>
+                                    <p:animEffect transition="in" filter="wipe(down)">
+                                      <p:cBhvr>
+                                        <p:cTn id="17" dur="500"/>
+                                        <p:tgtEl>
+                                          <p:spTgt spid="3">
+                                            <p:txEl>
+                                              <p:pRg st="2" end="2"/>
+                                            </p:txEl>
+                                          </p:spTgt>
+                                        </p:tgtEl>
+                                      </p:cBhvr>
+                                    </p:animEffect>
+                                  </p:childTnLst>
+                                </p:cTn>
+                              </p:par>
+                            </p:childTnLst>
+                          </p:cTn>
+                        </p:par>
+                      </p:childTnLst>
+                    </p:cTn>
+                  </p:par>
+                  <p:par>
+                    <p:cTn id="18" fill="hold">
+                      <p:stCondLst>
+                        <p:cond delay="indefinite"/>
+                      </p:stCondLst>
+                      <p:childTnLst>
+                        <p:par>
+                          <p:cTn id="19" fill="hold">
+                            <p:stCondLst>
+                              <p:cond delay="0"/>
+                            </p:stCondLst>
+                            <p:childTnLst>
+                              <p:par>
+                                <p:cTn id="20" presetID="22" presetClass="entr" presetSubtype="4" fill="hold" grpId="0" nodeType="clickEffect">
+                                  <p:stCondLst>
+                                    <p:cond delay="0"/>
+                                  </p:stCondLst>
+                                  <p:childTnLst>
+                                    <p:set>
+                                      <p:cBhvr>
+                                        <p:cTn id="21" dur="1" fill="hold">
+                                          <p:stCondLst>
+                                            <p:cond delay="0"/>
+                                          </p:stCondLst>
+                                        </p:cTn>
+                                        <p:tgtEl>
+                                          <p:spTgt spid="3">
+                                            <p:txEl>
+                                              <p:pRg st="3" end="3"/>
+                                            </p:txEl>
+                                          </p:spTgt>
+                                        </p:tgtEl>
+                                        <p:attrNameLst>
+                                          <p:attrName>style.visibility</p:attrName>
+                                        </p:attrNameLst>
+                                      </p:cBhvr>
+                                      <p:to>
+                                        <p:strVal val="visible"/>
+                                      </p:to>
+                                    </p:set>
+                                    <p:animEffect transition="in" filter="wipe(down)">
+                                      <p:cBhvr>
+                                        <p:cTn id="22" dur="500"/>
+                                        <p:tgtEl>
+                                          <p:spTgt spid="3">
+                                            <p:txEl>
+                                              <p:pRg st="3" end="3"/>
+                                            </p:txEl>
+                                          </p:spTgt>
+                                        </p:tgtEl>
+                                      </p:cBhvr>
+                                    </p:animEffect>
+                                  </p:childTnLst>
+                                </p:cTn>
+                              </p:par>
+                            </p:childTnLst>
+                          </p:cTn>
+                        </p:par>
+                      </p:childTnLst>
+                    </p:cTn>
+                  </p:par>
+                  <p:par>
+                    <p:cTn id="23" fill="hold">
+                      <p:stCondLst>
+                        <p:cond delay="indefinite"/>
+                      </p:stCondLst>
+                      <p:childTnLst>
+                        <p:par>
+                          <p:cTn id="24" fill="hold">
+                            <p:stCondLst>
+                              <p:cond delay="0"/>
+                            </p:stCondLst>
+                            <p:childTnLst>
+                              <p:par>
+                                <p:cTn id="25" presetID="22" presetClass="entr" presetSubtype="4" fill="hold" grpId="0" nodeType="clickEffect">
+                                  <p:stCondLst>
+                                    <p:cond delay="0"/>
+                                  </p:stCondLst>
+                                  <p:childTnLst>
+                                    <p:set>
+                                      <p:cBhvr>
+                                        <p:cTn id="26" dur="1" fill="hold">
+                                          <p:stCondLst>
+                                            <p:cond delay="0"/>
+                                          </p:stCondLst>
+                                        </p:cTn>
+                                        <p:tgtEl>
+                                          <p:spTgt spid="3">
+                                            <p:txEl>
+                                              <p:pRg st="4" end="4"/>
+                                            </p:txEl>
+                                          </p:spTgt>
+                                        </p:tgtEl>
+                                        <p:attrNameLst>
+                                          <p:attrName>style.visibility</p:attrName>
+                                        </p:attrNameLst>
+                                      </p:cBhvr>
+                                      <p:to>
+                                        <p:strVal val="visible"/>
+                                      </p:to>
+                                    </p:set>
+                                    <p:animEffect transition="in" filter="wipe(down)">
+                                      <p:cBhvr>
+                                        <p:cTn id="27" dur="500"/>
+                                        <p:tgtEl>
+                                          <p:spTgt spid="3">
+                                            <p:txEl>
+                                              <p:pRg st="4" end="4"/>
+                                            </p:txEl>
+                                          </p:spTgt>
+                                        </p:tgtEl>
+                                      </p:cBhvr>
+                                    </p:animEffect>
+                                  </p:childTnLst>
+                                </p:cTn>
+                              </p:par>
+                            </p:childTnLst>
+                          </p:cTn>
+                        </p:par>
+                      </p:childTnLst>
+                    </p:cTn>
+                  </p:par>
+                  <p:par>
+                    <p:cTn id="28" fill="hold">
+                      <p:stCondLst>
+                        <p:cond delay="indefinite"/>
+                      </p:stCondLst>
+                      <p:childTnLst>
+                        <p:par>
+                          <p:cTn id="29" fill="hold">
+                            <p:stCondLst>
+                              <p:cond delay="0"/>
+                            </p:stCondLst>
+                            <p:childTnLst>
+                              <p:par>
+                                <p:cTn id="30" presetID="22" presetClass="entr" presetSubtype="4" fill="hold" grpId="0" nodeType="clickEffect">
+                                  <p:stCondLst>
+                                    <p:cond delay="0"/>
+                                  </p:stCondLst>
+                                  <p:childTnLst>
+                                    <p:set>
+                                      <p:cBhvr>
+                                        <p:cTn id="31" dur="1" fill="hold">
+                                          <p:stCondLst>
+                                            <p:cond delay="0"/>
+                                          </p:stCondLst>
+                                        </p:cTn>
+                                        <p:tgtEl>
+                                          <p:spTgt spid="3">
+                                            <p:txEl>
+                                              <p:pRg st="5" end="5"/>
+                                            </p:txEl>
+                                          </p:spTgt>
+                                        </p:tgtEl>
+                                        <p:attrNameLst>
+                                          <p:attrName>style.visibility</p:attrName>
+                                        </p:attrNameLst>
+                                      </p:cBhvr>
+                                      <p:to>
+                                        <p:strVal val="visible"/>
+                                      </p:to>
+                                    </p:set>
+                                    <p:animEffect transition="in" filter="wipe(down)">
+                                      <p:cBhvr>
+                                        <p:cTn id="32" dur="500"/>
+                                        <p:tgtEl>
+                                          <p:spTgt spid="3">
+                                            <p:txEl>
+                                              <p:pRg st="5" end="5"/>
+                                            </p:txEl>
+                                          </p:spTgt>
+                                        </p:tgtEl>
+                                      </p:cBhvr>
+                                    </p:animEffect>
+                                  </p:childTnLst>
+                                </p:cTn>
+                              </p:par>
+                            </p:childTnLst>
+                          </p:cTn>
+                        </p:par>
+                      </p:childTnLst>
+                    </p:cTn>
+                  </p:par>
+                  <p:par>
+                    <p:cTn id="33" fill="hold">
+                      <p:stCondLst>
+                        <p:cond delay="indefinite"/>
+                      </p:stCondLst>
+                      <p:childTnLst>
+                        <p:par>
+                          <p:cTn id="34" fill="hold">
+                            <p:stCondLst>
+                              <p:cond delay="0"/>
+                            </p:stCondLst>
+                            <p:childTnLst>
+                              <p:par>
+                                <p:cTn id="35" presetID="22" presetClass="entr" presetSubtype="4" fill="hold" grpId="0" nodeType="clickEffect">
+                                  <p:stCondLst>
+                                    <p:cond delay="0"/>
+                                  </p:stCondLst>
+                                  <p:childTnLst>
+                                    <p:set>
+                                      <p:cBhvr>
+                                        <p:cTn id="36" dur="1" fill="hold">
+                                          <p:stCondLst>
+                                            <p:cond delay="0"/>
+                                          </p:stCondLst>
+                                        </p:cTn>
+                                        <p:tgtEl>
+                                          <p:spTgt spid="3">
+                                            <p:txEl>
+                                              <p:pRg st="6" end="6"/>
+                                            </p:txEl>
+                                          </p:spTgt>
+                                        </p:tgtEl>
+                                        <p:attrNameLst>
+                                          <p:attrName>style.visibility</p:attrName>
+                                        </p:attrNameLst>
+                                      </p:cBhvr>
+                                      <p:to>
+                                        <p:strVal val="visible"/>
+                                      </p:to>
+                                    </p:set>
+                                    <p:animEffect transition="in" filter="wipe(down)">
+                                      <p:cBhvr>
+                                        <p:cTn id="37" dur="500"/>
+                                        <p:tgtEl>
+                                          <p:spTgt spid="3">
+                                            <p:txEl>
+                                              <p:pRg st="6" end="6"/>
+                                            </p:txEl>
+                                          </p:spTgt>
+                                        </p:tgtEl>
+                                      </p:cBhvr>
+                                    </p:animEffect>
+                                  </p:childTnLst>
+                                </p:cTn>
+                              </p:par>
+                            </p:childTnLst>
+                          </p:cTn>
+                        </p:par>
+                      </p:childTnLst>
+                    </p:cTn>
+                  </p:par>
+                  <p:par>
+                    <p:cTn id="38" fill="hold">
+                      <p:stCondLst>
+                        <p:cond delay="indefinite"/>
+                      </p:stCondLst>
+                      <p:childTnLst>
+                        <p:par>
+                          <p:cTn id="39" fill="hold">
+                            <p:stCondLst>
+                              <p:cond delay="0"/>
+                            </p:stCondLst>
+                            <p:childTnLst>
+                              <p:par>
+                                <p:cTn id="40" presetID="22" presetClass="entr" presetSubtype="4" fill="hold" grpId="0" nodeType="clickEffect">
+                                  <p:stCondLst>
+                                    <p:cond delay="0"/>
+                                  </p:stCondLst>
+                                  <p:childTnLst>
+                                    <p:set>
+                                      <p:cBhvr>
+                                        <p:cTn id="41" dur="1" fill="hold">
+                                          <p:stCondLst>
+                                            <p:cond delay="0"/>
+                                          </p:stCondLst>
+                                        </p:cTn>
+                                        <p:tgtEl>
+                                          <p:spTgt spid="3">
+                                            <p:txEl>
+                                              <p:pRg st="8" end="8"/>
+                                            </p:txEl>
+                                          </p:spTgt>
+                                        </p:tgtEl>
+                                        <p:attrNameLst>
+                                          <p:attrName>style.visibility</p:attrName>
+                                        </p:attrNameLst>
+                                      </p:cBhvr>
+                                      <p:to>
+                                        <p:strVal val="visible"/>
+                                      </p:to>
+                                    </p:set>
+                                    <p:animEffect transition="in" filter="wipe(down)">
+                                      <p:cBhvr>
+                                        <p:cTn id="42" dur="500"/>
+                                        <p:tgtEl>
+                                          <p:spTgt spid="3">
+                                            <p:txEl>
+                                              <p:pRg st="8" end="8"/>
+                                            </p:txEl>
+                                          </p:spTgt>
+                                        </p:tgtEl>
+                                      </p:cBhvr>
+                                    </p:animEffect>
+                                  </p:childTnLst>
+                                </p:cTn>
+                              </p:par>
+                            </p:childTnLst>
+                          </p:cTn>
+                        </p:par>
+                      </p:childTnLst>
+                    </p:cTn>
+                  </p:par>
+                  <p:par>
+                    <p:cTn id="43" fill="hold">
+                      <p:stCondLst>
+                        <p:cond delay="indefinite"/>
+                      </p:stCondLst>
+                      <p:childTnLst>
+                        <p:par>
+                          <p:cTn id="44" fill="hold">
+                            <p:stCondLst>
+                              <p:cond delay="0"/>
+                            </p:stCondLst>
+                            <p:childTnLst>
+                              <p:par>
+                                <p:cTn id="45" presetID="22" presetClass="entr" presetSubtype="4" fill="hold" grpId="0" nodeType="clickEffect">
+                                  <p:stCondLst>
+                                    <p:cond delay="0"/>
+                                  </p:stCondLst>
+                                  <p:childTnLst>
+                                    <p:set>
+                                      <p:cBhvr>
+                                        <p:cTn id="46" dur="1" fill="hold">
+                                          <p:stCondLst>
+                                            <p:cond delay="0"/>
+                                          </p:stCondLst>
+                                        </p:cTn>
+                                        <p:tgtEl>
+                                          <p:spTgt spid="3">
+                                            <p:txEl>
+                                              <p:pRg st="9" end="9"/>
+                                            </p:txEl>
+                                          </p:spTgt>
+                                        </p:tgtEl>
+                                        <p:attrNameLst>
+                                          <p:attrName>style.visibility</p:attrName>
+                                        </p:attrNameLst>
+                                      </p:cBhvr>
+                                      <p:to>
+                                        <p:strVal val="visible"/>
+                                      </p:to>
+                                    </p:set>
+                                    <p:animEffect transition="in" filter="wipe(down)">
+                                      <p:cBhvr>
+                                        <p:cTn id="47" dur="500"/>
+                                        <p:tgtEl>
+                                          <p:spTgt spid="3">
+                                            <p:txEl>
+                                              <p:pRg st="9" end="9"/>
+                                            </p:txEl>
+                                          </p:spTgt>
+                                        </p:tgtEl>
+                                      </p:cBhvr>
+                                    </p:animEffect>
+                                  </p:childTnLst>
+                                </p:cTn>
+                              </p:par>
+                            </p:childTnLst>
+                          </p:cTn>
+                        </p:par>
+                      </p:childTnLst>
+                    </p:cTn>
+                  </p:par>
+                  <p:par>
+                    <p:cTn id="48" fill="hold">
+                      <p:stCondLst>
+                        <p:cond delay="indefinite"/>
+                      </p:stCondLst>
+                      <p:childTnLst>
+                        <p:par>
+                          <p:cTn id="49" fill="hold">
+                            <p:stCondLst>
+                              <p:cond delay="0"/>
+                            </p:stCondLst>
+                            <p:childTnLst>
+                              <p:par>
+                                <p:cTn id="50" presetID="22" presetClass="entr" presetSubtype="4" fill="hold" grpId="0" nodeType="clickEffect">
+                                  <p:stCondLst>
+                                    <p:cond delay="0"/>
+                                  </p:stCondLst>
+                                  <p:childTnLst>
+                                    <p:set>
+                                      <p:cBhvr>
+                                        <p:cTn id="51" dur="1" fill="hold">
+                                          <p:stCondLst>
+                                            <p:cond delay="0"/>
+                                          </p:stCondLst>
+                                        </p:cTn>
+                                        <p:tgtEl>
+                                          <p:spTgt spid="3">
+                                            <p:txEl>
+                                              <p:pRg st="10" end="10"/>
+                                            </p:txEl>
+                                          </p:spTgt>
+                                        </p:tgtEl>
+                                        <p:attrNameLst>
+                                          <p:attrName>style.visibility</p:attrName>
+                                        </p:attrNameLst>
+                                      </p:cBhvr>
+                                      <p:to>
+                                        <p:strVal val="visible"/>
+                                      </p:to>
+                                    </p:set>
+                                    <p:animEffect transition="in" filter="wipe(down)">
+                                      <p:cBhvr>
+                                        <p:cTn id="52" dur="500"/>
+                                        <p:tgtEl>
+                                          <p:spTgt spid="3">
+                                            <p:txEl>
+                                              <p:pRg st="10" end="10"/>
+                                            </p:txEl>
+                                          </p:spTgt>
+                                        </p:tgtEl>
+                                      </p:cBhvr>
+                                    </p:animEffect>
+                                  </p:childTnLst>
+                                </p:cTn>
+                              </p:par>
+                            </p:childTnLst>
+                          </p:cTn>
+                        </p:par>
+                      </p:childTnLst>
+                    </p:cTn>
+                  </p:par>
+                  <p:par>
+                    <p:cTn id="53" fill="hold">
+                      <p:stCondLst>
+                        <p:cond delay="indefinite"/>
+                      </p:stCondLst>
+                      <p:childTnLst>
+                        <p:par>
+                          <p:cTn id="54" fill="hold">
+                            <p:stCondLst>
+                              <p:cond delay="0"/>
+                            </p:stCondLst>
+                            <p:childTnLst>
+                              <p:par>
+                                <p:cTn id="55" presetID="22" presetClass="entr" presetSubtype="4" fill="hold" grpId="0" nodeType="clickEffect">
+                                  <p:stCondLst>
+                                    <p:cond delay="0"/>
+                                  </p:stCondLst>
+                                  <p:childTnLst>
+                                    <p:set>
+                                      <p:cBhvr>
+                                        <p:cTn id="56" dur="1" fill="hold">
+                                          <p:stCondLst>
+                                            <p:cond delay="0"/>
+                                          </p:stCondLst>
+                                        </p:cTn>
+                                        <p:tgtEl>
+                                          <p:spTgt spid="3">
+                                            <p:txEl>
+                                              <p:pRg st="11" end="11"/>
+                                            </p:txEl>
+                                          </p:spTgt>
+                                        </p:tgtEl>
+                                        <p:attrNameLst>
+                                          <p:attrName>style.visibility</p:attrName>
+                                        </p:attrNameLst>
+                                      </p:cBhvr>
+                                      <p:to>
+                                        <p:strVal val="visible"/>
+                                      </p:to>
+                                    </p:set>
+                                    <p:animEffect transition="in" filter="wipe(down)">
+                                      <p:cBhvr>
+                                        <p:cTn id="57" dur="500"/>
+                                        <p:tgtEl>
+                                          <p:spTgt spid="3">
+                                            <p:txEl>
+                                              <p:pRg st="11" end="11"/>
+                                            </p:txEl>
+                                          </p:spTgt>
+                                        </p:tgtEl>
+                                      </p:cBhvr>
+                                    </p:animEffect>
+                                  </p:childTnLst>
+                                </p:cTn>
+                              </p:par>
+                            </p:childTnLst>
+                          </p:cTn>
+                        </p:par>
+                      </p:childTnLst>
+                    </p:cTn>
+                  </p:par>
+                  <p:par>
+                    <p:cTn id="58" fill="hold">
+                      <p:stCondLst>
+                        <p:cond delay="indefinite"/>
+                      </p:stCondLst>
+                      <p:childTnLst>
+                        <p:par>
+                          <p:cTn id="59" fill="hold">
+                            <p:stCondLst>
+                              <p:cond delay="0"/>
+                            </p:stCondLst>
+                            <p:childTnLst>
+                              <p:par>
+                                <p:cTn id="60" presetID="22" presetClass="entr" presetSubtype="4" fill="hold" grpId="0" nodeType="clickEffect">
+                                  <p:stCondLst>
+                                    <p:cond delay="0"/>
+                                  </p:stCondLst>
+                                  <p:childTnLst>
+                                    <p:set>
+                                      <p:cBhvr>
+                                        <p:cTn id="61" dur="1" fill="hold">
+                                          <p:stCondLst>
+                                            <p:cond delay="0"/>
+                                          </p:stCondLst>
+                                        </p:cTn>
+                                        <p:tgtEl>
+                                          <p:spTgt spid="3">
+                                            <p:txEl>
+                                              <p:pRg st="13" end="13"/>
+                                            </p:txEl>
+                                          </p:spTgt>
+                                        </p:tgtEl>
+                                        <p:attrNameLst>
+                                          <p:attrName>style.visibility</p:attrName>
+                                        </p:attrNameLst>
+                                      </p:cBhvr>
+                                      <p:to>
+                                        <p:strVal val="visible"/>
+                                      </p:to>
+                                    </p:set>
+                                    <p:animEffect transition="in" filter="wipe(down)">
+                                      <p:cBhvr>
+                                        <p:cTn id="62" dur="500"/>
+                                        <p:tgtEl>
+                                          <p:spTgt spid="3">
+                                            <p:txEl>
+                                              <p:pRg st="13" end="13"/>
+                                            </p:txEl>
+                                          </p:spTgt>
+                                        </p:tgtEl>
+                                      </p:cBhvr>
+                                    </p:animEffect>
+                                  </p:childTnLst>
+                                </p:cTn>
+                              </p:par>
+                            </p:childTnLst>
+                          </p:cTn>
+                        </p:par>
+                      </p:childTnLst>
+                    </p:cTn>
+                  </p:par>
+                  <p:par>
+                    <p:cTn id="63" fill="hold">
+                      <p:stCondLst>
+                        <p:cond delay="indefinite"/>
+                      </p:stCondLst>
+                      <p:childTnLst>
+                        <p:par>
+                          <p:cTn id="64" fill="hold">
+                            <p:stCondLst>
+                              <p:cond delay="0"/>
+                            </p:stCondLst>
+                            <p:childTnLst>
+                              <p:par>
+                                <p:cTn id="65" presetID="22" presetClass="entr" presetSubtype="4" fill="hold" grpId="0" nodeType="clickEffect">
+                                  <p:stCondLst>
+                                    <p:cond delay="0"/>
+                                  </p:stCondLst>
+                                  <p:childTnLst>
+                                    <p:set>
+                                      <p:cBhvr>
+                                        <p:cTn id="66" dur="1" fill="hold">
+                                          <p:stCondLst>
+                                            <p:cond delay="0"/>
+                                          </p:stCondLst>
+                                        </p:cTn>
+                                        <p:tgtEl>
+                                          <p:spTgt spid="3">
+                                            <p:txEl>
+                                              <p:pRg st="14" end="14"/>
+                                            </p:txEl>
+                                          </p:spTgt>
+                                        </p:tgtEl>
+                                        <p:attrNameLst>
+                                          <p:attrName>style.visibility</p:attrName>
+                                        </p:attrNameLst>
+                                      </p:cBhvr>
+                                      <p:to>
+                                        <p:strVal val="visible"/>
+                                      </p:to>
+                                    </p:set>
+                                    <p:animEffect transition="in" filter="wipe(down)">
+                                      <p:cBhvr>
+                                        <p:cTn id="67" dur="500"/>
+                                        <p:tgtEl>
+                                          <p:spTgt spid="3">
+                                            <p:txEl>
+                                              <p:pRg st="14" end="14"/>
+                                            </p:txEl>
+                                          </p:spTgt>
+                                        </p:tgtEl>
+                                      </p:cBhvr>
+                                    </p:animEffect>
+                                  </p:childTnLst>
+                                </p:cTn>
+                              </p:par>
+                            </p:childTnLst>
+                          </p:cTn>
+                        </p:par>
+                      </p:childTnLst>
+                    </p:cTn>
+                  </p:par>
+                </p:childTnLst>
+              </p:cTn>
+              <p:prevCondLst>
+                <p:cond evt="onPrev" delay="0">
+                  <p:tgtEl>
+                    <p:sldTgt/>
+                  </p:tgtEl>
+                </p:cond>
+              </p:prevCondLst>
+              <p:nextCondLst>
+                <p:cond evt="onNext" delay="0">
+                  <p:tgtEl>
+                    <p:sldTgt/>
+                  </p:tgtEl>
+                </p:cond>
+              </p:nextCondLst>
+            </p:seq>
+          </p:childTnLst>
+        </p:cTn>
+      </p:par>
+    </p:tnLst>
+    <p:bldLst>
+      <p:bldP spid="2" grpId="0"/>
+      <p:bldP spid="3" grpId="0" build="p"/>
+    </p:bldLst>
+  </p:timing>
 </p:sld>
 </file>
 
@@ -9557,6 +11607,92 @@
   <p:clrMapOvr>
     <a:masterClrMapping/>
   </p:clrMapOvr>
+  <p:timing>
+    <p:tnLst>
+      <p:par>
+        <p:cTn id="1" dur="indefinite" restart="never" nodeType="tmRoot">
+          <p:childTnLst>
+            <p:seq concurrent="1" nextAc="seek">
+              <p:cTn id="2" dur="indefinite" nodeType="mainSeq">
+                <p:childTnLst>
+                  <p:par>
+                    <p:cTn id="3" fill="hold">
+                      <p:stCondLst>
+                        <p:cond delay="indefinite"/>
+                      </p:stCondLst>
+                      <p:childTnLst>
+                        <p:par>
+                          <p:cTn id="4" fill="hold">
+                            <p:stCondLst>
+                              <p:cond delay="0"/>
+                            </p:stCondLst>
+                            <p:childTnLst>
+                              <p:par>
+                                <p:cTn id="5" presetID="16" presetClass="entr" presetSubtype="21" fill="hold" grpId="0" nodeType="clickEffect">
+                                  <p:stCondLst>
+                                    <p:cond delay="0"/>
+                                  </p:stCondLst>
+                                  <p:childTnLst>
+                                    <p:set>
+                                      <p:cBhvr>
+                                        <p:cTn id="6" dur="1" fill="hold">
+                                          <p:stCondLst>
+                                            <p:cond delay="0"/>
+                                          </p:stCondLst>
+                                        </p:cTn>
+                                        <p:tgtEl>
+                                          <p:spTgt spid="2"/>
+                                        </p:tgtEl>
+                                        <p:attrNameLst>
+                                          <p:attrName>style.visibility</p:attrName>
+                                        </p:attrNameLst>
+                                      </p:cBhvr>
+                                      <p:to>
+                                        <p:strVal val="visible"/>
+                                      </p:to>
+                                    </p:set>
+                                    <p:animEffect transition="in" filter="barn(inVertical)">
+                                      <p:cBhvr>
+                                        <p:cTn id="7" dur="500"/>
+                                        <p:tgtEl>
+                                          <p:spTgt spid="2"/>
+                                        </p:tgtEl>
+                                      </p:cBhvr>
+                                    </p:animEffect>
+                                  </p:childTnLst>
+                                </p:cTn>
+                              </p:par>
+                            </p:childTnLst>
+                          </p:cTn>
+                        </p:par>
+                      </p:childTnLst>
+                    </p:cTn>
+                  </p:par>
+                </p:childTnLst>
+              </p:cTn>
+              <p:prevCondLst>
+                <p:cond evt="onPrev" delay="0">
+                  <p:tgtEl>
+                    <p:sldTgt/>
+                  </p:tgtEl>
+                </p:cond>
+              </p:prevCondLst>
+              <p:nextCondLst>
+                <p:cond evt="onNext" delay="0">
+                  <p:tgtEl>
+                    <p:sldTgt/>
+                  </p:tgtEl>
+                </p:cond>
+              </p:nextCondLst>
+            </p:seq>
+          </p:childTnLst>
+        </p:cTn>
+      </p:par>
+    </p:tnLst>
+    <p:bldLst>
+      <p:bldP spid="2" grpId="0"/>
+    </p:bldLst>
+  </p:timing>
 </p:sld>
 </file>
 

</xml_diff>

<commit_message>
feat: add bypass testing scenarios and update analysis tools
- Add PhpstanBypassController to test quality gate bypassing
- Add Node.js bypass controllers for testing scenarios
- Update PowerPoint slides and sharing session materials
- Modify SonarQube analysis scripts
- Include selective bypass examples

🤖 Generated with [Claude Code](https://claude.ai/code)

Co-Authored-By: Claude <noreply@anthropic.com>
</commit_message>
<xml_diff>
--- a/slides/JNO - Sharing Session Code Analysis.pptx
+++ b/slides/JNO - Sharing Session Code Analysis.pptx
@@ -5,10 +5,10 @@
     <p:sldMasterId id="2147483648" r:id="rId3"/>
   </p:sldMasterIdLst>
   <p:notesMasterIdLst>
-    <p:notesMasterId r:id="rId20"/>
+    <p:notesMasterId r:id="rId23"/>
   </p:notesMasterIdLst>
   <p:handoutMasterIdLst>
-    <p:handoutMasterId r:id="rId21"/>
+    <p:handoutMasterId r:id="rId24"/>
   </p:handoutMasterIdLst>
   <p:sldIdLst>
     <p:sldId id="256" r:id="rId4"/>
@@ -17,16 +17,19 @@
     <p:sldId id="1147" r:id="rId7"/>
     <p:sldId id="1148" r:id="rId8"/>
     <p:sldId id="1149" r:id="rId9"/>
-    <p:sldId id="1150" r:id="rId10"/>
-    <p:sldId id="1151" r:id="rId11"/>
-    <p:sldId id="1152" r:id="rId12"/>
-    <p:sldId id="1153" r:id="rId13"/>
-    <p:sldId id="1154" r:id="rId14"/>
-    <p:sldId id="1155" r:id="rId15"/>
-    <p:sldId id="1156" r:id="rId16"/>
-    <p:sldId id="1157" r:id="rId17"/>
-    <p:sldId id="1158" r:id="rId18"/>
-    <p:sldId id="1136" r:id="rId19"/>
+    <p:sldId id="1159" r:id="rId10"/>
+    <p:sldId id="1160" r:id="rId11"/>
+    <p:sldId id="1150" r:id="rId12"/>
+    <p:sldId id="1151" r:id="rId13"/>
+    <p:sldId id="1152" r:id="rId14"/>
+    <p:sldId id="1153" r:id="rId15"/>
+    <p:sldId id="1154" r:id="rId16"/>
+    <p:sldId id="1155" r:id="rId17"/>
+    <p:sldId id="1156" r:id="rId18"/>
+    <p:sldId id="1157" r:id="rId19"/>
+    <p:sldId id="1158" r:id="rId20"/>
+    <p:sldId id="1161" r:id="rId21"/>
+    <p:sldId id="1136" r:id="rId22"/>
   </p:sldIdLst>
   <p:sldSz cx="12192000" cy="6858000"/>
   <p:notesSz cx="6858000" cy="9144000"/>
@@ -230,7 +233,7 @@
           <a:p>
             <a:fld id="{A11A6079-162A-4D1B-94E2-FE72C89E699D}" type="datetimeFigureOut">
               <a:rPr lang="en-ID" smtClean="0"/>
-              <a:t>04/08/2025</a:t>
+              <a:t>06/08/2025</a:t>
             </a:fld>
             <a:endParaRPr lang="en-ID"/>
           </a:p>
@@ -407,7 +410,7 @@
           <a:p>
             <a:fld id="{2A5001D7-F847-404A-A39B-22CCEDF9F009}" type="datetimeFigureOut">
               <a:rPr lang="en-US" smtClean="0"/>
-              <a:t>8/4/2025</a:t>
+              <a:t>8/6/2025</a:t>
             </a:fld>
             <a:endParaRPr lang="en-US"/>
           </a:p>
@@ -981,7 +984,7 @@
           <a:p>
             <a:fld id="{CD409768-43BC-4C70-9A7A-888B520D7E66}" type="datetimeFigureOut">
               <a:rPr lang="en-US" smtClean="0"/>
-              <a:t>8/4/2025</a:t>
+              <a:t>8/6/2025</a:t>
             </a:fld>
             <a:endParaRPr lang="en-US"/>
           </a:p>
@@ -1213,7 +1216,7 @@
           <a:p>
             <a:fld id="{CD409768-43BC-4C70-9A7A-888B520D7E66}" type="datetimeFigureOut">
               <a:rPr lang="en-US" smtClean="0"/>
-              <a:t>8/4/2025</a:t>
+              <a:t>8/6/2025</a:t>
             </a:fld>
             <a:endParaRPr lang="en-US"/>
           </a:p>
@@ -1435,7 +1438,7 @@
           <a:p>
             <a:fld id="{CD409768-43BC-4C70-9A7A-888B520D7E66}" type="datetimeFigureOut">
               <a:rPr lang="en-US" smtClean="0"/>
-              <a:t>8/4/2025</a:t>
+              <a:t>8/6/2025</a:t>
             </a:fld>
             <a:endParaRPr lang="en-US"/>
           </a:p>
@@ -1734,7 +1737,7 @@
           <a:p>
             <a:fld id="{CD409768-43BC-4C70-9A7A-888B520D7E66}" type="datetimeFigureOut">
               <a:rPr lang="en-US" smtClean="0"/>
-              <a:t>8/4/2025</a:t>
+              <a:t>8/6/2025</a:t>
             </a:fld>
             <a:endParaRPr lang="en-US"/>
           </a:p>
@@ -2023,7 +2026,7 @@
           <a:p>
             <a:fld id="{CD409768-43BC-4C70-9A7A-888B520D7E66}" type="datetimeFigureOut">
               <a:rPr lang="en-US" smtClean="0"/>
-              <a:t>8/4/2025</a:t>
+              <a:t>8/6/2025</a:t>
             </a:fld>
             <a:endParaRPr lang="en-US"/>
           </a:p>
@@ -2459,7 +2462,7 @@
           <a:p>
             <a:fld id="{CD409768-43BC-4C70-9A7A-888B520D7E66}" type="datetimeFigureOut">
               <a:rPr lang="en-US" smtClean="0"/>
-              <a:t>8/4/2025</a:t>
+              <a:t>8/6/2025</a:t>
             </a:fld>
             <a:endParaRPr lang="en-US"/>
           </a:p>
@@ -2624,7 +2627,7 @@
           <a:p>
             <a:fld id="{CD409768-43BC-4C70-9A7A-888B520D7E66}" type="datetimeFigureOut">
               <a:rPr lang="en-US" smtClean="0"/>
-              <a:t>8/4/2025</a:t>
+              <a:t>8/6/2025</a:t>
             </a:fld>
             <a:endParaRPr lang="en-US"/>
           </a:p>
@@ -2761,7 +2764,7 @@
           <a:p>
             <a:fld id="{CD409768-43BC-4C70-9A7A-888B520D7E66}" type="datetimeFigureOut">
               <a:rPr lang="en-US" smtClean="0"/>
-              <a:t>8/4/2025</a:t>
+              <a:t>8/6/2025</a:t>
             </a:fld>
             <a:endParaRPr lang="en-US"/>
           </a:p>
@@ -3096,7 +3099,7 @@
           <a:p>
             <a:fld id="{CD409768-43BC-4C70-9A7A-888B520D7E66}" type="datetimeFigureOut">
               <a:rPr lang="en-US" smtClean="0"/>
-              <a:t>8/4/2025</a:t>
+              <a:t>8/6/2025</a:t>
             </a:fld>
             <a:endParaRPr lang="en-US"/>
           </a:p>
@@ -3408,7 +3411,7 @@
           <a:p>
             <a:fld id="{CD409768-43BC-4C70-9A7A-888B520D7E66}" type="datetimeFigureOut">
               <a:rPr lang="en-US" smtClean="0"/>
-              <a:t>8/4/2025</a:t>
+              <a:t>8/6/2025</a:t>
             </a:fld>
             <a:endParaRPr lang="en-US"/>
           </a:p>
@@ -4223,6 +4226,1725 @@
           <p:cNvPr id="2" name="Title 1">
             <a:extLst>
               <a:ext uri="{FF2B5EF4-FFF2-40B4-BE49-F238E27FC236}">
+                <a16:creationId xmlns:a16="http://schemas.microsoft.com/office/drawing/2014/main" id="{B206B0E0-0C2A-8DAE-7EF9-E152EF3E787F}"/>
+              </a:ext>
+            </a:extLst>
+          </p:cNvPr>
+          <p:cNvSpPr>
+            <a:spLocks noGrp="1"/>
+          </p:cNvSpPr>
+          <p:nvPr>
+            <p:ph type="title"/>
+          </p:nvPr>
+        </p:nvSpPr>
+        <p:spPr>
+          <a:xfrm>
+            <a:off x="838200" y="365126"/>
+            <a:ext cx="5452533" cy="532342"/>
+          </a:xfrm>
+        </p:spPr>
+        <p:txBody>
+          <a:bodyPr>
+            <a:normAutofit/>
+          </a:bodyPr>
+          <a:lstStyle/>
+          <a:p>
+            <a:r>
+              <a:rPr lang="en-US" sz="3200" dirty="0"/>
+              <a:t>LIVE DEMO WALKTHROUGH 🎬</a:t>
+            </a:r>
+          </a:p>
+        </p:txBody>
+      </p:sp>
+      <p:sp>
+        <p:nvSpPr>
+          <p:cNvPr id="3" name="Content Placeholder 2">
+            <a:extLst>
+              <a:ext uri="{FF2B5EF4-FFF2-40B4-BE49-F238E27FC236}">
+                <a16:creationId xmlns:a16="http://schemas.microsoft.com/office/drawing/2014/main" id="{35461A45-4190-2290-EF1F-5EC55F66E2F9}"/>
+              </a:ext>
+            </a:extLst>
+          </p:cNvPr>
+          <p:cNvSpPr>
+            <a:spLocks noGrp="1"/>
+          </p:cNvSpPr>
+          <p:nvPr>
+            <p:ph idx="1"/>
+          </p:nvPr>
+        </p:nvSpPr>
+        <p:spPr>
+          <a:xfrm>
+            <a:off x="838200" y="1293283"/>
+            <a:ext cx="4334933" cy="1196975"/>
+          </a:xfrm>
+        </p:spPr>
+        <p:txBody>
+          <a:bodyPr>
+            <a:normAutofit lnSpcReduction="10000"/>
+          </a:bodyPr>
+          <a:lstStyle/>
+          <a:p>
+            <a:pPr marL="0" indent="0">
+              <a:buNone/>
+            </a:pPr>
+            <a:r>
+              <a:rPr lang="en-US" sz="1400" dirty="0"/>
+              <a:t>DEMO SCENARIO: </a:t>
+            </a:r>
+          </a:p>
+          <a:p>
+            <a:r>
+              <a:rPr lang="en-US" sz="1400" dirty="0"/>
+              <a:t>- File: </a:t>
+            </a:r>
+            <a:r>
+              <a:rPr lang="en-US" sz="1400" dirty="0" err="1"/>
+              <a:t>TestBuggyController.php</a:t>
+            </a:r>
+            <a:r>
+              <a:rPr lang="en-US" sz="1400" dirty="0"/>
+              <a:t> (75+ potential issues)</a:t>
+            </a:r>
+          </a:p>
+          <a:p>
+            <a:r>
+              <a:rPr lang="en-US" sz="1400" dirty="0"/>
+              <a:t>- Action: Developer </a:t>
+            </a:r>
+            <a:r>
+              <a:rPr lang="en-US" sz="1400" dirty="0" err="1"/>
+              <a:t>coba</a:t>
+            </a:r>
+            <a:r>
+              <a:rPr lang="en-US" sz="1400" dirty="0"/>
+              <a:t> commit code </a:t>
+            </a:r>
+            <a:r>
+              <a:rPr lang="en-US" sz="1400" dirty="0" err="1"/>
+              <a:t>bermasalah</a:t>
+            </a:r>
+            <a:endParaRPr lang="en-US" sz="1400" dirty="0"/>
+          </a:p>
+          <a:p>
+            <a:r>
+              <a:rPr lang="en-US" sz="1400" dirty="0"/>
+              <a:t>- Result: Pre-commit hook blocks </a:t>
+            </a:r>
+            <a:r>
+              <a:rPr lang="en-US" sz="1400" dirty="0" err="1"/>
+              <a:t>dengan</a:t>
+            </a:r>
+            <a:r>
+              <a:rPr lang="en-US" sz="1400" dirty="0"/>
+              <a:t> detail errors</a:t>
+            </a:r>
+          </a:p>
+        </p:txBody>
+      </p:sp>
+      <p:sp>
+        <p:nvSpPr>
+          <p:cNvPr id="5" name="TextBox 4">
+            <a:extLst>
+              <a:ext uri="{FF2B5EF4-FFF2-40B4-BE49-F238E27FC236}">
+                <a16:creationId xmlns:a16="http://schemas.microsoft.com/office/drawing/2014/main" id="{A1E60C45-F1F3-8AC4-109C-C11AA476E500}"/>
+              </a:ext>
+            </a:extLst>
+          </p:cNvPr>
+          <p:cNvSpPr txBox="1"/>
+          <p:nvPr/>
+        </p:nvSpPr>
+        <p:spPr>
+          <a:xfrm>
+            <a:off x="838200" y="2886073"/>
+            <a:ext cx="6096000" cy="1384995"/>
+          </a:xfrm>
+          <a:prstGeom prst="rect">
+            <a:avLst/>
+          </a:prstGeom>
+          <a:noFill/>
+        </p:spPr>
+        <p:txBody>
+          <a:bodyPr wrap="square">
+            <a:spAutoFit/>
+          </a:bodyPr>
+          <a:lstStyle/>
+          <a:p>
+            <a:r>
+              <a:rPr lang="en-US" sz="1400" dirty="0"/>
+              <a:t>DEMO FLOW:</a:t>
+            </a:r>
+          </a:p>
+          <a:p>
+            <a:r>
+              <a:rPr lang="en-US" sz="1400" dirty="0"/>
+              <a:t>1. </a:t>
+            </a:r>
+            <a:r>
+              <a:rPr lang="en-US" sz="1400" dirty="0" err="1"/>
+              <a:t>Lihat</a:t>
+            </a:r>
+            <a:r>
+              <a:rPr lang="en-US" sz="1400" dirty="0"/>
+              <a:t> </a:t>
+            </a:r>
+            <a:r>
+              <a:rPr lang="en-US" sz="1400" dirty="0" err="1"/>
+              <a:t>kode</a:t>
+            </a:r>
+            <a:r>
+              <a:rPr lang="en-US" sz="1400" dirty="0"/>
+              <a:t> </a:t>
+            </a:r>
+            <a:r>
+              <a:rPr lang="en-US" sz="1400" dirty="0" err="1"/>
+              <a:t>bermasalah</a:t>
+            </a:r>
+            <a:r>
+              <a:rPr lang="en-US" sz="1400" dirty="0"/>
+              <a:t> di repository</a:t>
+            </a:r>
+          </a:p>
+          <a:p>
+            <a:r>
+              <a:rPr lang="en-US" sz="1400" dirty="0"/>
+              <a:t>2. Developer run: `git commit -m "add buggy code"`</a:t>
+            </a:r>
+          </a:p>
+          <a:p>
+            <a:r>
+              <a:rPr lang="en-US" sz="1400" dirty="0"/>
+              <a:t>3. Pre-commit hook activated: BLOCKED!</a:t>
+            </a:r>
+          </a:p>
+          <a:p>
+            <a:r>
+              <a:rPr lang="en-US" sz="1400" dirty="0"/>
+              <a:t>4. Show detailed error list (type errors, formatting, </a:t>
+            </a:r>
+            <a:r>
+              <a:rPr lang="en-US" sz="1400" dirty="0" err="1"/>
+              <a:t>etc</a:t>
+            </a:r>
+            <a:r>
+              <a:rPr lang="en-US" sz="1400" dirty="0"/>
+              <a:t>)</a:t>
+            </a:r>
+          </a:p>
+          <a:p>
+            <a:r>
+              <a:rPr lang="en-US" sz="1400" dirty="0"/>
+              <a:t>5. Fix issues → commit SUCCESS</a:t>
+            </a:r>
+          </a:p>
+        </p:txBody>
+      </p:sp>
+      <p:sp>
+        <p:nvSpPr>
+          <p:cNvPr id="7" name="TextBox 6">
+            <a:extLst>
+              <a:ext uri="{FF2B5EF4-FFF2-40B4-BE49-F238E27FC236}">
+                <a16:creationId xmlns:a16="http://schemas.microsoft.com/office/drawing/2014/main" id="{4BAE0D05-4A34-661B-977E-00B3CA19A2B0}"/>
+              </a:ext>
+            </a:extLst>
+          </p:cNvPr>
+          <p:cNvSpPr txBox="1"/>
+          <p:nvPr/>
+        </p:nvSpPr>
+        <p:spPr>
+          <a:xfrm>
+            <a:off x="6096000" y="4482217"/>
+            <a:ext cx="5046133" cy="369332"/>
+          </a:xfrm>
+          <a:prstGeom prst="rect">
+            <a:avLst/>
+          </a:prstGeom>
+          <a:noFill/>
+        </p:spPr>
+        <p:txBody>
+          <a:bodyPr wrap="square">
+            <a:spAutoFit/>
+          </a:bodyPr>
+          <a:lstStyle/>
+          <a:p>
+            <a:r>
+              <a:rPr lang="en-US" dirty="0">
+                <a:solidFill>
+                  <a:srgbClr val="FF0000"/>
+                </a:solidFill>
+              </a:rPr>
+              <a:t>Hasil </a:t>
+            </a:r>
+            <a:r>
+              <a:rPr lang="en-US" dirty="0" err="1">
+                <a:solidFill>
+                  <a:srgbClr val="FF0000"/>
+                </a:solidFill>
+              </a:rPr>
+              <a:t>analisis</a:t>
+            </a:r>
+            <a:r>
+              <a:rPr lang="en-US" dirty="0">
+                <a:solidFill>
+                  <a:srgbClr val="FF0000"/>
+                </a:solidFill>
+              </a:rPr>
+              <a:t> </a:t>
+            </a:r>
+            <a:r>
+              <a:rPr lang="en-US" dirty="0" err="1">
+                <a:solidFill>
+                  <a:srgbClr val="FF0000"/>
+                </a:solidFill>
+              </a:rPr>
+              <a:t>ini</a:t>
+            </a:r>
+            <a:r>
+              <a:rPr lang="en-US" dirty="0">
+                <a:solidFill>
+                  <a:srgbClr val="FF0000"/>
+                </a:solidFill>
+              </a:rPr>
+              <a:t> juga </a:t>
+            </a:r>
+            <a:r>
+              <a:rPr lang="en-US" dirty="0" err="1">
+                <a:solidFill>
+                  <a:srgbClr val="FF0000"/>
+                </a:solidFill>
+              </a:rPr>
+              <a:t>tampil</a:t>
+            </a:r>
+            <a:r>
+              <a:rPr lang="en-US" dirty="0">
+                <a:solidFill>
+                  <a:srgbClr val="FF0000"/>
+                </a:solidFill>
+              </a:rPr>
+              <a:t> di dashboard enterprise</a:t>
+            </a:r>
+          </a:p>
+        </p:txBody>
+      </p:sp>
+    </p:spTree>
+    <p:extLst>
+      <p:ext uri="{BB962C8B-B14F-4D97-AF65-F5344CB8AC3E}">
+        <p14:creationId xmlns:p14="http://schemas.microsoft.com/office/powerpoint/2010/main" val="2043896619"/>
+      </p:ext>
+    </p:extLst>
+  </p:cSld>
+  <p:clrMapOvr>
+    <a:masterClrMapping/>
+  </p:clrMapOvr>
+  <p:timing>
+    <p:tnLst>
+      <p:par>
+        <p:cTn id="1" dur="indefinite" restart="never" nodeType="tmRoot">
+          <p:childTnLst>
+            <p:seq concurrent="1" nextAc="seek">
+              <p:cTn id="2" dur="indefinite" nodeType="mainSeq">
+                <p:childTnLst>
+                  <p:par>
+                    <p:cTn id="3" fill="hold">
+                      <p:stCondLst>
+                        <p:cond delay="indefinite"/>
+                      </p:stCondLst>
+                      <p:childTnLst>
+                        <p:par>
+                          <p:cTn id="4" fill="hold">
+                            <p:stCondLst>
+                              <p:cond delay="0"/>
+                            </p:stCondLst>
+                            <p:childTnLst>
+                              <p:par>
+                                <p:cTn id="5" presetID="16" presetClass="entr" presetSubtype="21" fill="hold" grpId="0" nodeType="clickEffect">
+                                  <p:stCondLst>
+                                    <p:cond delay="0"/>
+                                  </p:stCondLst>
+                                  <p:childTnLst>
+                                    <p:set>
+                                      <p:cBhvr>
+                                        <p:cTn id="6" dur="1" fill="hold">
+                                          <p:stCondLst>
+                                            <p:cond delay="0"/>
+                                          </p:stCondLst>
+                                        </p:cTn>
+                                        <p:tgtEl>
+                                          <p:spTgt spid="2"/>
+                                        </p:tgtEl>
+                                        <p:attrNameLst>
+                                          <p:attrName>style.visibility</p:attrName>
+                                        </p:attrNameLst>
+                                      </p:cBhvr>
+                                      <p:to>
+                                        <p:strVal val="visible"/>
+                                      </p:to>
+                                    </p:set>
+                                    <p:animEffect transition="in" filter="barn(inVertical)">
+                                      <p:cBhvr>
+                                        <p:cTn id="7" dur="500"/>
+                                        <p:tgtEl>
+                                          <p:spTgt spid="2"/>
+                                        </p:tgtEl>
+                                      </p:cBhvr>
+                                    </p:animEffect>
+                                  </p:childTnLst>
+                                </p:cTn>
+                              </p:par>
+                            </p:childTnLst>
+                          </p:cTn>
+                        </p:par>
+                      </p:childTnLst>
+                    </p:cTn>
+                  </p:par>
+                  <p:par>
+                    <p:cTn id="8" fill="hold">
+                      <p:stCondLst>
+                        <p:cond delay="indefinite"/>
+                      </p:stCondLst>
+                      <p:childTnLst>
+                        <p:par>
+                          <p:cTn id="9" fill="hold">
+                            <p:stCondLst>
+                              <p:cond delay="0"/>
+                            </p:stCondLst>
+                            <p:childTnLst>
+                              <p:par>
+                                <p:cTn id="10" presetID="10" presetClass="entr" presetSubtype="0" fill="hold" grpId="0" nodeType="clickEffect">
+                                  <p:stCondLst>
+                                    <p:cond delay="0"/>
+                                  </p:stCondLst>
+                                  <p:childTnLst>
+                                    <p:set>
+                                      <p:cBhvr>
+                                        <p:cTn id="11" dur="1" fill="hold">
+                                          <p:stCondLst>
+                                            <p:cond delay="0"/>
+                                          </p:stCondLst>
+                                        </p:cTn>
+                                        <p:tgtEl>
+                                          <p:spTgt spid="3">
+                                            <p:txEl>
+                                              <p:pRg st="0" end="0"/>
+                                            </p:txEl>
+                                          </p:spTgt>
+                                        </p:tgtEl>
+                                        <p:attrNameLst>
+                                          <p:attrName>style.visibility</p:attrName>
+                                        </p:attrNameLst>
+                                      </p:cBhvr>
+                                      <p:to>
+                                        <p:strVal val="visible"/>
+                                      </p:to>
+                                    </p:set>
+                                    <p:animEffect transition="in" filter="fade">
+                                      <p:cBhvr>
+                                        <p:cTn id="12" dur="500"/>
+                                        <p:tgtEl>
+                                          <p:spTgt spid="3">
+                                            <p:txEl>
+                                              <p:pRg st="0" end="0"/>
+                                            </p:txEl>
+                                          </p:spTgt>
+                                        </p:tgtEl>
+                                      </p:cBhvr>
+                                    </p:animEffect>
+                                  </p:childTnLst>
+                                </p:cTn>
+                              </p:par>
+                            </p:childTnLst>
+                          </p:cTn>
+                        </p:par>
+                      </p:childTnLst>
+                    </p:cTn>
+                  </p:par>
+                  <p:par>
+                    <p:cTn id="13" fill="hold">
+                      <p:stCondLst>
+                        <p:cond delay="indefinite"/>
+                      </p:stCondLst>
+                      <p:childTnLst>
+                        <p:par>
+                          <p:cTn id="14" fill="hold">
+                            <p:stCondLst>
+                              <p:cond delay="0"/>
+                            </p:stCondLst>
+                            <p:childTnLst>
+                              <p:par>
+                                <p:cTn id="15" presetID="10" presetClass="entr" presetSubtype="0" fill="hold" grpId="0" nodeType="clickEffect">
+                                  <p:stCondLst>
+                                    <p:cond delay="0"/>
+                                  </p:stCondLst>
+                                  <p:childTnLst>
+                                    <p:set>
+                                      <p:cBhvr>
+                                        <p:cTn id="16" dur="1" fill="hold">
+                                          <p:stCondLst>
+                                            <p:cond delay="0"/>
+                                          </p:stCondLst>
+                                        </p:cTn>
+                                        <p:tgtEl>
+                                          <p:spTgt spid="3">
+                                            <p:txEl>
+                                              <p:pRg st="1" end="1"/>
+                                            </p:txEl>
+                                          </p:spTgt>
+                                        </p:tgtEl>
+                                        <p:attrNameLst>
+                                          <p:attrName>style.visibility</p:attrName>
+                                        </p:attrNameLst>
+                                      </p:cBhvr>
+                                      <p:to>
+                                        <p:strVal val="visible"/>
+                                      </p:to>
+                                    </p:set>
+                                    <p:animEffect transition="in" filter="fade">
+                                      <p:cBhvr>
+                                        <p:cTn id="17" dur="500"/>
+                                        <p:tgtEl>
+                                          <p:spTgt spid="3">
+                                            <p:txEl>
+                                              <p:pRg st="1" end="1"/>
+                                            </p:txEl>
+                                          </p:spTgt>
+                                        </p:tgtEl>
+                                      </p:cBhvr>
+                                    </p:animEffect>
+                                  </p:childTnLst>
+                                </p:cTn>
+                              </p:par>
+                            </p:childTnLst>
+                          </p:cTn>
+                        </p:par>
+                      </p:childTnLst>
+                    </p:cTn>
+                  </p:par>
+                  <p:par>
+                    <p:cTn id="18" fill="hold">
+                      <p:stCondLst>
+                        <p:cond delay="indefinite"/>
+                      </p:stCondLst>
+                      <p:childTnLst>
+                        <p:par>
+                          <p:cTn id="19" fill="hold">
+                            <p:stCondLst>
+                              <p:cond delay="0"/>
+                            </p:stCondLst>
+                            <p:childTnLst>
+                              <p:par>
+                                <p:cTn id="20" presetID="10" presetClass="entr" presetSubtype="0" fill="hold" grpId="0" nodeType="clickEffect">
+                                  <p:stCondLst>
+                                    <p:cond delay="0"/>
+                                  </p:stCondLst>
+                                  <p:childTnLst>
+                                    <p:set>
+                                      <p:cBhvr>
+                                        <p:cTn id="21" dur="1" fill="hold">
+                                          <p:stCondLst>
+                                            <p:cond delay="0"/>
+                                          </p:stCondLst>
+                                        </p:cTn>
+                                        <p:tgtEl>
+                                          <p:spTgt spid="3">
+                                            <p:txEl>
+                                              <p:pRg st="2" end="2"/>
+                                            </p:txEl>
+                                          </p:spTgt>
+                                        </p:tgtEl>
+                                        <p:attrNameLst>
+                                          <p:attrName>style.visibility</p:attrName>
+                                        </p:attrNameLst>
+                                      </p:cBhvr>
+                                      <p:to>
+                                        <p:strVal val="visible"/>
+                                      </p:to>
+                                    </p:set>
+                                    <p:animEffect transition="in" filter="fade">
+                                      <p:cBhvr>
+                                        <p:cTn id="22" dur="500"/>
+                                        <p:tgtEl>
+                                          <p:spTgt spid="3">
+                                            <p:txEl>
+                                              <p:pRg st="2" end="2"/>
+                                            </p:txEl>
+                                          </p:spTgt>
+                                        </p:tgtEl>
+                                      </p:cBhvr>
+                                    </p:animEffect>
+                                  </p:childTnLst>
+                                </p:cTn>
+                              </p:par>
+                            </p:childTnLst>
+                          </p:cTn>
+                        </p:par>
+                      </p:childTnLst>
+                    </p:cTn>
+                  </p:par>
+                  <p:par>
+                    <p:cTn id="23" fill="hold">
+                      <p:stCondLst>
+                        <p:cond delay="indefinite"/>
+                      </p:stCondLst>
+                      <p:childTnLst>
+                        <p:par>
+                          <p:cTn id="24" fill="hold">
+                            <p:stCondLst>
+                              <p:cond delay="0"/>
+                            </p:stCondLst>
+                            <p:childTnLst>
+                              <p:par>
+                                <p:cTn id="25" presetID="10" presetClass="entr" presetSubtype="0" fill="hold" grpId="0" nodeType="clickEffect">
+                                  <p:stCondLst>
+                                    <p:cond delay="0"/>
+                                  </p:stCondLst>
+                                  <p:childTnLst>
+                                    <p:set>
+                                      <p:cBhvr>
+                                        <p:cTn id="26" dur="1" fill="hold">
+                                          <p:stCondLst>
+                                            <p:cond delay="0"/>
+                                          </p:stCondLst>
+                                        </p:cTn>
+                                        <p:tgtEl>
+                                          <p:spTgt spid="3">
+                                            <p:txEl>
+                                              <p:pRg st="3" end="3"/>
+                                            </p:txEl>
+                                          </p:spTgt>
+                                        </p:tgtEl>
+                                        <p:attrNameLst>
+                                          <p:attrName>style.visibility</p:attrName>
+                                        </p:attrNameLst>
+                                      </p:cBhvr>
+                                      <p:to>
+                                        <p:strVal val="visible"/>
+                                      </p:to>
+                                    </p:set>
+                                    <p:animEffect transition="in" filter="fade">
+                                      <p:cBhvr>
+                                        <p:cTn id="27" dur="500"/>
+                                        <p:tgtEl>
+                                          <p:spTgt spid="3">
+                                            <p:txEl>
+                                              <p:pRg st="3" end="3"/>
+                                            </p:txEl>
+                                          </p:spTgt>
+                                        </p:tgtEl>
+                                      </p:cBhvr>
+                                    </p:animEffect>
+                                  </p:childTnLst>
+                                </p:cTn>
+                              </p:par>
+                            </p:childTnLst>
+                          </p:cTn>
+                        </p:par>
+                      </p:childTnLst>
+                    </p:cTn>
+                  </p:par>
+                  <p:par>
+                    <p:cTn id="28" fill="hold">
+                      <p:stCondLst>
+                        <p:cond delay="indefinite"/>
+                      </p:stCondLst>
+                      <p:childTnLst>
+                        <p:par>
+                          <p:cTn id="29" fill="hold">
+                            <p:stCondLst>
+                              <p:cond delay="0"/>
+                            </p:stCondLst>
+                            <p:childTnLst>
+                              <p:par>
+                                <p:cTn id="30" presetID="10" presetClass="entr" presetSubtype="0" fill="hold" grpId="0" nodeType="clickEffect">
+                                  <p:stCondLst>
+                                    <p:cond delay="0"/>
+                                  </p:stCondLst>
+                                  <p:childTnLst>
+                                    <p:set>
+                                      <p:cBhvr>
+                                        <p:cTn id="31" dur="1" fill="hold">
+                                          <p:stCondLst>
+                                            <p:cond delay="0"/>
+                                          </p:stCondLst>
+                                        </p:cTn>
+                                        <p:tgtEl>
+                                          <p:spTgt spid="5"/>
+                                        </p:tgtEl>
+                                        <p:attrNameLst>
+                                          <p:attrName>style.visibility</p:attrName>
+                                        </p:attrNameLst>
+                                      </p:cBhvr>
+                                      <p:to>
+                                        <p:strVal val="visible"/>
+                                      </p:to>
+                                    </p:set>
+                                    <p:animEffect transition="in" filter="fade">
+                                      <p:cBhvr>
+                                        <p:cTn id="32" dur="500"/>
+                                        <p:tgtEl>
+                                          <p:spTgt spid="5"/>
+                                        </p:tgtEl>
+                                      </p:cBhvr>
+                                    </p:animEffect>
+                                  </p:childTnLst>
+                                </p:cTn>
+                              </p:par>
+                            </p:childTnLst>
+                          </p:cTn>
+                        </p:par>
+                      </p:childTnLst>
+                    </p:cTn>
+                  </p:par>
+                  <p:par>
+                    <p:cTn id="33" fill="hold">
+                      <p:stCondLst>
+                        <p:cond delay="indefinite"/>
+                      </p:stCondLst>
+                      <p:childTnLst>
+                        <p:par>
+                          <p:cTn id="34" fill="hold">
+                            <p:stCondLst>
+                              <p:cond delay="0"/>
+                            </p:stCondLst>
+                            <p:childTnLst>
+                              <p:par>
+                                <p:cTn id="35" presetID="16" presetClass="entr" presetSubtype="21" fill="hold" grpId="0" nodeType="clickEffect">
+                                  <p:stCondLst>
+                                    <p:cond delay="0"/>
+                                  </p:stCondLst>
+                                  <p:childTnLst>
+                                    <p:set>
+                                      <p:cBhvr>
+                                        <p:cTn id="36" dur="1" fill="hold">
+                                          <p:stCondLst>
+                                            <p:cond delay="0"/>
+                                          </p:stCondLst>
+                                        </p:cTn>
+                                        <p:tgtEl>
+                                          <p:spTgt spid="7"/>
+                                        </p:tgtEl>
+                                        <p:attrNameLst>
+                                          <p:attrName>style.visibility</p:attrName>
+                                        </p:attrNameLst>
+                                      </p:cBhvr>
+                                      <p:to>
+                                        <p:strVal val="visible"/>
+                                      </p:to>
+                                    </p:set>
+                                    <p:animEffect transition="in" filter="barn(inVertical)">
+                                      <p:cBhvr>
+                                        <p:cTn id="37" dur="500"/>
+                                        <p:tgtEl>
+                                          <p:spTgt spid="7"/>
+                                        </p:tgtEl>
+                                      </p:cBhvr>
+                                    </p:animEffect>
+                                  </p:childTnLst>
+                                </p:cTn>
+                              </p:par>
+                            </p:childTnLst>
+                          </p:cTn>
+                        </p:par>
+                      </p:childTnLst>
+                    </p:cTn>
+                  </p:par>
+                </p:childTnLst>
+              </p:cTn>
+              <p:prevCondLst>
+                <p:cond evt="onPrev" delay="0">
+                  <p:tgtEl>
+                    <p:sldTgt/>
+                  </p:tgtEl>
+                </p:cond>
+              </p:prevCondLst>
+              <p:nextCondLst>
+                <p:cond evt="onNext" delay="0">
+                  <p:tgtEl>
+                    <p:sldTgt/>
+                  </p:tgtEl>
+                </p:cond>
+              </p:nextCondLst>
+            </p:seq>
+          </p:childTnLst>
+        </p:cTn>
+      </p:par>
+    </p:tnLst>
+    <p:bldLst>
+      <p:bldP spid="2" grpId="0"/>
+      <p:bldP spid="3" grpId="0" build="p"/>
+      <p:bldP spid="5" grpId="0"/>
+      <p:bldP spid="7" grpId="0"/>
+    </p:bldLst>
+  </p:timing>
+</p:sld>
+</file>
+
+<file path=ppt/slides/slide11.xml><?xml version="1.0" encoding="utf-8"?>
+<p:sld xmlns:a="http://schemas.openxmlformats.org/drawingml/2006/main" xmlns:r="http://schemas.openxmlformats.org/officeDocument/2006/relationships" xmlns:p="http://schemas.openxmlformats.org/presentationml/2006/main">
+  <p:cSld>
+    <p:spTree>
+      <p:nvGrpSpPr>
+        <p:cNvPr id="1" name=""/>
+        <p:cNvGrpSpPr/>
+        <p:nvPr/>
+      </p:nvGrpSpPr>
+      <p:grpSpPr>
+        <a:xfrm>
+          <a:off x="0" y="0"/>
+          <a:ext cx="0" cy="0"/>
+          <a:chOff x="0" y="0"/>
+          <a:chExt cx="0" cy="0"/>
+        </a:xfrm>
+      </p:grpSpPr>
+      <p:sp>
+        <p:nvSpPr>
+          <p:cNvPr id="2" name="Title 1">
+            <a:extLst>
+              <a:ext uri="{FF2B5EF4-FFF2-40B4-BE49-F238E27FC236}">
+                <a16:creationId xmlns:a16="http://schemas.microsoft.com/office/drawing/2014/main" id="{27056953-169D-0257-80A6-A8E4FA16B8D8}"/>
+              </a:ext>
+            </a:extLst>
+          </p:cNvPr>
+          <p:cNvSpPr>
+            <a:spLocks noGrp="1"/>
+          </p:cNvSpPr>
+          <p:nvPr>
+            <p:ph type="title"/>
+          </p:nvPr>
+        </p:nvSpPr>
+        <p:spPr>
+          <a:xfrm>
+            <a:off x="838200" y="365126"/>
+            <a:ext cx="10515600" cy="557742"/>
+          </a:xfrm>
+        </p:spPr>
+        <p:txBody>
+          <a:bodyPr>
+            <a:normAutofit/>
+          </a:bodyPr>
+          <a:lstStyle/>
+          <a:p>
+            <a:r>
+              <a:rPr lang="en-US" sz="3200" dirty="0"/>
+              <a:t>SONARQUBE ENTERPRISE DASHBOARD 📈</a:t>
+            </a:r>
+          </a:p>
+        </p:txBody>
+      </p:sp>
+      <p:sp>
+        <p:nvSpPr>
+          <p:cNvPr id="3" name="Content Placeholder 2">
+            <a:extLst>
+              <a:ext uri="{FF2B5EF4-FFF2-40B4-BE49-F238E27FC236}">
+                <a16:creationId xmlns:a16="http://schemas.microsoft.com/office/drawing/2014/main" id="{5CC1CA65-BB9D-59BE-EDF0-59DCA52B363D}"/>
+              </a:ext>
+            </a:extLst>
+          </p:cNvPr>
+          <p:cNvSpPr>
+            <a:spLocks noGrp="1"/>
+          </p:cNvSpPr>
+          <p:nvPr>
+            <p:ph idx="1"/>
+          </p:nvPr>
+        </p:nvSpPr>
+        <p:spPr>
+          <a:xfrm>
+            <a:off x="838200" y="1385359"/>
+            <a:ext cx="4470400" cy="2212975"/>
+          </a:xfrm>
+        </p:spPr>
+        <p:txBody>
+          <a:bodyPr>
+            <a:normAutofit/>
+          </a:bodyPr>
+          <a:lstStyle/>
+          <a:p>
+            <a:pPr marL="0" indent="0">
+              <a:buNone/>
+            </a:pPr>
+            <a:r>
+              <a:rPr lang="en-US" sz="1400" dirty="0"/>
+              <a:t>LIVE METRICS DARI PROJECT INI:</a:t>
+            </a:r>
+          </a:p>
+          <a:p>
+            <a:pPr marL="0" indent="0">
+              <a:buNone/>
+            </a:pPr>
+            <a:r>
+              <a:rPr lang="en-US" sz="1400" dirty="0"/>
+              <a:t>📊 Coverage: 45 files analyzed across 6 languages</a:t>
+            </a:r>
+          </a:p>
+          <a:p>
+            <a:pPr marL="0" indent="0">
+              <a:buNone/>
+            </a:pPr>
+            <a:r>
+              <a:rPr lang="en-US" sz="1400" dirty="0"/>
+              <a:t>✅ Quality Gate: PASSED</a:t>
+            </a:r>
+          </a:p>
+          <a:p>
+            <a:pPr marL="0" indent="0">
+              <a:buNone/>
+            </a:pPr>
+            <a:r>
+              <a:rPr lang="en-US" sz="1400" dirty="0"/>
+              <a:t>🐛 Bugs: 0 (</a:t>
+            </a:r>
+            <a:r>
+              <a:rPr lang="en-US" sz="1400" dirty="0" err="1"/>
+              <a:t>setelah</a:t>
+            </a:r>
+            <a:r>
+              <a:rPr lang="en-US" sz="1400" dirty="0"/>
+              <a:t> pre-commit filtering)</a:t>
+            </a:r>
+          </a:p>
+          <a:p>
+            <a:pPr marL="0" indent="0">
+              <a:buNone/>
+            </a:pPr>
+            <a:r>
+              <a:rPr lang="en-US" sz="1400" dirty="0"/>
+              <a:t>🛡️ Security: 0 vulnerabilities</a:t>
+            </a:r>
+          </a:p>
+          <a:p>
+            <a:pPr marL="0" indent="0">
+              <a:buNone/>
+            </a:pPr>
+            <a:r>
+              <a:rPr lang="en-US" sz="1400" dirty="0"/>
+              <a:t>📉 Code Smells: Reduced by 87%</a:t>
+            </a:r>
+          </a:p>
+          <a:p>
+            <a:pPr marL="0" indent="0">
+              <a:buNone/>
+            </a:pPr>
+            <a:r>
+              <a:rPr lang="en-US" sz="1400" dirty="0"/>
+              <a:t>⏱️ Tech Debt: 2.5 days → 20 minutes</a:t>
+            </a:r>
+          </a:p>
+        </p:txBody>
+      </p:sp>
+      <p:sp>
+        <p:nvSpPr>
+          <p:cNvPr id="5" name="TextBox 4">
+            <a:extLst>
+              <a:ext uri="{FF2B5EF4-FFF2-40B4-BE49-F238E27FC236}">
+                <a16:creationId xmlns:a16="http://schemas.microsoft.com/office/drawing/2014/main" id="{8221CFBB-03AF-9DEE-1681-217CCC5E56D3}"/>
+              </a:ext>
+            </a:extLst>
+          </p:cNvPr>
+          <p:cNvSpPr txBox="1"/>
+          <p:nvPr/>
+        </p:nvSpPr>
+        <p:spPr>
+          <a:xfrm>
+            <a:off x="5909733" y="2337957"/>
+            <a:ext cx="4775200" cy="307777"/>
+          </a:xfrm>
+          <a:prstGeom prst="rect">
+            <a:avLst/>
+          </a:prstGeom>
+          <a:noFill/>
+        </p:spPr>
+        <p:txBody>
+          <a:bodyPr wrap="square">
+            <a:spAutoFit/>
+          </a:bodyPr>
+          <a:lstStyle/>
+          <a:p>
+            <a:r>
+              <a:rPr lang="en-US" sz="1400" dirty="0"/>
+              <a:t>BUSINESS VALUE: Clear metrics </a:t>
+            </a:r>
+            <a:r>
+              <a:rPr lang="en-US" sz="1400" dirty="0" err="1"/>
+              <a:t>untuk</a:t>
+            </a:r>
+            <a:r>
+              <a:rPr lang="en-US" sz="1400" dirty="0"/>
+              <a:t> management review</a:t>
+            </a:r>
+          </a:p>
+        </p:txBody>
+      </p:sp>
+      <p:sp>
+        <p:nvSpPr>
+          <p:cNvPr id="9" name="TextBox 8">
+            <a:extLst>
+              <a:ext uri="{FF2B5EF4-FFF2-40B4-BE49-F238E27FC236}">
+                <a16:creationId xmlns:a16="http://schemas.microsoft.com/office/drawing/2014/main" id="{CA9AC608-7440-FF6B-949A-180EF9FDB8F1}"/>
+              </a:ext>
+            </a:extLst>
+          </p:cNvPr>
+          <p:cNvSpPr txBox="1"/>
+          <p:nvPr/>
+        </p:nvSpPr>
+        <p:spPr>
+          <a:xfrm>
+            <a:off x="5808134" y="4463534"/>
+            <a:ext cx="6096000" cy="369332"/>
+          </a:xfrm>
+          <a:prstGeom prst="rect">
+            <a:avLst/>
+          </a:prstGeom>
+          <a:noFill/>
+        </p:spPr>
+        <p:txBody>
+          <a:bodyPr wrap="square">
+            <a:spAutoFit/>
+          </a:bodyPr>
+          <a:lstStyle/>
+          <a:p>
+            <a:r>
+              <a:rPr lang="en-US" dirty="0">
+                <a:solidFill>
+                  <a:srgbClr val="FF0000"/>
+                </a:solidFill>
+              </a:rPr>
+              <a:t>Ini </a:t>
+            </a:r>
+            <a:r>
+              <a:rPr lang="en-US" dirty="0" err="1">
+                <a:solidFill>
+                  <a:srgbClr val="FF0000"/>
+                </a:solidFill>
+              </a:rPr>
+              <a:t>bukan</a:t>
+            </a:r>
+            <a:r>
+              <a:rPr lang="en-US" dirty="0">
+                <a:solidFill>
+                  <a:srgbClr val="FF0000"/>
+                </a:solidFill>
+              </a:rPr>
+              <a:t> </a:t>
+            </a:r>
+            <a:r>
+              <a:rPr lang="en-US" dirty="0" err="1">
+                <a:solidFill>
+                  <a:srgbClr val="FF0000"/>
+                </a:solidFill>
+              </a:rPr>
+              <a:t>sekedar</a:t>
+            </a:r>
+            <a:r>
+              <a:rPr lang="en-US" dirty="0">
+                <a:solidFill>
+                  <a:srgbClr val="FF0000"/>
+                </a:solidFill>
+              </a:rPr>
+              <a:t> tools, </a:t>
+            </a:r>
+            <a:r>
+              <a:rPr lang="en-US" dirty="0" err="1">
+                <a:solidFill>
+                  <a:srgbClr val="FF0000"/>
+                </a:solidFill>
+              </a:rPr>
+              <a:t>tapi</a:t>
+            </a:r>
+            <a:r>
+              <a:rPr lang="en-US" dirty="0">
+                <a:solidFill>
+                  <a:srgbClr val="FF0000"/>
+                </a:solidFill>
+              </a:rPr>
+              <a:t> investment </a:t>
+            </a:r>
+            <a:r>
+              <a:rPr lang="en-US" dirty="0" err="1">
+                <a:solidFill>
+                  <a:srgbClr val="FF0000"/>
+                </a:solidFill>
+              </a:rPr>
+              <a:t>jangka</a:t>
+            </a:r>
+            <a:r>
+              <a:rPr lang="en-US" dirty="0">
+                <a:solidFill>
+                  <a:srgbClr val="FF0000"/>
+                </a:solidFill>
+              </a:rPr>
+              <a:t> </a:t>
+            </a:r>
+            <a:r>
+              <a:rPr lang="en-US" dirty="0" err="1">
+                <a:solidFill>
+                  <a:srgbClr val="FF0000"/>
+                </a:solidFill>
+              </a:rPr>
+              <a:t>panjang</a:t>
+            </a:r>
+            <a:endParaRPr lang="en-US" dirty="0">
+              <a:solidFill>
+                <a:srgbClr val="FF0000"/>
+              </a:solidFill>
+            </a:endParaRPr>
+          </a:p>
+        </p:txBody>
+      </p:sp>
+    </p:spTree>
+    <p:extLst>
+      <p:ext uri="{BB962C8B-B14F-4D97-AF65-F5344CB8AC3E}">
+        <p14:creationId xmlns:p14="http://schemas.microsoft.com/office/powerpoint/2010/main" val="2498021767"/>
+      </p:ext>
+    </p:extLst>
+  </p:cSld>
+  <p:clrMapOvr>
+    <a:masterClrMapping/>
+  </p:clrMapOvr>
+  <p:timing>
+    <p:tnLst>
+      <p:par>
+        <p:cTn id="1" dur="indefinite" restart="never" nodeType="tmRoot">
+          <p:childTnLst>
+            <p:seq concurrent="1" nextAc="seek">
+              <p:cTn id="2" dur="indefinite" nodeType="mainSeq">
+                <p:childTnLst>
+                  <p:par>
+                    <p:cTn id="3" fill="hold">
+                      <p:stCondLst>
+                        <p:cond delay="indefinite"/>
+                      </p:stCondLst>
+                      <p:childTnLst>
+                        <p:par>
+                          <p:cTn id="4" fill="hold">
+                            <p:stCondLst>
+                              <p:cond delay="0"/>
+                            </p:stCondLst>
+                            <p:childTnLst>
+                              <p:par>
+                                <p:cTn id="5" presetID="16" presetClass="entr" presetSubtype="21" fill="hold" grpId="0" nodeType="clickEffect">
+                                  <p:stCondLst>
+                                    <p:cond delay="0"/>
+                                  </p:stCondLst>
+                                  <p:childTnLst>
+                                    <p:set>
+                                      <p:cBhvr>
+                                        <p:cTn id="6" dur="1" fill="hold">
+                                          <p:stCondLst>
+                                            <p:cond delay="0"/>
+                                          </p:stCondLst>
+                                        </p:cTn>
+                                        <p:tgtEl>
+                                          <p:spTgt spid="2"/>
+                                        </p:tgtEl>
+                                        <p:attrNameLst>
+                                          <p:attrName>style.visibility</p:attrName>
+                                        </p:attrNameLst>
+                                      </p:cBhvr>
+                                      <p:to>
+                                        <p:strVal val="visible"/>
+                                      </p:to>
+                                    </p:set>
+                                    <p:animEffect transition="in" filter="barn(inVertical)">
+                                      <p:cBhvr>
+                                        <p:cTn id="7" dur="500"/>
+                                        <p:tgtEl>
+                                          <p:spTgt spid="2"/>
+                                        </p:tgtEl>
+                                      </p:cBhvr>
+                                    </p:animEffect>
+                                  </p:childTnLst>
+                                </p:cTn>
+                              </p:par>
+                            </p:childTnLst>
+                          </p:cTn>
+                        </p:par>
+                      </p:childTnLst>
+                    </p:cTn>
+                  </p:par>
+                  <p:par>
+                    <p:cTn id="8" fill="hold">
+                      <p:stCondLst>
+                        <p:cond delay="indefinite"/>
+                      </p:stCondLst>
+                      <p:childTnLst>
+                        <p:par>
+                          <p:cTn id="9" fill="hold">
+                            <p:stCondLst>
+                              <p:cond delay="0"/>
+                            </p:stCondLst>
+                            <p:childTnLst>
+                              <p:par>
+                                <p:cTn id="10" presetID="10" presetClass="entr" presetSubtype="0" fill="hold" grpId="0" nodeType="clickEffect">
+                                  <p:stCondLst>
+                                    <p:cond delay="0"/>
+                                  </p:stCondLst>
+                                  <p:childTnLst>
+                                    <p:set>
+                                      <p:cBhvr>
+                                        <p:cTn id="11" dur="1" fill="hold">
+                                          <p:stCondLst>
+                                            <p:cond delay="0"/>
+                                          </p:stCondLst>
+                                        </p:cTn>
+                                        <p:tgtEl>
+                                          <p:spTgt spid="3">
+                                            <p:txEl>
+                                              <p:pRg st="0" end="0"/>
+                                            </p:txEl>
+                                          </p:spTgt>
+                                        </p:tgtEl>
+                                        <p:attrNameLst>
+                                          <p:attrName>style.visibility</p:attrName>
+                                        </p:attrNameLst>
+                                      </p:cBhvr>
+                                      <p:to>
+                                        <p:strVal val="visible"/>
+                                      </p:to>
+                                    </p:set>
+                                    <p:animEffect transition="in" filter="fade">
+                                      <p:cBhvr>
+                                        <p:cTn id="12" dur="500"/>
+                                        <p:tgtEl>
+                                          <p:spTgt spid="3">
+                                            <p:txEl>
+                                              <p:pRg st="0" end="0"/>
+                                            </p:txEl>
+                                          </p:spTgt>
+                                        </p:tgtEl>
+                                      </p:cBhvr>
+                                    </p:animEffect>
+                                  </p:childTnLst>
+                                </p:cTn>
+                              </p:par>
+                            </p:childTnLst>
+                          </p:cTn>
+                        </p:par>
+                      </p:childTnLst>
+                    </p:cTn>
+                  </p:par>
+                  <p:par>
+                    <p:cTn id="13" fill="hold">
+                      <p:stCondLst>
+                        <p:cond delay="indefinite"/>
+                      </p:stCondLst>
+                      <p:childTnLst>
+                        <p:par>
+                          <p:cTn id="14" fill="hold">
+                            <p:stCondLst>
+                              <p:cond delay="0"/>
+                            </p:stCondLst>
+                            <p:childTnLst>
+                              <p:par>
+                                <p:cTn id="15" presetID="10" presetClass="entr" presetSubtype="0" fill="hold" grpId="0" nodeType="clickEffect">
+                                  <p:stCondLst>
+                                    <p:cond delay="0"/>
+                                  </p:stCondLst>
+                                  <p:childTnLst>
+                                    <p:set>
+                                      <p:cBhvr>
+                                        <p:cTn id="16" dur="1" fill="hold">
+                                          <p:stCondLst>
+                                            <p:cond delay="0"/>
+                                          </p:stCondLst>
+                                        </p:cTn>
+                                        <p:tgtEl>
+                                          <p:spTgt spid="3">
+                                            <p:txEl>
+                                              <p:pRg st="1" end="1"/>
+                                            </p:txEl>
+                                          </p:spTgt>
+                                        </p:tgtEl>
+                                        <p:attrNameLst>
+                                          <p:attrName>style.visibility</p:attrName>
+                                        </p:attrNameLst>
+                                      </p:cBhvr>
+                                      <p:to>
+                                        <p:strVal val="visible"/>
+                                      </p:to>
+                                    </p:set>
+                                    <p:animEffect transition="in" filter="fade">
+                                      <p:cBhvr>
+                                        <p:cTn id="17" dur="500"/>
+                                        <p:tgtEl>
+                                          <p:spTgt spid="3">
+                                            <p:txEl>
+                                              <p:pRg st="1" end="1"/>
+                                            </p:txEl>
+                                          </p:spTgt>
+                                        </p:tgtEl>
+                                      </p:cBhvr>
+                                    </p:animEffect>
+                                  </p:childTnLst>
+                                </p:cTn>
+                              </p:par>
+                            </p:childTnLst>
+                          </p:cTn>
+                        </p:par>
+                      </p:childTnLst>
+                    </p:cTn>
+                  </p:par>
+                  <p:par>
+                    <p:cTn id="18" fill="hold">
+                      <p:stCondLst>
+                        <p:cond delay="indefinite"/>
+                      </p:stCondLst>
+                      <p:childTnLst>
+                        <p:par>
+                          <p:cTn id="19" fill="hold">
+                            <p:stCondLst>
+                              <p:cond delay="0"/>
+                            </p:stCondLst>
+                            <p:childTnLst>
+                              <p:par>
+                                <p:cTn id="20" presetID="10" presetClass="entr" presetSubtype="0" fill="hold" grpId="0" nodeType="clickEffect">
+                                  <p:stCondLst>
+                                    <p:cond delay="0"/>
+                                  </p:stCondLst>
+                                  <p:childTnLst>
+                                    <p:set>
+                                      <p:cBhvr>
+                                        <p:cTn id="21" dur="1" fill="hold">
+                                          <p:stCondLst>
+                                            <p:cond delay="0"/>
+                                          </p:stCondLst>
+                                        </p:cTn>
+                                        <p:tgtEl>
+                                          <p:spTgt spid="3">
+                                            <p:txEl>
+                                              <p:pRg st="2" end="2"/>
+                                            </p:txEl>
+                                          </p:spTgt>
+                                        </p:tgtEl>
+                                        <p:attrNameLst>
+                                          <p:attrName>style.visibility</p:attrName>
+                                        </p:attrNameLst>
+                                      </p:cBhvr>
+                                      <p:to>
+                                        <p:strVal val="visible"/>
+                                      </p:to>
+                                    </p:set>
+                                    <p:animEffect transition="in" filter="fade">
+                                      <p:cBhvr>
+                                        <p:cTn id="22" dur="500"/>
+                                        <p:tgtEl>
+                                          <p:spTgt spid="3">
+                                            <p:txEl>
+                                              <p:pRg st="2" end="2"/>
+                                            </p:txEl>
+                                          </p:spTgt>
+                                        </p:tgtEl>
+                                      </p:cBhvr>
+                                    </p:animEffect>
+                                  </p:childTnLst>
+                                </p:cTn>
+                              </p:par>
+                            </p:childTnLst>
+                          </p:cTn>
+                        </p:par>
+                      </p:childTnLst>
+                    </p:cTn>
+                  </p:par>
+                  <p:par>
+                    <p:cTn id="23" fill="hold">
+                      <p:stCondLst>
+                        <p:cond delay="indefinite"/>
+                      </p:stCondLst>
+                      <p:childTnLst>
+                        <p:par>
+                          <p:cTn id="24" fill="hold">
+                            <p:stCondLst>
+                              <p:cond delay="0"/>
+                            </p:stCondLst>
+                            <p:childTnLst>
+                              <p:par>
+                                <p:cTn id="25" presetID="10" presetClass="entr" presetSubtype="0" fill="hold" grpId="0" nodeType="clickEffect">
+                                  <p:stCondLst>
+                                    <p:cond delay="0"/>
+                                  </p:stCondLst>
+                                  <p:childTnLst>
+                                    <p:set>
+                                      <p:cBhvr>
+                                        <p:cTn id="26" dur="1" fill="hold">
+                                          <p:stCondLst>
+                                            <p:cond delay="0"/>
+                                          </p:stCondLst>
+                                        </p:cTn>
+                                        <p:tgtEl>
+                                          <p:spTgt spid="3">
+                                            <p:txEl>
+                                              <p:pRg st="3" end="3"/>
+                                            </p:txEl>
+                                          </p:spTgt>
+                                        </p:tgtEl>
+                                        <p:attrNameLst>
+                                          <p:attrName>style.visibility</p:attrName>
+                                        </p:attrNameLst>
+                                      </p:cBhvr>
+                                      <p:to>
+                                        <p:strVal val="visible"/>
+                                      </p:to>
+                                    </p:set>
+                                    <p:animEffect transition="in" filter="fade">
+                                      <p:cBhvr>
+                                        <p:cTn id="27" dur="500"/>
+                                        <p:tgtEl>
+                                          <p:spTgt spid="3">
+                                            <p:txEl>
+                                              <p:pRg st="3" end="3"/>
+                                            </p:txEl>
+                                          </p:spTgt>
+                                        </p:tgtEl>
+                                      </p:cBhvr>
+                                    </p:animEffect>
+                                  </p:childTnLst>
+                                </p:cTn>
+                              </p:par>
+                            </p:childTnLst>
+                          </p:cTn>
+                        </p:par>
+                      </p:childTnLst>
+                    </p:cTn>
+                  </p:par>
+                  <p:par>
+                    <p:cTn id="28" fill="hold">
+                      <p:stCondLst>
+                        <p:cond delay="indefinite"/>
+                      </p:stCondLst>
+                      <p:childTnLst>
+                        <p:par>
+                          <p:cTn id="29" fill="hold">
+                            <p:stCondLst>
+                              <p:cond delay="0"/>
+                            </p:stCondLst>
+                            <p:childTnLst>
+                              <p:par>
+                                <p:cTn id="30" presetID="10" presetClass="entr" presetSubtype="0" fill="hold" grpId="0" nodeType="clickEffect">
+                                  <p:stCondLst>
+                                    <p:cond delay="0"/>
+                                  </p:stCondLst>
+                                  <p:childTnLst>
+                                    <p:set>
+                                      <p:cBhvr>
+                                        <p:cTn id="31" dur="1" fill="hold">
+                                          <p:stCondLst>
+                                            <p:cond delay="0"/>
+                                          </p:stCondLst>
+                                        </p:cTn>
+                                        <p:tgtEl>
+                                          <p:spTgt spid="3">
+                                            <p:txEl>
+                                              <p:pRg st="4" end="4"/>
+                                            </p:txEl>
+                                          </p:spTgt>
+                                        </p:tgtEl>
+                                        <p:attrNameLst>
+                                          <p:attrName>style.visibility</p:attrName>
+                                        </p:attrNameLst>
+                                      </p:cBhvr>
+                                      <p:to>
+                                        <p:strVal val="visible"/>
+                                      </p:to>
+                                    </p:set>
+                                    <p:animEffect transition="in" filter="fade">
+                                      <p:cBhvr>
+                                        <p:cTn id="32" dur="500"/>
+                                        <p:tgtEl>
+                                          <p:spTgt spid="3">
+                                            <p:txEl>
+                                              <p:pRg st="4" end="4"/>
+                                            </p:txEl>
+                                          </p:spTgt>
+                                        </p:tgtEl>
+                                      </p:cBhvr>
+                                    </p:animEffect>
+                                  </p:childTnLst>
+                                </p:cTn>
+                              </p:par>
+                            </p:childTnLst>
+                          </p:cTn>
+                        </p:par>
+                      </p:childTnLst>
+                    </p:cTn>
+                  </p:par>
+                  <p:par>
+                    <p:cTn id="33" fill="hold">
+                      <p:stCondLst>
+                        <p:cond delay="indefinite"/>
+                      </p:stCondLst>
+                      <p:childTnLst>
+                        <p:par>
+                          <p:cTn id="34" fill="hold">
+                            <p:stCondLst>
+                              <p:cond delay="0"/>
+                            </p:stCondLst>
+                            <p:childTnLst>
+                              <p:par>
+                                <p:cTn id="35" presetID="10" presetClass="entr" presetSubtype="0" fill="hold" grpId="0" nodeType="clickEffect">
+                                  <p:stCondLst>
+                                    <p:cond delay="0"/>
+                                  </p:stCondLst>
+                                  <p:childTnLst>
+                                    <p:set>
+                                      <p:cBhvr>
+                                        <p:cTn id="36" dur="1" fill="hold">
+                                          <p:stCondLst>
+                                            <p:cond delay="0"/>
+                                          </p:stCondLst>
+                                        </p:cTn>
+                                        <p:tgtEl>
+                                          <p:spTgt spid="3">
+                                            <p:txEl>
+                                              <p:pRg st="5" end="5"/>
+                                            </p:txEl>
+                                          </p:spTgt>
+                                        </p:tgtEl>
+                                        <p:attrNameLst>
+                                          <p:attrName>style.visibility</p:attrName>
+                                        </p:attrNameLst>
+                                      </p:cBhvr>
+                                      <p:to>
+                                        <p:strVal val="visible"/>
+                                      </p:to>
+                                    </p:set>
+                                    <p:animEffect transition="in" filter="fade">
+                                      <p:cBhvr>
+                                        <p:cTn id="37" dur="500"/>
+                                        <p:tgtEl>
+                                          <p:spTgt spid="3">
+                                            <p:txEl>
+                                              <p:pRg st="5" end="5"/>
+                                            </p:txEl>
+                                          </p:spTgt>
+                                        </p:tgtEl>
+                                      </p:cBhvr>
+                                    </p:animEffect>
+                                  </p:childTnLst>
+                                </p:cTn>
+                              </p:par>
+                            </p:childTnLst>
+                          </p:cTn>
+                        </p:par>
+                      </p:childTnLst>
+                    </p:cTn>
+                  </p:par>
+                  <p:par>
+                    <p:cTn id="38" fill="hold">
+                      <p:stCondLst>
+                        <p:cond delay="indefinite"/>
+                      </p:stCondLst>
+                      <p:childTnLst>
+                        <p:par>
+                          <p:cTn id="39" fill="hold">
+                            <p:stCondLst>
+                              <p:cond delay="0"/>
+                            </p:stCondLst>
+                            <p:childTnLst>
+                              <p:par>
+                                <p:cTn id="40" presetID="10" presetClass="entr" presetSubtype="0" fill="hold" grpId="0" nodeType="clickEffect">
+                                  <p:stCondLst>
+                                    <p:cond delay="0"/>
+                                  </p:stCondLst>
+                                  <p:childTnLst>
+                                    <p:set>
+                                      <p:cBhvr>
+                                        <p:cTn id="41" dur="1" fill="hold">
+                                          <p:stCondLst>
+                                            <p:cond delay="0"/>
+                                          </p:stCondLst>
+                                        </p:cTn>
+                                        <p:tgtEl>
+                                          <p:spTgt spid="3">
+                                            <p:txEl>
+                                              <p:pRg st="6" end="6"/>
+                                            </p:txEl>
+                                          </p:spTgt>
+                                        </p:tgtEl>
+                                        <p:attrNameLst>
+                                          <p:attrName>style.visibility</p:attrName>
+                                        </p:attrNameLst>
+                                      </p:cBhvr>
+                                      <p:to>
+                                        <p:strVal val="visible"/>
+                                      </p:to>
+                                    </p:set>
+                                    <p:animEffect transition="in" filter="fade">
+                                      <p:cBhvr>
+                                        <p:cTn id="42" dur="500"/>
+                                        <p:tgtEl>
+                                          <p:spTgt spid="3">
+                                            <p:txEl>
+                                              <p:pRg st="6" end="6"/>
+                                            </p:txEl>
+                                          </p:spTgt>
+                                        </p:tgtEl>
+                                      </p:cBhvr>
+                                    </p:animEffect>
+                                  </p:childTnLst>
+                                </p:cTn>
+                              </p:par>
+                            </p:childTnLst>
+                          </p:cTn>
+                        </p:par>
+                      </p:childTnLst>
+                    </p:cTn>
+                  </p:par>
+                  <p:par>
+                    <p:cTn id="43" fill="hold">
+                      <p:stCondLst>
+                        <p:cond delay="indefinite"/>
+                      </p:stCondLst>
+                      <p:childTnLst>
+                        <p:par>
+                          <p:cTn id="44" fill="hold">
+                            <p:stCondLst>
+                              <p:cond delay="0"/>
+                            </p:stCondLst>
+                            <p:childTnLst>
+                              <p:par>
+                                <p:cTn id="45" presetID="10" presetClass="entr" presetSubtype="0" fill="hold" grpId="0" nodeType="clickEffect">
+                                  <p:stCondLst>
+                                    <p:cond delay="0"/>
+                                  </p:stCondLst>
+                                  <p:childTnLst>
+                                    <p:set>
+                                      <p:cBhvr>
+                                        <p:cTn id="46" dur="1" fill="hold">
+                                          <p:stCondLst>
+                                            <p:cond delay="0"/>
+                                          </p:stCondLst>
+                                        </p:cTn>
+                                        <p:tgtEl>
+                                          <p:spTgt spid="5"/>
+                                        </p:tgtEl>
+                                        <p:attrNameLst>
+                                          <p:attrName>style.visibility</p:attrName>
+                                        </p:attrNameLst>
+                                      </p:cBhvr>
+                                      <p:to>
+                                        <p:strVal val="visible"/>
+                                      </p:to>
+                                    </p:set>
+                                    <p:animEffect transition="in" filter="fade">
+                                      <p:cBhvr>
+                                        <p:cTn id="47" dur="500"/>
+                                        <p:tgtEl>
+                                          <p:spTgt spid="5"/>
+                                        </p:tgtEl>
+                                      </p:cBhvr>
+                                    </p:animEffect>
+                                  </p:childTnLst>
+                                </p:cTn>
+                              </p:par>
+                            </p:childTnLst>
+                          </p:cTn>
+                        </p:par>
+                      </p:childTnLst>
+                    </p:cTn>
+                  </p:par>
+                  <p:par>
+                    <p:cTn id="48" fill="hold">
+                      <p:stCondLst>
+                        <p:cond delay="indefinite"/>
+                      </p:stCondLst>
+                      <p:childTnLst>
+                        <p:par>
+                          <p:cTn id="49" fill="hold">
+                            <p:stCondLst>
+                              <p:cond delay="0"/>
+                            </p:stCondLst>
+                            <p:childTnLst>
+                              <p:par>
+                                <p:cTn id="50" presetID="16" presetClass="entr" presetSubtype="21" fill="hold" grpId="0" nodeType="clickEffect">
+                                  <p:stCondLst>
+                                    <p:cond delay="0"/>
+                                  </p:stCondLst>
+                                  <p:childTnLst>
+                                    <p:set>
+                                      <p:cBhvr>
+                                        <p:cTn id="51" dur="1" fill="hold">
+                                          <p:stCondLst>
+                                            <p:cond delay="0"/>
+                                          </p:stCondLst>
+                                        </p:cTn>
+                                        <p:tgtEl>
+                                          <p:spTgt spid="9"/>
+                                        </p:tgtEl>
+                                        <p:attrNameLst>
+                                          <p:attrName>style.visibility</p:attrName>
+                                        </p:attrNameLst>
+                                      </p:cBhvr>
+                                      <p:to>
+                                        <p:strVal val="visible"/>
+                                      </p:to>
+                                    </p:set>
+                                    <p:animEffect transition="in" filter="barn(inVertical)">
+                                      <p:cBhvr>
+                                        <p:cTn id="52" dur="500"/>
+                                        <p:tgtEl>
+                                          <p:spTgt spid="9"/>
+                                        </p:tgtEl>
+                                      </p:cBhvr>
+                                    </p:animEffect>
+                                  </p:childTnLst>
+                                </p:cTn>
+                              </p:par>
+                            </p:childTnLst>
+                          </p:cTn>
+                        </p:par>
+                      </p:childTnLst>
+                    </p:cTn>
+                  </p:par>
+                </p:childTnLst>
+              </p:cTn>
+              <p:prevCondLst>
+                <p:cond evt="onPrev" delay="0">
+                  <p:tgtEl>
+                    <p:sldTgt/>
+                  </p:tgtEl>
+                </p:cond>
+              </p:prevCondLst>
+              <p:nextCondLst>
+                <p:cond evt="onNext" delay="0">
+                  <p:tgtEl>
+                    <p:sldTgt/>
+                  </p:tgtEl>
+                </p:cond>
+              </p:nextCondLst>
+            </p:seq>
+          </p:childTnLst>
+        </p:cTn>
+      </p:par>
+    </p:tnLst>
+    <p:bldLst>
+      <p:bldP spid="2" grpId="0"/>
+      <p:bldP spid="3" grpId="0" build="p"/>
+      <p:bldP spid="5" grpId="0"/>
+      <p:bldP spid="9" grpId="0"/>
+    </p:bldLst>
+  </p:timing>
+</p:sld>
+</file>
+
+<file path=ppt/slides/slide12.xml><?xml version="1.0" encoding="utf-8"?>
+<p:sld xmlns:a="http://schemas.openxmlformats.org/drawingml/2006/main" xmlns:r="http://schemas.openxmlformats.org/officeDocument/2006/relationships" xmlns:p="http://schemas.openxmlformats.org/presentationml/2006/main">
+  <p:cSld>
+    <p:spTree>
+      <p:nvGrpSpPr>
+        <p:cNvPr id="1" name=""/>
+        <p:cNvGrpSpPr/>
+        <p:nvPr/>
+      </p:nvGrpSpPr>
+      <p:grpSpPr>
+        <a:xfrm>
+          <a:off x="0" y="0"/>
+          <a:ext cx="0" cy="0"/>
+          <a:chOff x="0" y="0"/>
+          <a:chExt cx="0" cy="0"/>
+        </a:xfrm>
+      </p:grpSpPr>
+      <p:sp>
+        <p:nvSpPr>
+          <p:cNvPr id="2" name="Title 1">
+            <a:extLst>
+              <a:ext uri="{FF2B5EF4-FFF2-40B4-BE49-F238E27FC236}">
                 <a16:creationId xmlns:a16="http://schemas.microsoft.com/office/drawing/2014/main" id="{93A7F3A9-771C-1803-CE65-B9BC282D36A8}"/>
               </a:ext>
             </a:extLst>
@@ -5195,7 +6917,7 @@
 </p:sld>
 </file>
 
-<file path=ppt/slides/slide11.xml><?xml version="1.0" encoding="utf-8"?>
+<file path=ppt/slides/slide13.xml><?xml version="1.0" encoding="utf-8"?>
 <p:sld xmlns:a="http://schemas.openxmlformats.org/drawingml/2006/main" xmlns:r="http://schemas.openxmlformats.org/officeDocument/2006/relationships" xmlns:p="http://schemas.openxmlformats.org/presentationml/2006/main">
   <p:cSld>
     <p:spTree>
@@ -6261,7 +7983,7 @@
 </p:sld>
 </file>
 
-<file path=ppt/slides/slide12.xml><?xml version="1.0" encoding="utf-8"?>
+<file path=ppt/slides/slide14.xml><?xml version="1.0" encoding="utf-8"?>
 <p:sld xmlns:a="http://schemas.openxmlformats.org/drawingml/2006/main" xmlns:r="http://schemas.openxmlformats.org/officeDocument/2006/relationships" xmlns:p="http://schemas.openxmlformats.org/presentationml/2006/main">
   <p:cSld>
     <p:spTree>
@@ -7239,7 +8961,7 @@
 </p:sld>
 </file>
 
-<file path=ppt/slides/slide13.xml><?xml version="1.0" encoding="utf-8"?>
+<file path=ppt/slides/slide15.xml><?xml version="1.0" encoding="utf-8"?>
 <p:sld xmlns:a="http://schemas.openxmlformats.org/drawingml/2006/main" xmlns:r="http://schemas.openxmlformats.org/officeDocument/2006/relationships" xmlns:p="http://schemas.openxmlformats.org/presentationml/2006/main">
   <p:cSld>
     <p:spTree>
@@ -8168,7 +9890,7 @@
 </p:sld>
 </file>
 
-<file path=ppt/slides/slide14.xml><?xml version="1.0" encoding="utf-8"?>
+<file path=ppt/slides/slide16.xml><?xml version="1.0" encoding="utf-8"?>
 <p:sld xmlns:a="http://schemas.openxmlformats.org/drawingml/2006/main" xmlns:r="http://schemas.openxmlformats.org/officeDocument/2006/relationships" xmlns:p="http://schemas.openxmlformats.org/presentationml/2006/main">
   <p:cSld>
     <p:spTree>
@@ -9090,7 +10812,7 @@
 </p:sld>
 </file>
 
-<file path=ppt/slides/slide15.xml><?xml version="1.0" encoding="utf-8"?>
+<file path=ppt/slides/slide17.xml><?xml version="1.0" encoding="utf-8"?>
 <p:sld xmlns:a="http://schemas.openxmlformats.org/drawingml/2006/main" xmlns:r="http://schemas.openxmlformats.org/officeDocument/2006/relationships" xmlns:p="http://schemas.openxmlformats.org/presentationml/2006/main">
   <p:cSld>
     <p:spTree>
@@ -10022,7 +11744,340 @@
 </p:sld>
 </file>
 
-<file path=ppt/slides/slide16.xml><?xml version="1.0" encoding="utf-8"?>
+<file path=ppt/slides/slide18.xml><?xml version="1.0" encoding="utf-8"?>
+<p:sld xmlns:a="http://schemas.openxmlformats.org/drawingml/2006/main" xmlns:r="http://schemas.openxmlformats.org/officeDocument/2006/relationships" xmlns:p="http://schemas.openxmlformats.org/presentationml/2006/main">
+  <p:cSld>
+    <p:spTree>
+      <p:nvGrpSpPr>
+        <p:cNvPr id="1" name=""/>
+        <p:cNvGrpSpPr/>
+        <p:nvPr/>
+      </p:nvGrpSpPr>
+      <p:grpSpPr>
+        <a:xfrm>
+          <a:off x="0" y="0"/>
+          <a:ext cx="0" cy="0"/>
+          <a:chOff x="0" y="0"/>
+          <a:chExt cx="0" cy="0"/>
+        </a:xfrm>
+      </p:grpSpPr>
+      <p:sp>
+        <p:nvSpPr>
+          <p:cNvPr id="2" name="Title 1">
+            <a:extLst>
+              <a:ext uri="{FF2B5EF4-FFF2-40B4-BE49-F238E27FC236}">
+                <a16:creationId xmlns:a16="http://schemas.microsoft.com/office/drawing/2014/main" id="{2D4B1007-CFEF-FD00-5203-EBA60BAC0A21}"/>
+              </a:ext>
+            </a:extLst>
+          </p:cNvPr>
+          <p:cNvSpPr>
+            <a:spLocks noGrp="1"/>
+          </p:cNvSpPr>
+          <p:nvPr>
+            <p:ph type="title"/>
+          </p:nvPr>
+        </p:nvSpPr>
+        <p:spPr>
+          <a:xfrm>
+            <a:off x="838200" y="365125"/>
+            <a:ext cx="10515600" cy="600075"/>
+          </a:xfrm>
+        </p:spPr>
+        <p:txBody>
+          <a:bodyPr>
+            <a:normAutofit fontScale="90000"/>
+          </a:bodyPr>
+          <a:lstStyle/>
+          <a:p>
+            <a:r>
+              <a:rPr lang="en-US" dirty="0"/>
+              <a:t>Member </a:t>
+            </a:r>
+            <a:r>
+              <a:rPr lang="en-US" dirty="0" err="1"/>
+              <a:t>AppDev</a:t>
+            </a:r>
+            <a:endParaRPr lang="en-US" dirty="0"/>
+          </a:p>
+        </p:txBody>
+      </p:sp>
+      <p:pic>
+        <p:nvPicPr>
+          <p:cNvPr id="5" name="Content Placeholder 4" descr="A screenshot of a computer&#10;&#10;AI-generated content may be incorrect.">
+            <a:extLst>
+              <a:ext uri="{FF2B5EF4-FFF2-40B4-BE49-F238E27FC236}">
+                <a16:creationId xmlns:a16="http://schemas.microsoft.com/office/drawing/2014/main" id="{03A8127D-FDDF-6C4F-2EFF-DB84933092D5}"/>
+              </a:ext>
+            </a:extLst>
+          </p:cNvPr>
+          <p:cNvPicPr>
+            <a:picLocks noGrp="1" noChangeAspect="1"/>
+          </p:cNvPicPr>
+          <p:nvPr>
+            <p:ph idx="1"/>
+          </p:nvPr>
+        </p:nvPicPr>
+        <p:blipFill>
+          <a:blip r:embed="rId2">
+            <a:extLst>
+              <a:ext uri="{28A0092B-C50C-407E-A947-70E740481C1C}">
+                <a14:useLocalDpi xmlns:a14="http://schemas.microsoft.com/office/drawing/2010/main" val="0"/>
+              </a:ext>
+            </a:extLst>
+          </a:blip>
+          <a:stretch>
+            <a:fillRect/>
+          </a:stretch>
+        </p:blipFill>
+        <p:spPr>
+          <a:xfrm>
+            <a:off x="954042" y="1072092"/>
+            <a:ext cx="4845626" cy="4351338"/>
+          </a:xfrm>
+        </p:spPr>
+      </p:pic>
+      <p:pic>
+        <p:nvPicPr>
+          <p:cNvPr id="9" name="Picture 8" descr="A screen shot of a computer&#10;&#10;AI-generated content may be incorrect.">
+            <a:extLst>
+              <a:ext uri="{FF2B5EF4-FFF2-40B4-BE49-F238E27FC236}">
+                <a16:creationId xmlns:a16="http://schemas.microsoft.com/office/drawing/2014/main" id="{F4D5631C-5597-6253-846E-56FAB2439241}"/>
+              </a:ext>
+            </a:extLst>
+          </p:cNvPr>
+          <p:cNvPicPr>
+            <a:picLocks noChangeAspect="1"/>
+          </p:cNvPicPr>
+          <p:nvPr/>
+        </p:nvPicPr>
+        <p:blipFill>
+          <a:blip r:embed="rId3">
+            <a:extLst>
+              <a:ext uri="{28A0092B-C50C-407E-A947-70E740481C1C}">
+                <a14:useLocalDpi xmlns:a14="http://schemas.microsoft.com/office/drawing/2010/main" val="0"/>
+              </a:ext>
+            </a:extLst>
+          </a:blip>
+          <a:stretch>
+            <a:fillRect/>
+          </a:stretch>
+        </p:blipFill>
+        <p:spPr>
+          <a:xfrm>
+            <a:off x="5799668" y="1072092"/>
+            <a:ext cx="5740400" cy="4351338"/>
+          </a:xfrm>
+          <a:prstGeom prst="rect">
+            <a:avLst/>
+          </a:prstGeom>
+        </p:spPr>
+      </p:pic>
+    </p:spTree>
+    <p:extLst>
+      <p:ext uri="{BB962C8B-B14F-4D97-AF65-F5344CB8AC3E}">
+        <p14:creationId xmlns:p14="http://schemas.microsoft.com/office/powerpoint/2010/main" val="1261718722"/>
+      </p:ext>
+    </p:extLst>
+  </p:cSld>
+  <p:clrMapOvr>
+    <a:masterClrMapping/>
+  </p:clrMapOvr>
+  <p:timing>
+    <p:tnLst>
+      <p:par>
+        <p:cTn id="1" dur="indefinite" restart="never" nodeType="tmRoot">
+          <p:childTnLst>
+            <p:seq concurrent="1" nextAc="seek">
+              <p:cTn id="2" dur="indefinite" nodeType="mainSeq">
+                <p:childTnLst>
+                  <p:par>
+                    <p:cTn id="3" fill="hold">
+                      <p:stCondLst>
+                        <p:cond delay="indefinite"/>
+                      </p:stCondLst>
+                      <p:childTnLst>
+                        <p:par>
+                          <p:cTn id="4" fill="hold">
+                            <p:stCondLst>
+                              <p:cond delay="0"/>
+                            </p:stCondLst>
+                            <p:childTnLst>
+                              <p:par>
+                                <p:cTn id="5" presetID="16" presetClass="entr" presetSubtype="21" fill="hold" grpId="0" nodeType="clickEffect">
+                                  <p:stCondLst>
+                                    <p:cond delay="0"/>
+                                  </p:stCondLst>
+                                  <p:childTnLst>
+                                    <p:set>
+                                      <p:cBhvr>
+                                        <p:cTn id="6" dur="1" fill="hold">
+                                          <p:stCondLst>
+                                            <p:cond delay="0"/>
+                                          </p:stCondLst>
+                                        </p:cTn>
+                                        <p:tgtEl>
+                                          <p:spTgt spid="2"/>
+                                        </p:tgtEl>
+                                        <p:attrNameLst>
+                                          <p:attrName>style.visibility</p:attrName>
+                                        </p:attrNameLst>
+                                      </p:cBhvr>
+                                      <p:to>
+                                        <p:strVal val="visible"/>
+                                      </p:to>
+                                    </p:set>
+                                    <p:animEffect transition="in" filter="barn(inVertical)">
+                                      <p:cBhvr>
+                                        <p:cTn id="7" dur="500"/>
+                                        <p:tgtEl>
+                                          <p:spTgt spid="2"/>
+                                        </p:tgtEl>
+                                      </p:cBhvr>
+                                    </p:animEffect>
+                                  </p:childTnLst>
+                                </p:cTn>
+                              </p:par>
+                            </p:childTnLst>
+                          </p:cTn>
+                        </p:par>
+                      </p:childTnLst>
+                    </p:cTn>
+                  </p:par>
+                  <p:par>
+                    <p:cTn id="8" fill="hold">
+                      <p:stCondLst>
+                        <p:cond delay="indefinite"/>
+                      </p:stCondLst>
+                      <p:childTnLst>
+                        <p:par>
+                          <p:cTn id="9" fill="hold">
+                            <p:stCondLst>
+                              <p:cond delay="0"/>
+                            </p:stCondLst>
+                            <p:childTnLst>
+                              <p:par>
+                                <p:cTn id="10" presetID="10" presetClass="entr" presetSubtype="0" fill="hold" nodeType="clickEffect">
+                                  <p:stCondLst>
+                                    <p:cond delay="0"/>
+                                  </p:stCondLst>
+                                  <p:childTnLst>
+                                    <p:set>
+                                      <p:cBhvr>
+                                        <p:cTn id="11" dur="1" fill="hold">
+                                          <p:stCondLst>
+                                            <p:cond delay="0"/>
+                                          </p:stCondLst>
+                                        </p:cTn>
+                                        <p:tgtEl>
+                                          <p:spTgt spid="5"/>
+                                        </p:tgtEl>
+                                        <p:attrNameLst>
+                                          <p:attrName>style.visibility</p:attrName>
+                                        </p:attrNameLst>
+                                      </p:cBhvr>
+                                      <p:to>
+                                        <p:strVal val="visible"/>
+                                      </p:to>
+                                    </p:set>
+                                    <p:animEffect transition="in" filter="fade">
+                                      <p:cBhvr>
+                                        <p:cTn id="12" dur="500"/>
+                                        <p:tgtEl>
+                                          <p:spTgt spid="5"/>
+                                        </p:tgtEl>
+                                      </p:cBhvr>
+                                    </p:animEffect>
+                                  </p:childTnLst>
+                                </p:cTn>
+                              </p:par>
+                            </p:childTnLst>
+                          </p:cTn>
+                        </p:par>
+                      </p:childTnLst>
+                    </p:cTn>
+                  </p:par>
+                  <p:par>
+                    <p:cTn id="13" fill="hold">
+                      <p:stCondLst>
+                        <p:cond delay="indefinite"/>
+                      </p:stCondLst>
+                      <p:childTnLst>
+                        <p:par>
+                          <p:cTn id="14" fill="hold">
+                            <p:stCondLst>
+                              <p:cond delay="0"/>
+                            </p:stCondLst>
+                            <p:childTnLst>
+                              <p:par>
+                                <p:cTn id="15" presetID="10" presetClass="entr" presetSubtype="0" fill="hold" nodeType="clickEffect">
+                                  <p:stCondLst>
+                                    <p:cond delay="0"/>
+                                  </p:stCondLst>
+                                  <p:childTnLst>
+                                    <p:set>
+                                      <p:cBhvr>
+                                        <p:cTn id="16" dur="1" fill="hold">
+                                          <p:stCondLst>
+                                            <p:cond delay="0"/>
+                                          </p:stCondLst>
+                                        </p:cTn>
+                                        <p:tgtEl>
+                                          <p:spTgt spid="9"/>
+                                        </p:tgtEl>
+                                        <p:attrNameLst>
+                                          <p:attrName>style.visibility</p:attrName>
+                                        </p:attrNameLst>
+                                      </p:cBhvr>
+                                      <p:to>
+                                        <p:strVal val="visible"/>
+                                      </p:to>
+                                    </p:set>
+                                    <p:animEffect transition="in" filter="fade">
+                                      <p:cBhvr>
+                                        <p:cTn id="17" dur="500"/>
+                                        <p:tgtEl>
+                                          <p:spTgt spid="9"/>
+                                        </p:tgtEl>
+                                      </p:cBhvr>
+                                    </p:animEffect>
+                                  </p:childTnLst>
+                                </p:cTn>
+                              </p:par>
+                            </p:childTnLst>
+                          </p:cTn>
+                        </p:par>
+                      </p:childTnLst>
+                    </p:cTn>
+                  </p:par>
+                </p:childTnLst>
+              </p:cTn>
+              <p:prevCondLst>
+                <p:cond evt="onPrev" delay="0">
+                  <p:tgtEl>
+                    <p:sldTgt/>
+                  </p:tgtEl>
+                </p:cond>
+              </p:prevCondLst>
+              <p:nextCondLst>
+                <p:cond evt="onNext" delay="0">
+                  <p:tgtEl>
+                    <p:sldTgt/>
+                  </p:tgtEl>
+                </p:cond>
+              </p:nextCondLst>
+            </p:seq>
+          </p:childTnLst>
+        </p:cTn>
+      </p:par>
+    </p:tnLst>
+    <p:bldLst>
+      <p:bldP spid="2" grpId="0"/>
+    </p:bldLst>
+  </p:timing>
+</p:sld>
+</file>
+
+<file path=ppt/slides/slide19.xml><?xml version="1.0" encoding="utf-8"?>
 <p:sld xmlns:a="http://schemas.openxmlformats.org/drawingml/2006/main" xmlns:r="http://schemas.openxmlformats.org/officeDocument/2006/relationships" xmlns:p="http://schemas.openxmlformats.org/presentationml/2006/main">
   <p:cSld>
     <p:spTree>
@@ -14048,7 +16103,7 @@
           <p:cNvPr id="2" name="Title 1">
             <a:extLst>
               <a:ext uri="{FF2B5EF4-FFF2-40B4-BE49-F238E27FC236}">
-                <a16:creationId xmlns:a16="http://schemas.microsoft.com/office/drawing/2014/main" id="{81BF28E8-71B8-8550-3F4C-6B20D754D67D}"/>
+                <a16:creationId xmlns:a16="http://schemas.microsoft.com/office/drawing/2014/main" id="{F36EB081-21FB-2D63-FBD5-24CFA38D6EDC}"/>
               </a:ext>
             </a:extLst>
           </p:cNvPr>
@@ -14061,8 +16116,8 @@
         </p:nvSpPr>
         <p:spPr>
           <a:xfrm>
-            <a:off x="838200" y="365125"/>
-            <a:ext cx="8119533" cy="574675"/>
+            <a:off x="838200" y="365126"/>
+            <a:ext cx="10515600" cy="591608"/>
           </a:xfrm>
         </p:spPr>
         <p:txBody>
@@ -14073,7 +16128,7 @@
           <a:p>
             <a:r>
               <a:rPr lang="en-US" sz="3200" dirty="0"/>
-              <a:t>PHPSTAN LEVELS - PROGRESSIVE APPROACH 📊</a:t>
+              <a:t>LARASTAN VS AMAZON Q DEVELOPER - OVERVIEW 🤖</a:t>
             </a:r>
           </a:p>
         </p:txBody>
@@ -14083,7 +16138,7 @@
           <p:cNvPr id="3" name="Content Placeholder 2">
             <a:extLst>
               <a:ext uri="{FF2B5EF4-FFF2-40B4-BE49-F238E27FC236}">
-                <a16:creationId xmlns:a16="http://schemas.microsoft.com/office/drawing/2014/main" id="{6AECCAC9-9DD7-3D92-3F75-5FC44981DFF4}"/>
+                <a16:creationId xmlns:a16="http://schemas.microsoft.com/office/drawing/2014/main" id="{A8F06C27-4CA6-7956-3927-B2F4365B3B61}"/>
               </a:ext>
             </a:extLst>
           </p:cNvPr>
@@ -14096,13 +16151,13 @@
         </p:nvSpPr>
         <p:spPr>
           <a:xfrm>
-            <a:off x="838200" y="1436160"/>
-            <a:ext cx="3801533" cy="1213908"/>
+            <a:off x="956734" y="1249892"/>
+            <a:ext cx="2616200" cy="324908"/>
           </a:xfrm>
         </p:spPr>
         <p:txBody>
           <a:bodyPr>
-            <a:normAutofit lnSpcReduction="10000"/>
+            <a:normAutofit/>
           </a:bodyPr>
           <a:lstStyle/>
           <a:p>
@@ -14111,25 +16166,7 @@
             </a:pPr>
             <a:r>
               <a:rPr lang="en-US" sz="1400" dirty="0"/>
-              <a:t>LEVEL 0-2: FOUNDATION 🟢</a:t>
-            </a:r>
-          </a:p>
-          <a:p>
-            <a:r>
-              <a:rPr lang="en-US" sz="1400" dirty="0"/>
-              <a:t>Basic undefined variables, methods</a:t>
-            </a:r>
-          </a:p>
-          <a:p>
-            <a:r>
-              <a:rPr lang="en-US" sz="1400" dirty="0"/>
-              <a:t>Fatal error prevention</a:t>
-            </a:r>
-          </a:p>
-          <a:p>
-            <a:r>
-              <a:rPr lang="en-US" sz="1400" dirty="0"/>
-              <a:t>Good for: Legacy code, onboarding</a:t>
+              <a:t>DUA FILOSOFI BERBEDA:</a:t>
             </a:r>
           </a:p>
         </p:txBody>
@@ -14139,7 +16176,7 @@
           <p:cNvPr id="5" name="TextBox 4">
             <a:extLst>
               <a:ext uri="{FF2B5EF4-FFF2-40B4-BE49-F238E27FC236}">
-                <a16:creationId xmlns:a16="http://schemas.microsoft.com/office/drawing/2014/main" id="{3023CAC7-3BD4-BC71-918A-18D549430C85}"/>
+                <a16:creationId xmlns:a16="http://schemas.microsoft.com/office/drawing/2014/main" id="{80EEB372-B4EE-ABE0-955A-835F5FC89A05}"/>
               </a:ext>
             </a:extLst>
           </p:cNvPr>
@@ -14148,8 +16185,8 @@
         </p:nvSpPr>
         <p:spPr>
           <a:xfrm>
-            <a:off x="838200" y="2951946"/>
-            <a:ext cx="3149600" cy="954107"/>
+            <a:off x="956734" y="1742069"/>
+            <a:ext cx="3048000" cy="1169551"/>
           </a:xfrm>
           <a:prstGeom prst="rect">
             <a:avLst/>
@@ -14164,37 +16201,71 @@
           <a:p>
             <a:r>
               <a:rPr lang="en-US" sz="1400" dirty="0"/>
-              <a:t>LEVEL 3-5: PRODUCTION READY 🟡</a:t>
-            </a:r>
-          </a:p>
-          <a:p>
-            <a:pPr marL="285750" indent="-285750">
-              <a:buFont typeface="Arial" panose="020B0604020202020204" pitchFamily="34" charset="0"/>
-              <a:buChar char="•"/>
-            </a:pPr>
-            <a:r>
-              <a:rPr lang="en-US" sz="1400" dirty="0"/>
-              <a:t>Null safety, type checking</a:t>
-            </a:r>
-          </a:p>
-          <a:p>
-            <a:pPr marL="285750" indent="-285750">
-              <a:buFont typeface="Arial" panose="020B0604020202020204" pitchFamily="34" charset="0"/>
-              <a:buChar char="•"/>
-            </a:pPr>
-            <a:r>
-              <a:rPr lang="en-US" sz="1400" dirty="0"/>
-              <a:t>Method return types</a:t>
-            </a:r>
-          </a:p>
-          <a:p>
-            <a:pPr marL="285750" indent="-285750">
-              <a:buFont typeface="Arial" panose="020B0604020202020204" pitchFamily="34" charset="0"/>
-              <a:buChar char="•"/>
-            </a:pPr>
-            <a:r>
-              <a:rPr lang="en-US" sz="1400" dirty="0"/>
-              <a:t>Good for: Most applications</a:t>
+              <a:t>🔍 LARASTAN (</a:t>
+            </a:r>
+            <a:r>
+              <a:rPr lang="en-US" sz="1400" dirty="0" err="1"/>
+              <a:t>PHPStan</a:t>
+            </a:r>
+            <a:r>
+              <a:rPr lang="en-US" sz="1400" dirty="0"/>
+              <a:t> + Laravel)</a:t>
+            </a:r>
+          </a:p>
+          <a:p>
+            <a:r>
+              <a:rPr lang="en-US" sz="1400" dirty="0"/>
+              <a:t>- Static analysis </a:t>
+            </a:r>
+            <a:r>
+              <a:rPr lang="en-US" sz="1400" dirty="0" err="1"/>
+              <a:t>tanpa</a:t>
+            </a:r>
+            <a:r>
+              <a:rPr lang="en-US" sz="1400" dirty="0"/>
+              <a:t> </a:t>
+            </a:r>
+            <a:r>
+              <a:rPr lang="en-US" sz="1400" dirty="0" err="1"/>
+              <a:t>eksekusi</a:t>
+            </a:r>
+            <a:r>
+              <a:rPr lang="en-US" sz="1400" dirty="0"/>
+              <a:t> code</a:t>
+            </a:r>
+          </a:p>
+          <a:p>
+            <a:r>
+              <a:rPr lang="en-US" sz="1400" dirty="0"/>
+              <a:t>- Laravel-specific magic understanding  </a:t>
+            </a:r>
+          </a:p>
+          <a:p>
+            <a:r>
+              <a:rPr lang="en-US" sz="1400" dirty="0"/>
+              <a:t>- </a:t>
+            </a:r>
+            <a:r>
+              <a:rPr lang="en-US" sz="1400" dirty="0" err="1"/>
+              <a:t>Deteksi</a:t>
+            </a:r>
+            <a:r>
+              <a:rPr lang="en-US" sz="1400" dirty="0"/>
+              <a:t> bugs </a:t>
+            </a:r>
+            <a:r>
+              <a:rPr lang="en-US" sz="1400" dirty="0" err="1"/>
+              <a:t>sebelum</a:t>
+            </a:r>
+            <a:r>
+              <a:rPr lang="en-US" sz="1400" dirty="0"/>
+              <a:t> runtime</a:t>
+            </a:r>
+          </a:p>
+          <a:p>
+            <a:r>
+              <a:rPr lang="en-US" sz="1400" dirty="0"/>
+              <a:t>- Free &amp; open source solution</a:t>
             </a:r>
           </a:p>
         </p:txBody>
@@ -14204,7 +16275,7 @@
           <p:cNvPr id="7" name="TextBox 6">
             <a:extLst>
               <a:ext uri="{FF2B5EF4-FFF2-40B4-BE49-F238E27FC236}">
-                <a16:creationId xmlns:a16="http://schemas.microsoft.com/office/drawing/2014/main" id="{5F7443AB-4D4D-B393-9D35-34ACF14A364F}"/>
+                <a16:creationId xmlns:a16="http://schemas.microsoft.com/office/drawing/2014/main" id="{313EA452-AF2B-87E1-54CF-C493497E5F39}"/>
               </a:ext>
             </a:extLst>
           </p:cNvPr>
@@ -14213,8 +16284,8 @@
         </p:nvSpPr>
         <p:spPr>
           <a:xfrm>
-            <a:off x="838200" y="4207931"/>
-            <a:ext cx="3649133" cy="738664"/>
+            <a:off x="956735" y="3181402"/>
+            <a:ext cx="4174066" cy="1169551"/>
           </a:xfrm>
           <a:prstGeom prst="rect">
             <a:avLst/>
@@ -14229,27 +16300,39 @@
           <a:p>
             <a:r>
               <a:rPr lang="en-US" sz="1400" dirty="0"/>
-              <a:t>LEVEL 6-MAX: ENTERPRISE 🔴</a:t>
-            </a:r>
-          </a:p>
-          <a:p>
-            <a:pPr marL="285750" indent="-285750">
-              <a:buFont typeface="Arial" panose="020B0604020202020204" pitchFamily="34" charset="0"/>
-              <a:buChar char="•"/>
-            </a:pPr>
-            <a:r>
-              <a:rPr lang="en-US" sz="1400" dirty="0"/>
-              <a:t>Perfect documentation, strict types</a:t>
-            </a:r>
-          </a:p>
-          <a:p>
-            <a:pPr marL="285750" indent="-285750">
-              <a:buFont typeface="Arial" panose="020B0604020202020204" pitchFamily="34" charset="0"/>
-              <a:buChar char="•"/>
-            </a:pPr>
-            <a:r>
-              <a:rPr lang="en-US" sz="1400" dirty="0"/>
-              <a:t>Good for: Critical systems</a:t>
+              <a:t>🤖 AMAZON Q DEVELOPER (Formerly </a:t>
+            </a:r>
+            <a:r>
+              <a:rPr lang="en-US" sz="1400" dirty="0" err="1"/>
+              <a:t>CodeWhisperer</a:t>
+            </a:r>
+            <a:r>
+              <a:rPr lang="en-US" sz="1400" dirty="0"/>
+              <a:t>)</a:t>
+            </a:r>
+          </a:p>
+          <a:p>
+            <a:r>
+              <a:rPr lang="en-US" sz="1400" dirty="0"/>
+              <a:t>- AI-powered code generation &amp; suggestions</a:t>
+            </a:r>
+          </a:p>
+          <a:p>
+            <a:r>
+              <a:rPr lang="en-US" sz="1400" dirty="0"/>
+              <a:t>- Real-time development assistance  </a:t>
+            </a:r>
+          </a:p>
+          <a:p>
+            <a:r>
+              <a:rPr lang="en-US" sz="1400" dirty="0"/>
+              <a:t>- Contextual code completion</a:t>
+            </a:r>
+          </a:p>
+          <a:p>
+            <a:r>
+              <a:rPr lang="en-US" sz="1400" dirty="0"/>
+              <a:t>- $19/month premium features</a:t>
             </a:r>
           </a:p>
         </p:txBody>
@@ -14259,7 +16342,7 @@
           <p:cNvPr id="9" name="TextBox 8">
             <a:extLst>
               <a:ext uri="{FF2B5EF4-FFF2-40B4-BE49-F238E27FC236}">
-                <a16:creationId xmlns:a16="http://schemas.microsoft.com/office/drawing/2014/main" id="{030576A9-7F46-8069-7369-C1C6DDF738CB}"/>
+                <a16:creationId xmlns:a16="http://schemas.microsoft.com/office/drawing/2014/main" id="{DDB447D3-BB5A-5459-2A75-9373012EE33D}"/>
               </a:ext>
             </a:extLst>
           </p:cNvPr>
@@ -14268,8 +16351,8 @@
         </p:nvSpPr>
         <p:spPr>
           <a:xfrm>
-            <a:off x="4897966" y="2628780"/>
-            <a:ext cx="6096000" cy="369332"/>
+            <a:off x="5537200" y="2196868"/>
+            <a:ext cx="3945467" cy="738664"/>
           </a:xfrm>
           <a:prstGeom prst="rect">
             <a:avLst/>
@@ -14283,8 +16366,28 @@
           <a:lstStyle/>
           <a:p>
             <a:r>
-              <a:rPr lang="en-US" dirty="0"/>
-              <a:t>STRATEGY: Start Level 0 → Gradually increase → Target Level 5+</a:t>
+              <a:rPr lang="en-US" sz="1400" dirty="0"/>
+              <a:t>ANALOGI MUDAH:</a:t>
+            </a:r>
+          </a:p>
+          <a:p>
+            <a:r>
+              <a:rPr lang="en-US" sz="1400" dirty="0"/>
+              <a:t>- </a:t>
+            </a:r>
+            <a:r>
+              <a:rPr lang="en-US" sz="1400" dirty="0" err="1"/>
+              <a:t>Larastan</a:t>
+            </a:r>
+            <a:r>
+              <a:rPr lang="en-US" sz="1400" dirty="0"/>
+              <a:t> = Grammar checker (quality control)</a:t>
+            </a:r>
+          </a:p>
+          <a:p>
+            <a:r>
+              <a:rPr lang="en-US" sz="1400" dirty="0"/>
+              <a:t>- Amazon Q = Writing assistant (productivity boost)</a:t>
             </a:r>
           </a:p>
         </p:txBody>
@@ -14294,7 +16397,7 @@
           <p:cNvPr id="11" name="TextBox 10">
             <a:extLst>
               <a:ext uri="{FF2B5EF4-FFF2-40B4-BE49-F238E27FC236}">
-                <a16:creationId xmlns:a16="http://schemas.microsoft.com/office/drawing/2014/main" id="{E4EBC4AD-FD7E-2FF8-7F36-24EBA4712358}"/>
+                <a16:creationId xmlns:a16="http://schemas.microsoft.com/office/drawing/2014/main" id="{52B9A421-6843-20DE-B30D-D9D95B2C7526}"/>
               </a:ext>
             </a:extLst>
           </p:cNvPr>
@@ -14303,8 +16406,8 @@
         </p:nvSpPr>
         <p:spPr>
           <a:xfrm>
-            <a:off x="5740400" y="4317760"/>
-            <a:ext cx="6096000" cy="369332"/>
+            <a:off x="5664200" y="4248835"/>
+            <a:ext cx="5689600" cy="307777"/>
           </a:xfrm>
           <a:prstGeom prst="rect">
             <a:avLst/>
@@ -14318,15 +16421,23 @@
           <a:lstStyle/>
           <a:p>
             <a:r>
-              <a:rPr lang="en-US" dirty="0" err="1">
+              <a:rPr lang="en-US" sz="1400" dirty="0">
                 <a:solidFill>
                   <a:srgbClr val="FF0000"/>
                 </a:solidFill>
               </a:rPr>
-              <a:t>Sekarang</a:t>
-            </a:r>
-            <a:r>
-              <a:rPr lang="en-US" dirty="0">
+              <a:t>Dua approach </a:t>
+            </a:r>
+            <a:r>
+              <a:rPr lang="en-US" sz="1400" dirty="0" err="1">
+                <a:solidFill>
+                  <a:srgbClr val="FF0000"/>
+                </a:solidFill>
+              </a:rPr>
+              <a:t>berbeda</a:t>
+            </a:r>
+            <a:r>
+              <a:rPr lang="en-US" sz="1400" dirty="0">
                 <a:solidFill>
                   <a:srgbClr val="FF0000"/>
                 </a:solidFill>
@@ -14334,100 +16445,20 @@
               <a:t> </a:t>
             </a:r>
             <a:r>
-              <a:rPr lang="en-US" dirty="0" err="1">
+              <a:rPr lang="en-US" sz="1400" dirty="0" err="1">
                 <a:solidFill>
                   <a:srgbClr val="FF0000"/>
                 </a:solidFill>
               </a:rPr>
-              <a:t>mari</a:t>
-            </a:r>
-            <a:r>
-              <a:rPr lang="en-US" dirty="0">
+              <a:t>untuk</a:t>
+            </a:r>
+            <a:r>
+              <a:rPr lang="en-US" sz="1400" dirty="0">
                 <a:solidFill>
                   <a:srgbClr val="FF0000"/>
                 </a:solidFill>
               </a:rPr>
-              <a:t> </a:t>
-            </a:r>
-            <a:r>
-              <a:rPr lang="en-US" dirty="0" err="1">
-                <a:solidFill>
-                  <a:srgbClr val="FF0000"/>
-                </a:solidFill>
-              </a:rPr>
-              <a:t>lihat</a:t>
-            </a:r>
-            <a:r>
-              <a:rPr lang="en-US" dirty="0">
-                <a:solidFill>
-                  <a:srgbClr val="FF0000"/>
-                </a:solidFill>
-              </a:rPr>
-              <a:t> </a:t>
-            </a:r>
-            <a:r>
-              <a:rPr lang="en-US" dirty="0" err="1">
-                <a:solidFill>
-                  <a:srgbClr val="FF0000"/>
-                </a:solidFill>
-              </a:rPr>
-              <a:t>bagaimana</a:t>
-            </a:r>
-            <a:r>
-              <a:rPr lang="en-US" dirty="0">
-                <a:solidFill>
-                  <a:srgbClr val="FF0000"/>
-                </a:solidFill>
-              </a:rPr>
-              <a:t> tools </a:t>
-            </a:r>
-            <a:r>
-              <a:rPr lang="en-US" dirty="0" err="1">
-                <a:solidFill>
-                  <a:srgbClr val="FF0000"/>
-                </a:solidFill>
-              </a:rPr>
-              <a:t>ini</a:t>
-            </a:r>
-            <a:r>
-              <a:rPr lang="en-US" dirty="0">
-                <a:solidFill>
-                  <a:srgbClr val="FF0000"/>
-                </a:solidFill>
-              </a:rPr>
-              <a:t> </a:t>
-            </a:r>
-            <a:r>
-              <a:rPr lang="en-US" dirty="0" err="1">
-                <a:solidFill>
-                  <a:srgbClr val="FF0000"/>
-                </a:solidFill>
-              </a:rPr>
-              <a:t>bekerja</a:t>
-            </a:r>
-            <a:r>
-              <a:rPr lang="en-US" dirty="0">
-                <a:solidFill>
-                  <a:srgbClr val="FF0000"/>
-                </a:solidFill>
-              </a:rPr>
-              <a:t> </a:t>
-            </a:r>
-            <a:r>
-              <a:rPr lang="en-US" dirty="0" err="1">
-                <a:solidFill>
-                  <a:srgbClr val="FF0000"/>
-                </a:solidFill>
-              </a:rPr>
-              <a:t>dalam</a:t>
-            </a:r>
-            <a:r>
-              <a:rPr lang="en-US" dirty="0">
-                <a:solidFill>
-                  <a:srgbClr val="FF0000"/>
-                </a:solidFill>
-              </a:rPr>
-              <a:t> action</a:t>
+              <a:t> same goal: better code quality &amp; productivity</a:t>
             </a:r>
           </a:p>
         </p:txBody>
@@ -14435,7 +16466,7 @@
     </p:spTree>
     <p:extLst>
       <p:ext uri="{BB962C8B-B14F-4D97-AF65-F5344CB8AC3E}">
-        <p14:creationId xmlns:p14="http://schemas.microsoft.com/office/powerpoint/2010/main" val="4024820025"/>
+        <p14:creationId xmlns:p14="http://schemas.microsoft.com/office/powerpoint/2010/main" val="1540982602"/>
       </p:ext>
     </p:extLst>
   </p:cSld>
@@ -14590,11 +16621,7 @@
                                           </p:stCondLst>
                                         </p:cTn>
                                         <p:tgtEl>
-                                          <p:spTgt spid="3">
-                                            <p:txEl>
-                                              <p:pRg st="1" end="1"/>
-                                            </p:txEl>
-                                          </p:spTgt>
+                                          <p:spTgt spid="5"/>
                                         </p:tgtEl>
                                         <p:attrNameLst>
                                           <p:attrName>style.visibility</p:attrName>
@@ -14608,11 +16635,7 @@
                                       <p:cBhvr>
                                         <p:cTn id="17" dur="500"/>
                                         <p:tgtEl>
-                                          <p:spTgt spid="3">
-                                            <p:txEl>
-                                              <p:pRg st="1" end="1"/>
-                                            </p:txEl>
-                                          </p:spTgt>
+                                          <p:spTgt spid="5"/>
                                         </p:tgtEl>
                                       </p:cBhvr>
                                     </p:animEffect>
@@ -14651,11 +16674,7 @@
                                           </p:stCondLst>
                                         </p:cTn>
                                         <p:tgtEl>
-                                          <p:spTgt spid="3">
-                                            <p:txEl>
-                                              <p:pRg st="2" end="2"/>
-                                            </p:txEl>
-                                          </p:spTgt>
+                                          <p:spTgt spid="7"/>
                                         </p:tgtEl>
                                         <p:attrNameLst>
                                           <p:attrName>style.visibility</p:attrName>
@@ -14669,11 +16688,7 @@
                                       <p:cBhvr>
                                         <p:cTn id="22" dur="500"/>
                                         <p:tgtEl>
-                                          <p:spTgt spid="3">
-                                            <p:txEl>
-                                              <p:pRg st="2" end="2"/>
-                                            </p:txEl>
-                                          </p:spTgt>
+                                          <p:spTgt spid="7"/>
                                         </p:tgtEl>
                                       </p:cBhvr>
                                     </p:animEffect>
@@ -14712,11 +16727,7 @@
                                           </p:stCondLst>
                                         </p:cTn>
                                         <p:tgtEl>
-                                          <p:spTgt spid="3">
-                                            <p:txEl>
-                                              <p:pRg st="3" end="3"/>
-                                            </p:txEl>
-                                          </p:spTgt>
+                                          <p:spTgt spid="9"/>
                                         </p:tgtEl>
                                         <p:attrNameLst>
                                           <p:attrName>style.visibility</p:attrName>
@@ -14730,11 +16741,7 @@
                                       <p:cBhvr>
                                         <p:cTn id="27" dur="500"/>
                                         <p:tgtEl>
-                                          <p:spTgt spid="3">
-                                            <p:txEl>
-                                              <p:pRg st="3" end="3"/>
-                                            </p:txEl>
-                                          </p:spTgt>
+                                          <p:spTgt spid="9"/>
                                         </p:tgtEl>
                                       </p:cBhvr>
                                     </p:animEffect>
@@ -14760,7 +16767,7 @@
                             </p:stCondLst>
                             <p:childTnLst>
                               <p:par>
-                                <p:cTn id="30" presetID="10" presetClass="entr" presetSubtype="0" fill="hold" grpId="0" nodeType="clickEffect">
+                                <p:cTn id="30" presetID="16" presetClass="entr" presetSubtype="21" fill="hold" grpId="0" nodeType="clickEffect">
                                   <p:stCondLst>
                                     <p:cond delay="0"/>
                                   </p:stCondLst>
@@ -14773,165 +16780,6 @@
                                           </p:stCondLst>
                                         </p:cTn>
                                         <p:tgtEl>
-                                          <p:spTgt spid="5"/>
-                                        </p:tgtEl>
-                                        <p:attrNameLst>
-                                          <p:attrName>style.visibility</p:attrName>
-                                        </p:attrNameLst>
-                                      </p:cBhvr>
-                                      <p:to>
-                                        <p:strVal val="visible"/>
-                                      </p:to>
-                                    </p:set>
-                                    <p:animEffect transition="in" filter="fade">
-                                      <p:cBhvr>
-                                        <p:cTn id="32" dur="500"/>
-                                        <p:tgtEl>
-                                          <p:spTgt spid="5"/>
-                                        </p:tgtEl>
-                                      </p:cBhvr>
-                                    </p:animEffect>
-                                  </p:childTnLst>
-                                </p:cTn>
-                              </p:par>
-                            </p:childTnLst>
-                          </p:cTn>
-                        </p:par>
-                      </p:childTnLst>
-                    </p:cTn>
-                  </p:par>
-                  <p:par>
-                    <p:cTn id="33" fill="hold">
-                      <p:stCondLst>
-                        <p:cond delay="indefinite"/>
-                      </p:stCondLst>
-                      <p:childTnLst>
-                        <p:par>
-                          <p:cTn id="34" fill="hold">
-                            <p:stCondLst>
-                              <p:cond delay="0"/>
-                            </p:stCondLst>
-                            <p:childTnLst>
-                              <p:par>
-                                <p:cTn id="35" presetID="10" presetClass="entr" presetSubtype="0" fill="hold" grpId="0" nodeType="clickEffect">
-                                  <p:stCondLst>
-                                    <p:cond delay="0"/>
-                                  </p:stCondLst>
-                                  <p:childTnLst>
-                                    <p:set>
-                                      <p:cBhvr>
-                                        <p:cTn id="36" dur="1" fill="hold">
-                                          <p:stCondLst>
-                                            <p:cond delay="0"/>
-                                          </p:stCondLst>
-                                        </p:cTn>
-                                        <p:tgtEl>
-                                          <p:spTgt spid="7"/>
-                                        </p:tgtEl>
-                                        <p:attrNameLst>
-                                          <p:attrName>style.visibility</p:attrName>
-                                        </p:attrNameLst>
-                                      </p:cBhvr>
-                                      <p:to>
-                                        <p:strVal val="visible"/>
-                                      </p:to>
-                                    </p:set>
-                                    <p:animEffect transition="in" filter="fade">
-                                      <p:cBhvr>
-                                        <p:cTn id="37" dur="500"/>
-                                        <p:tgtEl>
-                                          <p:spTgt spid="7"/>
-                                        </p:tgtEl>
-                                      </p:cBhvr>
-                                    </p:animEffect>
-                                  </p:childTnLst>
-                                </p:cTn>
-                              </p:par>
-                            </p:childTnLst>
-                          </p:cTn>
-                        </p:par>
-                      </p:childTnLst>
-                    </p:cTn>
-                  </p:par>
-                  <p:par>
-                    <p:cTn id="38" fill="hold">
-                      <p:stCondLst>
-                        <p:cond delay="indefinite"/>
-                      </p:stCondLst>
-                      <p:childTnLst>
-                        <p:par>
-                          <p:cTn id="39" fill="hold">
-                            <p:stCondLst>
-                              <p:cond delay="0"/>
-                            </p:stCondLst>
-                            <p:childTnLst>
-                              <p:par>
-                                <p:cTn id="40" presetID="10" presetClass="entr" presetSubtype="0" fill="hold" grpId="0" nodeType="clickEffect">
-                                  <p:stCondLst>
-                                    <p:cond delay="0"/>
-                                  </p:stCondLst>
-                                  <p:childTnLst>
-                                    <p:set>
-                                      <p:cBhvr>
-                                        <p:cTn id="41" dur="1" fill="hold">
-                                          <p:stCondLst>
-                                            <p:cond delay="0"/>
-                                          </p:stCondLst>
-                                        </p:cTn>
-                                        <p:tgtEl>
-                                          <p:spTgt spid="9"/>
-                                        </p:tgtEl>
-                                        <p:attrNameLst>
-                                          <p:attrName>style.visibility</p:attrName>
-                                        </p:attrNameLst>
-                                      </p:cBhvr>
-                                      <p:to>
-                                        <p:strVal val="visible"/>
-                                      </p:to>
-                                    </p:set>
-                                    <p:animEffect transition="in" filter="fade">
-                                      <p:cBhvr>
-                                        <p:cTn id="42" dur="500"/>
-                                        <p:tgtEl>
-                                          <p:spTgt spid="9"/>
-                                        </p:tgtEl>
-                                      </p:cBhvr>
-                                    </p:animEffect>
-                                  </p:childTnLst>
-                                </p:cTn>
-                              </p:par>
-                            </p:childTnLst>
-                          </p:cTn>
-                        </p:par>
-                      </p:childTnLst>
-                    </p:cTn>
-                  </p:par>
-                  <p:par>
-                    <p:cTn id="43" fill="hold">
-                      <p:stCondLst>
-                        <p:cond delay="indefinite"/>
-                      </p:stCondLst>
-                      <p:childTnLst>
-                        <p:par>
-                          <p:cTn id="44" fill="hold">
-                            <p:stCondLst>
-                              <p:cond delay="0"/>
-                            </p:stCondLst>
-                            <p:childTnLst>
-                              <p:par>
-                                <p:cTn id="45" presetID="16" presetClass="entr" presetSubtype="21" fill="hold" grpId="0" nodeType="clickEffect">
-                                  <p:stCondLst>
-                                    <p:cond delay="0"/>
-                                  </p:stCondLst>
-                                  <p:childTnLst>
-                                    <p:set>
-                                      <p:cBhvr>
-                                        <p:cTn id="46" dur="1" fill="hold">
-                                          <p:stCondLst>
-                                            <p:cond delay="0"/>
-                                          </p:stCondLst>
-                                        </p:cTn>
-                                        <p:tgtEl>
                                           <p:spTgt spid="11"/>
                                         </p:tgtEl>
                                         <p:attrNameLst>
@@ -14944,7 +16792,7 @@
                                     </p:set>
                                     <p:animEffect transition="in" filter="barn(inVertical)">
                                       <p:cBhvr>
-                                        <p:cTn id="47" dur="500"/>
+                                        <p:cTn id="32" dur="500"/>
                                         <p:tgtEl>
                                           <p:spTgt spid="11"/>
                                         </p:tgtEl>
@@ -15014,7 +16862,7 @@
           <p:cNvPr id="2" name="Title 1">
             <a:extLst>
               <a:ext uri="{FF2B5EF4-FFF2-40B4-BE49-F238E27FC236}">
-                <a16:creationId xmlns:a16="http://schemas.microsoft.com/office/drawing/2014/main" id="{B206B0E0-0C2A-8DAE-7EF9-E152EF3E787F}"/>
+                <a16:creationId xmlns:a16="http://schemas.microsoft.com/office/drawing/2014/main" id="{DBF20931-B9B6-E7E6-D5D8-75CA6C7AF39C}"/>
               </a:ext>
             </a:extLst>
           </p:cNvPr>
@@ -15027,8 +16875,8 @@
         </p:nvSpPr>
         <p:spPr>
           <a:xfrm>
-            <a:off x="838200" y="365126"/>
-            <a:ext cx="5452533" cy="532342"/>
+            <a:off x="838200" y="365125"/>
+            <a:ext cx="8542867" cy="600075"/>
           </a:xfrm>
         </p:spPr>
         <p:txBody>
@@ -15039,7 +16887,7 @@
           <a:p>
             <a:r>
               <a:rPr lang="en-US" sz="3200" dirty="0"/>
-              <a:t>LIVE DEMO WALKTHROUGH 🎬</a:t>
+              <a:t>TOOLS COMPARISON - WHEN TO USE WHAT 🎯</a:t>
             </a:r>
           </a:p>
         </p:txBody>
@@ -15049,7 +16897,7 @@
           <p:cNvPr id="3" name="Content Placeholder 2">
             <a:extLst>
               <a:ext uri="{FF2B5EF4-FFF2-40B4-BE49-F238E27FC236}">
-                <a16:creationId xmlns:a16="http://schemas.microsoft.com/office/drawing/2014/main" id="{35461A45-4190-2290-EF1F-5EC55F66E2F9}"/>
+                <a16:creationId xmlns:a16="http://schemas.microsoft.com/office/drawing/2014/main" id="{7E3EBBBD-C05B-9081-C06A-5AAC15B6AC4B}"/>
               </a:ext>
             </a:extLst>
           </p:cNvPr>
@@ -15062,13 +16910,13 @@
         </p:nvSpPr>
         <p:spPr>
           <a:xfrm>
-            <a:off x="838200" y="1293283"/>
-            <a:ext cx="4334933" cy="1196975"/>
+            <a:off x="838200" y="1292225"/>
+            <a:ext cx="4318000" cy="1942042"/>
           </a:xfrm>
         </p:spPr>
         <p:txBody>
           <a:bodyPr>
-            <a:normAutofit lnSpcReduction="10000"/>
+            <a:normAutofit/>
           </a:bodyPr>
           <a:lstStyle/>
           <a:p>
@@ -15077,54 +16925,52 @@
             </a:pPr>
             <a:r>
               <a:rPr lang="en-US" sz="1400" dirty="0"/>
-              <a:t>DEMO SCENARIO: </a:t>
-            </a:r>
-          </a:p>
-          <a:p>
-            <a:r>
-              <a:rPr lang="en-US" sz="1400" dirty="0"/>
-              <a:t>- File: </a:t>
-            </a:r>
-            <a:r>
-              <a:rPr lang="en-US" sz="1400" dirty="0" err="1"/>
-              <a:t>TestBuggyController.php</a:t>
-            </a:r>
-            <a:r>
-              <a:rPr lang="en-US" sz="1400" dirty="0"/>
-              <a:t> (75+ potential issues)</a:t>
-            </a:r>
-          </a:p>
-          <a:p>
-            <a:r>
-              <a:rPr lang="en-US" sz="1400" dirty="0"/>
-              <a:t>- Action: Developer </a:t>
-            </a:r>
-            <a:r>
-              <a:rPr lang="en-US" sz="1400" dirty="0" err="1"/>
-              <a:t>coba</a:t>
-            </a:r>
-            <a:r>
-              <a:rPr lang="en-US" sz="1400" dirty="0"/>
-              <a:t> commit code </a:t>
-            </a:r>
-            <a:r>
-              <a:rPr lang="en-US" sz="1400" dirty="0" err="1"/>
-              <a:t>bermasalah</a:t>
-            </a:r>
-            <a:endParaRPr lang="en-US" sz="1400" dirty="0"/>
-          </a:p>
-          <a:p>
-            <a:r>
-              <a:rPr lang="en-US" sz="1400" dirty="0"/>
-              <a:t>- Result: Pre-commit hook blocks </a:t>
-            </a:r>
-            <a:r>
-              <a:rPr lang="en-US" sz="1400" dirty="0" err="1"/>
-              <a:t>dengan</a:t>
-            </a:r>
-            <a:r>
-              <a:rPr lang="en-US" sz="1400" dirty="0"/>
-              <a:t> detail errors</a:t>
+              <a:t>LARASTAN EXCELS WHEN:</a:t>
+            </a:r>
+          </a:p>
+          <a:p>
+            <a:pPr marL="0" indent="0">
+              <a:buNone/>
+            </a:pPr>
+            <a:r>
+              <a:rPr lang="en-US" sz="1400" dirty="0"/>
+              <a:t>✅ Quality enforcement &amp; bug prevention priority</a:t>
+            </a:r>
+          </a:p>
+          <a:p>
+            <a:pPr marL="0" indent="0">
+              <a:buNone/>
+            </a:pPr>
+            <a:r>
+              <a:rPr lang="en-US" sz="1400" dirty="0"/>
+              <a:t>✅ Laravel-specific magic method detection</a:t>
+            </a:r>
+          </a:p>
+          <a:p>
+            <a:pPr marL="0" indent="0">
+              <a:buNone/>
+            </a:pPr>
+            <a:r>
+              <a:rPr lang="en-US" sz="1400" dirty="0"/>
+              <a:t>✅ CI/CD integration &amp; team coding standards</a:t>
+            </a:r>
+          </a:p>
+          <a:p>
+            <a:pPr marL="0" indent="0">
+              <a:buNone/>
+            </a:pPr>
+            <a:r>
+              <a:rPr lang="en-US" sz="1400" dirty="0"/>
+              <a:t>✅ Budget-conscious projects (completely free)</a:t>
+            </a:r>
+          </a:p>
+          <a:p>
+            <a:pPr marL="0" indent="0">
+              <a:buNone/>
+            </a:pPr>
+            <a:r>
+              <a:rPr lang="en-US" sz="1400" dirty="0"/>
+              <a:t>✅ Legacy code analysis &amp; improvement</a:t>
             </a:r>
           </a:p>
         </p:txBody>
@@ -15134,7 +16980,7 @@
           <p:cNvPr id="5" name="TextBox 4">
             <a:extLst>
               <a:ext uri="{FF2B5EF4-FFF2-40B4-BE49-F238E27FC236}">
-                <a16:creationId xmlns:a16="http://schemas.microsoft.com/office/drawing/2014/main" id="{A1E60C45-F1F3-8AC4-109C-C11AA476E500}"/>
+                <a16:creationId xmlns:a16="http://schemas.microsoft.com/office/drawing/2014/main" id="{07877473-E3F5-F1D4-5029-CA967B354F6C}"/>
               </a:ext>
             </a:extLst>
           </p:cNvPr>
@@ -15143,8 +16989,8 @@
         </p:nvSpPr>
         <p:spPr>
           <a:xfrm>
-            <a:off x="838200" y="2886073"/>
-            <a:ext cx="6096000" cy="1384995"/>
+            <a:off x="838200" y="3561292"/>
+            <a:ext cx="4097867" cy="1384995"/>
           </a:xfrm>
           <a:prstGeom prst="rect">
             <a:avLst/>
@@ -15159,69 +17005,37 @@
           <a:p>
             <a:r>
               <a:rPr lang="en-US" sz="1400" dirty="0"/>
-              <a:t>DEMO FLOW:</a:t>
-            </a:r>
-          </a:p>
-          <a:p>
-            <a:r>
-              <a:rPr lang="en-US" sz="1400" dirty="0"/>
-              <a:t>1. </a:t>
-            </a:r>
-            <a:r>
-              <a:rPr lang="en-US" sz="1400" dirty="0" err="1"/>
-              <a:t>Lihat</a:t>
-            </a:r>
-            <a:r>
-              <a:rPr lang="en-US" sz="1400" dirty="0"/>
-              <a:t> </a:t>
-            </a:r>
-            <a:r>
-              <a:rPr lang="en-US" sz="1400" dirty="0" err="1"/>
-              <a:t>kode</a:t>
-            </a:r>
-            <a:r>
-              <a:rPr lang="en-US" sz="1400" dirty="0"/>
-              <a:t> </a:t>
-            </a:r>
-            <a:r>
-              <a:rPr lang="en-US" sz="1400" dirty="0" err="1"/>
-              <a:t>bermasalah</a:t>
-            </a:r>
-            <a:r>
-              <a:rPr lang="en-US" sz="1400" dirty="0"/>
-              <a:t> di repository</a:t>
-            </a:r>
-          </a:p>
-          <a:p>
-            <a:r>
-              <a:rPr lang="en-US" sz="1400" dirty="0"/>
-              <a:t>2. Developer run: `git commit -m "add buggy code"`</a:t>
-            </a:r>
-          </a:p>
-          <a:p>
-            <a:r>
-              <a:rPr lang="en-US" sz="1400" dirty="0"/>
-              <a:t>3. Pre-commit hook activated: BLOCKED!</a:t>
-            </a:r>
-          </a:p>
-          <a:p>
-            <a:r>
-              <a:rPr lang="en-US" sz="1400" dirty="0"/>
-              <a:t>4. Show detailed error list (type errors, formatting, </a:t>
-            </a:r>
-            <a:r>
-              <a:rPr lang="en-US" sz="1400" dirty="0" err="1"/>
-              <a:t>etc</a:t>
-            </a:r>
-            <a:r>
-              <a:rPr lang="en-US" sz="1400" dirty="0"/>
-              <a:t>)</a:t>
-            </a:r>
-          </a:p>
-          <a:p>
-            <a:r>
-              <a:rPr lang="en-US" sz="1400" dirty="0"/>
-              <a:t>5. Fix issues → commit SUCCESS</a:t>
+              <a:t>AMAZON Q DEVELOPER EXCELS WHEN:</a:t>
+            </a:r>
+          </a:p>
+          <a:p>
+            <a:r>
+              <a:rPr lang="en-US" sz="1400" dirty="0"/>
+              <a:t>✅ Rapid development &amp; productivity boost needed  </a:t>
+            </a:r>
+          </a:p>
+          <a:p>
+            <a:r>
+              <a:rPr lang="en-US" sz="1400" dirty="0"/>
+              <a:t>✅ AI-assisted coding &amp; learning acceleration</a:t>
+            </a:r>
+          </a:p>
+          <a:p>
+            <a:r>
+              <a:rPr lang="en-US" sz="1400" dirty="0"/>
+              <a:t>✅ Multi-language projects beyond just PHP</a:t>
+            </a:r>
+          </a:p>
+          <a:p>
+            <a:r>
+              <a:rPr lang="en-US" sz="1400" dirty="0"/>
+              <a:t>✅ Advanced security scanning requirements</a:t>
+            </a:r>
+          </a:p>
+          <a:p>
+            <a:r>
+              <a:rPr lang="en-US" sz="1400" dirty="0"/>
+              <a:t>✅ Feature development speed is critical</a:t>
             </a:r>
           </a:p>
         </p:txBody>
@@ -15231,7 +17045,7 @@
           <p:cNvPr id="7" name="TextBox 6">
             <a:extLst>
               <a:ext uri="{FF2B5EF4-FFF2-40B4-BE49-F238E27FC236}">
-                <a16:creationId xmlns:a16="http://schemas.microsoft.com/office/drawing/2014/main" id="{4BAE0D05-4A34-661B-977E-00B3CA19A2B0}"/>
+                <a16:creationId xmlns:a16="http://schemas.microsoft.com/office/drawing/2014/main" id="{81E72968-2C4F-B3FA-3C4E-A0F11F86FE69}"/>
               </a:ext>
             </a:extLst>
           </p:cNvPr>
@@ -15240,8 +17054,8 @@
         </p:nvSpPr>
         <p:spPr>
           <a:xfrm>
-            <a:off x="6096000" y="4482217"/>
-            <a:ext cx="5046133" cy="369332"/>
+            <a:off x="5156200" y="1813467"/>
+            <a:ext cx="2243667" cy="307777"/>
           </a:xfrm>
           <a:prstGeom prst="rect">
             <a:avLst/>
@@ -15255,60 +17069,183 @@
           <a:lstStyle/>
           <a:p>
             <a:r>
-              <a:rPr lang="en-US" dirty="0">
+              <a:rPr lang="en-US" sz="1400" dirty="0"/>
+              <a:t>💡 BEST PRACTICE COMBO:</a:t>
+            </a:r>
+          </a:p>
+        </p:txBody>
+      </p:sp>
+      <p:sp>
+        <p:nvSpPr>
+          <p:cNvPr id="9" name="TextBox 8">
+            <a:extLst>
+              <a:ext uri="{FF2B5EF4-FFF2-40B4-BE49-F238E27FC236}">
+                <a16:creationId xmlns:a16="http://schemas.microsoft.com/office/drawing/2014/main" id="{8399833F-286C-8C53-CFC5-F0DC8C920554}"/>
+              </a:ext>
+            </a:extLst>
+          </p:cNvPr>
+          <p:cNvSpPr txBox="1"/>
+          <p:nvPr/>
+        </p:nvSpPr>
+        <p:spPr>
+          <a:xfrm>
+            <a:off x="5367865" y="2121244"/>
+            <a:ext cx="6256867" cy="307777"/>
+          </a:xfrm>
+          <a:prstGeom prst="rect">
+            <a:avLst/>
+          </a:prstGeom>
+          <a:noFill/>
+        </p:spPr>
+        <p:txBody>
+          <a:bodyPr wrap="square">
+            <a:spAutoFit/>
+          </a:bodyPr>
+          <a:lstStyle/>
+          <a:p>
+            <a:r>
+              <a:rPr lang="en-US" sz="1400" dirty="0"/>
+              <a:t>Amazon Q Developer (Code Generation) → </a:t>
+            </a:r>
+            <a:r>
+              <a:rPr lang="en-US" sz="1400" dirty="0" err="1"/>
+              <a:t>Larastan</a:t>
+            </a:r>
+            <a:r>
+              <a:rPr lang="en-US" sz="1400" dirty="0"/>
+              <a:t> (Quality Check) → Production</a:t>
+            </a:r>
+          </a:p>
+        </p:txBody>
+      </p:sp>
+      <p:sp>
+        <p:nvSpPr>
+          <p:cNvPr id="11" name="TextBox 10">
+            <a:extLst>
+              <a:ext uri="{FF2B5EF4-FFF2-40B4-BE49-F238E27FC236}">
+                <a16:creationId xmlns:a16="http://schemas.microsoft.com/office/drawing/2014/main" id="{CBAB2880-E947-9EE4-FE50-26D725699472}"/>
+              </a:ext>
+            </a:extLst>
+          </p:cNvPr>
+          <p:cNvSpPr txBox="1"/>
+          <p:nvPr/>
+        </p:nvSpPr>
+        <p:spPr>
+          <a:xfrm>
+            <a:off x="5367865" y="2677123"/>
+            <a:ext cx="3683002" cy="954107"/>
+          </a:xfrm>
+          <a:prstGeom prst="rect">
+            <a:avLst/>
+          </a:prstGeom>
+          <a:noFill/>
+        </p:spPr>
+        <p:txBody>
+          <a:bodyPr wrap="square">
+            <a:spAutoFit/>
+          </a:bodyPr>
+          <a:lstStyle/>
+          <a:p>
+            <a:r>
+              <a:rPr lang="en-US" sz="1400" dirty="0"/>
+              <a:t>ROI COMPARISON:</a:t>
+            </a:r>
+          </a:p>
+          <a:p>
+            <a:r>
+              <a:rPr lang="en-US" sz="1400" dirty="0"/>
+              <a:t>- </a:t>
+            </a:r>
+            <a:r>
+              <a:rPr lang="en-US" sz="1400" dirty="0" err="1"/>
+              <a:t>Larastan</a:t>
+            </a:r>
+            <a:r>
+              <a:rPr lang="en-US" sz="1400" dirty="0"/>
+              <a:t>: 400% ROI (reduced debugging time)</a:t>
+            </a:r>
+          </a:p>
+          <a:p>
+            <a:r>
+              <a:rPr lang="en-US" sz="1400" dirty="0"/>
+              <a:t>- Amazon Q: 300% ROI (faster development)</a:t>
+            </a:r>
+          </a:p>
+          <a:p>
+            <a:r>
+              <a:rPr lang="en-US" sz="1400" dirty="0"/>
+              <a:t>- Combined: 500+ ROI (best of both worlds)</a:t>
+            </a:r>
+          </a:p>
+        </p:txBody>
+      </p:sp>
+      <p:sp>
+        <p:nvSpPr>
+          <p:cNvPr id="13" name="TextBox 12">
+            <a:extLst>
+              <a:ext uri="{FF2B5EF4-FFF2-40B4-BE49-F238E27FC236}">
+                <a16:creationId xmlns:a16="http://schemas.microsoft.com/office/drawing/2014/main" id="{E6FF167B-2433-38EF-6E1A-421291149B7D}"/>
+              </a:ext>
+            </a:extLst>
+          </p:cNvPr>
+          <p:cNvSpPr txBox="1"/>
+          <p:nvPr/>
+        </p:nvSpPr>
+        <p:spPr>
+          <a:xfrm>
+            <a:off x="7497230" y="4253789"/>
+            <a:ext cx="4169835" cy="307777"/>
+          </a:xfrm>
+          <a:prstGeom prst="rect">
+            <a:avLst/>
+          </a:prstGeom>
+          <a:noFill/>
+        </p:spPr>
+        <p:txBody>
+          <a:bodyPr wrap="square">
+            <a:spAutoFit/>
+          </a:bodyPr>
+          <a:lstStyle/>
+          <a:p>
+            <a:r>
+              <a:rPr lang="en-US" sz="1400" dirty="0">
                 <a:solidFill>
                   <a:srgbClr val="FF0000"/>
                 </a:solidFill>
               </a:rPr>
-              <a:t>Hasil </a:t>
-            </a:r>
-            <a:r>
-              <a:rPr lang="en-US" dirty="0" err="1">
+              <a:t>Mari focus </a:t>
+            </a:r>
+            <a:r>
+              <a:rPr lang="en-US" sz="1400" dirty="0" err="1">
                 <a:solidFill>
                   <a:srgbClr val="FF0000"/>
                 </a:solidFill>
               </a:rPr>
-              <a:t>analisis</a:t>
-            </a:r>
-            <a:r>
-              <a:rPr lang="en-US" dirty="0">
+              <a:t>dulu</a:t>
+            </a:r>
+            <a:r>
+              <a:rPr lang="en-US" sz="1400" dirty="0">
                 <a:solidFill>
                   <a:srgbClr val="FF0000"/>
                 </a:solidFill>
               </a:rPr>
-              <a:t> </a:t>
-            </a:r>
-            <a:r>
-              <a:rPr lang="en-US" dirty="0" err="1">
+              <a:t> pada </a:t>
+            </a:r>
+            <a:r>
+              <a:rPr lang="en-US" sz="1400" dirty="0" err="1">
                 <a:solidFill>
                   <a:srgbClr val="FF0000"/>
                 </a:solidFill>
               </a:rPr>
-              <a:t>ini</a:t>
-            </a:r>
-            <a:r>
-              <a:rPr lang="en-US" dirty="0">
+              <a:t>PHPStan</a:t>
+            </a:r>
+            <a:r>
+              <a:rPr lang="en-US" sz="1400" dirty="0">
                 <a:solidFill>
                   <a:srgbClr val="FF0000"/>
                 </a:solidFill>
               </a:rPr>
-              <a:t> juga </a:t>
-            </a:r>
-            <a:r>
-              <a:rPr lang="en-US" dirty="0" err="1">
-                <a:solidFill>
-                  <a:srgbClr val="FF0000"/>
-                </a:solidFill>
-              </a:rPr>
-              <a:t>tampil</a:t>
-            </a:r>
-            <a:r>
-              <a:rPr lang="en-US" dirty="0">
-                <a:solidFill>
-                  <a:srgbClr val="FF0000"/>
-                </a:solidFill>
-              </a:rPr>
-              <a:t> di dashboard enterprise</a:t>
+              <a:t> levels yang fundamental</a:t>
             </a:r>
           </a:p>
         </p:txBody>
@@ -15316,7 +17253,7 @@
     </p:spTree>
     <p:extLst>
       <p:ext uri="{BB962C8B-B14F-4D97-AF65-F5344CB8AC3E}">
-        <p14:creationId xmlns:p14="http://schemas.microsoft.com/office/powerpoint/2010/main" val="2043896619"/>
+        <p14:creationId xmlns:p14="http://schemas.microsoft.com/office/powerpoint/2010/main" val="2687753398"/>
       </p:ext>
     </p:extLst>
   </p:cSld>
@@ -15654,7 +17591,11 @@
                                           </p:stCondLst>
                                         </p:cTn>
                                         <p:tgtEl>
-                                          <p:spTgt spid="5"/>
+                                          <p:spTgt spid="3">
+                                            <p:txEl>
+                                              <p:pRg st="4" end="4"/>
+                                            </p:txEl>
+                                          </p:spTgt>
                                         </p:tgtEl>
                                         <p:attrNameLst>
                                           <p:attrName>style.visibility</p:attrName>
@@ -15668,7 +17609,11 @@
                                       <p:cBhvr>
                                         <p:cTn id="32" dur="500"/>
                                         <p:tgtEl>
-                                          <p:spTgt spid="5"/>
+                                          <p:spTgt spid="3">
+                                            <p:txEl>
+                                              <p:pRg st="4" end="4"/>
+                                            </p:txEl>
+                                          </p:spTgt>
                                         </p:tgtEl>
                                       </p:cBhvr>
                                     </p:animEffect>
@@ -15694,7 +17639,7 @@
                             </p:stCondLst>
                             <p:childTnLst>
                               <p:par>
-                                <p:cTn id="35" presetID="16" presetClass="entr" presetSubtype="21" fill="hold" grpId="0" nodeType="clickEffect">
+                                <p:cTn id="35" presetID="10" presetClass="entr" presetSubtype="0" fill="hold" grpId="0" nodeType="clickEffect">
                                   <p:stCondLst>
                                     <p:cond delay="0"/>
                                   </p:stCondLst>
@@ -15707,7 +17652,280 @@
                                           </p:stCondLst>
                                         </p:cTn>
                                         <p:tgtEl>
+                                          <p:spTgt spid="3">
+                                            <p:txEl>
+                                              <p:pRg st="5" end="5"/>
+                                            </p:txEl>
+                                          </p:spTgt>
+                                        </p:tgtEl>
+                                        <p:attrNameLst>
+                                          <p:attrName>style.visibility</p:attrName>
+                                        </p:attrNameLst>
+                                      </p:cBhvr>
+                                      <p:to>
+                                        <p:strVal val="visible"/>
+                                      </p:to>
+                                    </p:set>
+                                    <p:animEffect transition="in" filter="fade">
+                                      <p:cBhvr>
+                                        <p:cTn id="37" dur="500"/>
+                                        <p:tgtEl>
+                                          <p:spTgt spid="3">
+                                            <p:txEl>
+                                              <p:pRg st="5" end="5"/>
+                                            </p:txEl>
+                                          </p:spTgt>
+                                        </p:tgtEl>
+                                      </p:cBhvr>
+                                    </p:animEffect>
+                                  </p:childTnLst>
+                                </p:cTn>
+                              </p:par>
+                            </p:childTnLst>
+                          </p:cTn>
+                        </p:par>
+                      </p:childTnLst>
+                    </p:cTn>
+                  </p:par>
+                  <p:par>
+                    <p:cTn id="38" fill="hold">
+                      <p:stCondLst>
+                        <p:cond delay="indefinite"/>
+                      </p:stCondLst>
+                      <p:childTnLst>
+                        <p:par>
+                          <p:cTn id="39" fill="hold">
+                            <p:stCondLst>
+                              <p:cond delay="0"/>
+                            </p:stCondLst>
+                            <p:childTnLst>
+                              <p:par>
+                                <p:cTn id="40" presetID="10" presetClass="entr" presetSubtype="0" fill="hold" grpId="0" nodeType="clickEffect">
+                                  <p:stCondLst>
+                                    <p:cond delay="0"/>
+                                  </p:stCondLst>
+                                  <p:childTnLst>
+                                    <p:set>
+                                      <p:cBhvr>
+                                        <p:cTn id="41" dur="1" fill="hold">
+                                          <p:stCondLst>
+                                            <p:cond delay="0"/>
+                                          </p:stCondLst>
+                                        </p:cTn>
+                                        <p:tgtEl>
+                                          <p:spTgt spid="5"/>
+                                        </p:tgtEl>
+                                        <p:attrNameLst>
+                                          <p:attrName>style.visibility</p:attrName>
+                                        </p:attrNameLst>
+                                      </p:cBhvr>
+                                      <p:to>
+                                        <p:strVal val="visible"/>
+                                      </p:to>
+                                    </p:set>
+                                    <p:animEffect transition="in" filter="fade">
+                                      <p:cBhvr>
+                                        <p:cTn id="42" dur="500"/>
+                                        <p:tgtEl>
+                                          <p:spTgt spid="5"/>
+                                        </p:tgtEl>
+                                      </p:cBhvr>
+                                    </p:animEffect>
+                                  </p:childTnLst>
+                                </p:cTn>
+                              </p:par>
+                            </p:childTnLst>
+                          </p:cTn>
+                        </p:par>
+                      </p:childTnLst>
+                    </p:cTn>
+                  </p:par>
+                  <p:par>
+                    <p:cTn id="43" fill="hold">
+                      <p:stCondLst>
+                        <p:cond delay="indefinite"/>
+                      </p:stCondLst>
+                      <p:childTnLst>
+                        <p:par>
+                          <p:cTn id="44" fill="hold">
+                            <p:stCondLst>
+                              <p:cond delay="0"/>
+                            </p:stCondLst>
+                            <p:childTnLst>
+                              <p:par>
+                                <p:cTn id="45" presetID="10" presetClass="entr" presetSubtype="0" fill="hold" grpId="0" nodeType="clickEffect">
+                                  <p:stCondLst>
+                                    <p:cond delay="0"/>
+                                  </p:stCondLst>
+                                  <p:childTnLst>
+                                    <p:set>
+                                      <p:cBhvr>
+                                        <p:cTn id="46" dur="1" fill="hold">
+                                          <p:stCondLst>
+                                            <p:cond delay="0"/>
+                                          </p:stCondLst>
+                                        </p:cTn>
+                                        <p:tgtEl>
                                           <p:spTgt spid="7"/>
+                                        </p:tgtEl>
+                                        <p:attrNameLst>
+                                          <p:attrName>style.visibility</p:attrName>
+                                        </p:attrNameLst>
+                                      </p:cBhvr>
+                                      <p:to>
+                                        <p:strVal val="visible"/>
+                                      </p:to>
+                                    </p:set>
+                                    <p:animEffect transition="in" filter="fade">
+                                      <p:cBhvr>
+                                        <p:cTn id="47" dur="500"/>
+                                        <p:tgtEl>
+                                          <p:spTgt spid="7"/>
+                                        </p:tgtEl>
+                                      </p:cBhvr>
+                                    </p:animEffect>
+                                  </p:childTnLst>
+                                </p:cTn>
+                              </p:par>
+                            </p:childTnLst>
+                          </p:cTn>
+                        </p:par>
+                      </p:childTnLst>
+                    </p:cTn>
+                  </p:par>
+                  <p:par>
+                    <p:cTn id="48" fill="hold">
+                      <p:stCondLst>
+                        <p:cond delay="indefinite"/>
+                      </p:stCondLst>
+                      <p:childTnLst>
+                        <p:par>
+                          <p:cTn id="49" fill="hold">
+                            <p:stCondLst>
+                              <p:cond delay="0"/>
+                            </p:stCondLst>
+                            <p:childTnLst>
+                              <p:par>
+                                <p:cTn id="50" presetID="10" presetClass="entr" presetSubtype="0" fill="hold" grpId="0" nodeType="clickEffect">
+                                  <p:stCondLst>
+                                    <p:cond delay="0"/>
+                                  </p:stCondLst>
+                                  <p:childTnLst>
+                                    <p:set>
+                                      <p:cBhvr>
+                                        <p:cTn id="51" dur="1" fill="hold">
+                                          <p:stCondLst>
+                                            <p:cond delay="0"/>
+                                          </p:stCondLst>
+                                        </p:cTn>
+                                        <p:tgtEl>
+                                          <p:spTgt spid="9"/>
+                                        </p:tgtEl>
+                                        <p:attrNameLst>
+                                          <p:attrName>style.visibility</p:attrName>
+                                        </p:attrNameLst>
+                                      </p:cBhvr>
+                                      <p:to>
+                                        <p:strVal val="visible"/>
+                                      </p:to>
+                                    </p:set>
+                                    <p:animEffect transition="in" filter="fade">
+                                      <p:cBhvr>
+                                        <p:cTn id="52" dur="500"/>
+                                        <p:tgtEl>
+                                          <p:spTgt spid="9"/>
+                                        </p:tgtEl>
+                                      </p:cBhvr>
+                                    </p:animEffect>
+                                  </p:childTnLst>
+                                </p:cTn>
+                              </p:par>
+                            </p:childTnLst>
+                          </p:cTn>
+                        </p:par>
+                      </p:childTnLst>
+                    </p:cTn>
+                  </p:par>
+                  <p:par>
+                    <p:cTn id="53" fill="hold">
+                      <p:stCondLst>
+                        <p:cond delay="indefinite"/>
+                      </p:stCondLst>
+                      <p:childTnLst>
+                        <p:par>
+                          <p:cTn id="54" fill="hold">
+                            <p:stCondLst>
+                              <p:cond delay="0"/>
+                            </p:stCondLst>
+                            <p:childTnLst>
+                              <p:par>
+                                <p:cTn id="55" presetID="10" presetClass="entr" presetSubtype="0" fill="hold" grpId="0" nodeType="clickEffect">
+                                  <p:stCondLst>
+                                    <p:cond delay="0"/>
+                                  </p:stCondLst>
+                                  <p:childTnLst>
+                                    <p:set>
+                                      <p:cBhvr>
+                                        <p:cTn id="56" dur="1" fill="hold">
+                                          <p:stCondLst>
+                                            <p:cond delay="0"/>
+                                          </p:stCondLst>
+                                        </p:cTn>
+                                        <p:tgtEl>
+                                          <p:spTgt spid="11"/>
+                                        </p:tgtEl>
+                                        <p:attrNameLst>
+                                          <p:attrName>style.visibility</p:attrName>
+                                        </p:attrNameLst>
+                                      </p:cBhvr>
+                                      <p:to>
+                                        <p:strVal val="visible"/>
+                                      </p:to>
+                                    </p:set>
+                                    <p:animEffect transition="in" filter="fade">
+                                      <p:cBhvr>
+                                        <p:cTn id="57" dur="500"/>
+                                        <p:tgtEl>
+                                          <p:spTgt spid="11"/>
+                                        </p:tgtEl>
+                                      </p:cBhvr>
+                                    </p:animEffect>
+                                  </p:childTnLst>
+                                </p:cTn>
+                              </p:par>
+                            </p:childTnLst>
+                          </p:cTn>
+                        </p:par>
+                      </p:childTnLst>
+                    </p:cTn>
+                  </p:par>
+                  <p:par>
+                    <p:cTn id="58" fill="hold">
+                      <p:stCondLst>
+                        <p:cond delay="indefinite"/>
+                      </p:stCondLst>
+                      <p:childTnLst>
+                        <p:par>
+                          <p:cTn id="59" fill="hold">
+                            <p:stCondLst>
+                              <p:cond delay="0"/>
+                            </p:stCondLst>
+                            <p:childTnLst>
+                              <p:par>
+                                <p:cTn id="60" presetID="16" presetClass="entr" presetSubtype="21" fill="hold" grpId="0" nodeType="clickEffect">
+                                  <p:stCondLst>
+                                    <p:cond delay="0"/>
+                                  </p:stCondLst>
+                                  <p:childTnLst>
+                                    <p:set>
+                                      <p:cBhvr>
+                                        <p:cTn id="61" dur="1" fill="hold">
+                                          <p:stCondLst>
+                                            <p:cond delay="0"/>
+                                          </p:stCondLst>
+                                        </p:cTn>
+                                        <p:tgtEl>
+                                          <p:spTgt spid="13"/>
                                         </p:tgtEl>
                                         <p:attrNameLst>
                                           <p:attrName>style.visibility</p:attrName>
@@ -15719,9 +17937,9 @@
                                     </p:set>
                                     <p:animEffect transition="in" filter="barn(inVertical)">
                                       <p:cBhvr>
-                                        <p:cTn id="37" dur="500"/>
-                                        <p:tgtEl>
-                                          <p:spTgt spid="7"/>
+                                        <p:cTn id="62" dur="500"/>
+                                        <p:tgtEl>
+                                          <p:spTgt spid="13"/>
                                         </p:tgtEl>
                                       </p:cBhvr>
                                     </p:animEffect>
@@ -15760,6 +17978,9 @@
       <p:bldP spid="3" grpId="0" build="p"/>
       <p:bldP spid="5" grpId="0"/>
       <p:bldP spid="7" grpId="0"/>
+      <p:bldP spid="9" grpId="0"/>
+      <p:bldP spid="11" grpId="0"/>
+      <p:bldP spid="13" grpId="0"/>
     </p:bldLst>
   </p:timing>
 </p:sld>
@@ -15787,7 +18008,7 @@
           <p:cNvPr id="2" name="Title 1">
             <a:extLst>
               <a:ext uri="{FF2B5EF4-FFF2-40B4-BE49-F238E27FC236}">
-                <a16:creationId xmlns:a16="http://schemas.microsoft.com/office/drawing/2014/main" id="{27056953-169D-0257-80A6-A8E4FA16B8D8}"/>
+                <a16:creationId xmlns:a16="http://schemas.microsoft.com/office/drawing/2014/main" id="{81BF28E8-71B8-8550-3F4C-6B20D754D67D}"/>
               </a:ext>
             </a:extLst>
           </p:cNvPr>
@@ -15800,8 +18021,8 @@
         </p:nvSpPr>
         <p:spPr>
           <a:xfrm>
-            <a:off x="838200" y="365126"/>
-            <a:ext cx="10515600" cy="557742"/>
+            <a:off x="838200" y="365125"/>
+            <a:ext cx="8119533" cy="574675"/>
           </a:xfrm>
         </p:spPr>
         <p:txBody>
@@ -15812,7 +18033,7 @@
           <a:p>
             <a:r>
               <a:rPr lang="en-US" sz="3200" dirty="0"/>
-              <a:t>SONARQUBE ENTERPRISE DASHBOARD 📈</a:t>
+              <a:t>PHPSTAN LEVELS - PROGRESSIVE APPROACH 📊</a:t>
             </a:r>
           </a:p>
         </p:txBody>
@@ -15822,7 +18043,7 @@
           <p:cNvPr id="3" name="Content Placeholder 2">
             <a:extLst>
               <a:ext uri="{FF2B5EF4-FFF2-40B4-BE49-F238E27FC236}">
-                <a16:creationId xmlns:a16="http://schemas.microsoft.com/office/drawing/2014/main" id="{5CC1CA65-BB9D-59BE-EDF0-59DCA52B363D}"/>
+                <a16:creationId xmlns:a16="http://schemas.microsoft.com/office/drawing/2014/main" id="{6AECCAC9-9DD7-3D92-3F75-5FC44981DFF4}"/>
               </a:ext>
             </a:extLst>
           </p:cNvPr>
@@ -15835,13 +18056,13 @@
         </p:nvSpPr>
         <p:spPr>
           <a:xfrm>
-            <a:off x="838200" y="1385359"/>
-            <a:ext cx="4470400" cy="2212975"/>
+            <a:off x="838200" y="1436160"/>
+            <a:ext cx="3801533" cy="1213908"/>
           </a:xfrm>
         </p:spPr>
         <p:txBody>
           <a:bodyPr>
-            <a:normAutofit/>
+            <a:normAutofit lnSpcReduction="10000"/>
           </a:bodyPr>
           <a:lstStyle/>
           <a:p>
@@ -15850,69 +18071,25 @@
             </a:pPr>
             <a:r>
               <a:rPr lang="en-US" sz="1400" dirty="0"/>
-              <a:t>LIVE METRICS DARI PROJECT INI:</a:t>
-            </a:r>
-          </a:p>
-          <a:p>
-            <a:pPr marL="0" indent="0">
-              <a:buNone/>
-            </a:pPr>
-            <a:r>
-              <a:rPr lang="en-US" sz="1400" dirty="0"/>
-              <a:t>📊 Coverage: 45 files analyzed across 6 languages</a:t>
-            </a:r>
-          </a:p>
-          <a:p>
-            <a:pPr marL="0" indent="0">
-              <a:buNone/>
-            </a:pPr>
-            <a:r>
-              <a:rPr lang="en-US" sz="1400" dirty="0"/>
-              <a:t>✅ Quality Gate: PASSED</a:t>
-            </a:r>
-          </a:p>
-          <a:p>
-            <a:pPr marL="0" indent="0">
-              <a:buNone/>
-            </a:pPr>
-            <a:r>
-              <a:rPr lang="en-US" sz="1400" dirty="0"/>
-              <a:t>🐛 Bugs: 0 (</a:t>
-            </a:r>
-            <a:r>
-              <a:rPr lang="en-US" sz="1400" dirty="0" err="1"/>
-              <a:t>setelah</a:t>
-            </a:r>
-            <a:r>
-              <a:rPr lang="en-US" sz="1400" dirty="0"/>
-              <a:t> pre-commit filtering)</a:t>
-            </a:r>
-          </a:p>
-          <a:p>
-            <a:pPr marL="0" indent="0">
-              <a:buNone/>
-            </a:pPr>
-            <a:r>
-              <a:rPr lang="en-US" sz="1400" dirty="0"/>
-              <a:t>🛡️ Security: 0 vulnerabilities</a:t>
-            </a:r>
-          </a:p>
-          <a:p>
-            <a:pPr marL="0" indent="0">
-              <a:buNone/>
-            </a:pPr>
-            <a:r>
-              <a:rPr lang="en-US" sz="1400" dirty="0"/>
-              <a:t>📉 Code Smells: Reduced by 87%</a:t>
-            </a:r>
-          </a:p>
-          <a:p>
-            <a:pPr marL="0" indent="0">
-              <a:buNone/>
-            </a:pPr>
-            <a:r>
-              <a:rPr lang="en-US" sz="1400" dirty="0"/>
-              <a:t>⏱️ Tech Debt: 2.5 days → 20 minutes</a:t>
+              <a:t>LEVEL 0-2: FOUNDATION 🟢</a:t>
+            </a:r>
+          </a:p>
+          <a:p>
+            <a:r>
+              <a:rPr lang="en-US" sz="1400" dirty="0"/>
+              <a:t>Basic undefined variables, methods</a:t>
+            </a:r>
+          </a:p>
+          <a:p>
+            <a:r>
+              <a:rPr lang="en-US" sz="1400" dirty="0"/>
+              <a:t>Fatal error prevention</a:t>
+            </a:r>
+          </a:p>
+          <a:p>
+            <a:r>
+              <a:rPr lang="en-US" sz="1400" dirty="0"/>
+              <a:t>Good for: Legacy code, onboarding</a:t>
             </a:r>
           </a:p>
         </p:txBody>
@@ -15922,7 +18099,7 @@
           <p:cNvPr id="5" name="TextBox 4">
             <a:extLst>
               <a:ext uri="{FF2B5EF4-FFF2-40B4-BE49-F238E27FC236}">
-                <a16:creationId xmlns:a16="http://schemas.microsoft.com/office/drawing/2014/main" id="{8221CFBB-03AF-9DEE-1681-217CCC5E56D3}"/>
+                <a16:creationId xmlns:a16="http://schemas.microsoft.com/office/drawing/2014/main" id="{3023CAC7-3BD4-BC71-918A-18D549430C85}"/>
               </a:ext>
             </a:extLst>
           </p:cNvPr>
@@ -15931,8 +18108,8 @@
         </p:nvSpPr>
         <p:spPr>
           <a:xfrm>
-            <a:off x="5909733" y="2337957"/>
-            <a:ext cx="4775200" cy="307777"/>
+            <a:off x="838200" y="2951946"/>
+            <a:ext cx="3149600" cy="954107"/>
           </a:xfrm>
           <a:prstGeom prst="rect">
             <a:avLst/>
@@ -15947,25 +18124,47 @@
           <a:p>
             <a:r>
               <a:rPr lang="en-US" sz="1400" dirty="0"/>
-              <a:t>BUSINESS VALUE: Clear metrics </a:t>
-            </a:r>
-            <a:r>
-              <a:rPr lang="en-US" sz="1400" dirty="0" err="1"/>
-              <a:t>untuk</a:t>
-            </a:r>
-            <a:r>
-              <a:rPr lang="en-US" sz="1400" dirty="0"/>
-              <a:t> management review</a:t>
+              <a:t>LEVEL 3-5: PRODUCTION READY 🟡</a:t>
+            </a:r>
+          </a:p>
+          <a:p>
+            <a:pPr marL="285750" indent="-285750">
+              <a:buFont typeface="Arial" panose="020B0604020202020204" pitchFamily="34" charset="0"/>
+              <a:buChar char="•"/>
+            </a:pPr>
+            <a:r>
+              <a:rPr lang="en-US" sz="1400" dirty="0"/>
+              <a:t>Null safety, type checking</a:t>
+            </a:r>
+          </a:p>
+          <a:p>
+            <a:pPr marL="285750" indent="-285750">
+              <a:buFont typeface="Arial" panose="020B0604020202020204" pitchFamily="34" charset="0"/>
+              <a:buChar char="•"/>
+            </a:pPr>
+            <a:r>
+              <a:rPr lang="en-US" sz="1400" dirty="0"/>
+              <a:t>Method return types</a:t>
+            </a:r>
+          </a:p>
+          <a:p>
+            <a:pPr marL="285750" indent="-285750">
+              <a:buFont typeface="Arial" panose="020B0604020202020204" pitchFamily="34" charset="0"/>
+              <a:buChar char="•"/>
+            </a:pPr>
+            <a:r>
+              <a:rPr lang="en-US" sz="1400" dirty="0"/>
+              <a:t>Good for: Most applications</a:t>
             </a:r>
           </a:p>
         </p:txBody>
       </p:sp>
       <p:sp>
         <p:nvSpPr>
-          <p:cNvPr id="9" name="TextBox 8">
+          <p:cNvPr id="7" name="TextBox 6">
             <a:extLst>
               <a:ext uri="{FF2B5EF4-FFF2-40B4-BE49-F238E27FC236}">
-                <a16:creationId xmlns:a16="http://schemas.microsoft.com/office/drawing/2014/main" id="{CA9AC608-7440-FF6B-949A-180EF9FDB8F1}"/>
+                <a16:creationId xmlns:a16="http://schemas.microsoft.com/office/drawing/2014/main" id="{5F7443AB-4D4D-B393-9D35-34ACF14A364F}"/>
               </a:ext>
             </a:extLst>
           </p:cNvPr>
@@ -15974,7 +18173,62 @@
         </p:nvSpPr>
         <p:spPr>
           <a:xfrm>
-            <a:off x="5808134" y="4463534"/>
+            <a:off x="838200" y="4207931"/>
+            <a:ext cx="3649133" cy="738664"/>
+          </a:xfrm>
+          <a:prstGeom prst="rect">
+            <a:avLst/>
+          </a:prstGeom>
+          <a:noFill/>
+        </p:spPr>
+        <p:txBody>
+          <a:bodyPr wrap="square">
+            <a:spAutoFit/>
+          </a:bodyPr>
+          <a:lstStyle/>
+          <a:p>
+            <a:r>
+              <a:rPr lang="en-US" sz="1400" dirty="0"/>
+              <a:t>LEVEL 6-MAX: ENTERPRISE 🔴</a:t>
+            </a:r>
+          </a:p>
+          <a:p>
+            <a:pPr marL="285750" indent="-285750">
+              <a:buFont typeface="Arial" panose="020B0604020202020204" pitchFamily="34" charset="0"/>
+              <a:buChar char="•"/>
+            </a:pPr>
+            <a:r>
+              <a:rPr lang="en-US" sz="1400" dirty="0"/>
+              <a:t>Perfect documentation, strict types</a:t>
+            </a:r>
+          </a:p>
+          <a:p>
+            <a:pPr marL="285750" indent="-285750">
+              <a:buFont typeface="Arial" panose="020B0604020202020204" pitchFamily="34" charset="0"/>
+              <a:buChar char="•"/>
+            </a:pPr>
+            <a:r>
+              <a:rPr lang="en-US" sz="1400" dirty="0"/>
+              <a:t>Good for: Critical systems</a:t>
+            </a:r>
+          </a:p>
+        </p:txBody>
+      </p:sp>
+      <p:sp>
+        <p:nvSpPr>
+          <p:cNvPr id="9" name="TextBox 8">
+            <a:extLst>
+              <a:ext uri="{FF2B5EF4-FFF2-40B4-BE49-F238E27FC236}">
+                <a16:creationId xmlns:a16="http://schemas.microsoft.com/office/drawing/2014/main" id="{030576A9-7F46-8069-7369-C1C6DDF738CB}"/>
+              </a:ext>
+            </a:extLst>
+          </p:cNvPr>
+          <p:cNvSpPr txBox="1"/>
+          <p:nvPr/>
+        </p:nvSpPr>
+        <p:spPr>
+          <a:xfrm>
+            <a:off x="4897966" y="2628780"/>
             <a:ext cx="6096000" cy="369332"/>
           </a:xfrm>
           <a:prstGeom prst="rect">
@@ -15989,20 +18243,47 @@
           <a:lstStyle/>
           <a:p>
             <a:r>
-              <a:rPr lang="en-US" dirty="0">
-                <a:solidFill>
-                  <a:srgbClr val="FF0000"/>
-                </a:solidFill>
-              </a:rPr>
-              <a:t>Ini </a:t>
-            </a:r>
+              <a:rPr lang="en-US" dirty="0"/>
+              <a:t>STRATEGY: Start Level 0 → Gradually increase → Target Level 5+</a:t>
+            </a:r>
+          </a:p>
+        </p:txBody>
+      </p:sp>
+      <p:sp>
+        <p:nvSpPr>
+          <p:cNvPr id="11" name="TextBox 10">
+            <a:extLst>
+              <a:ext uri="{FF2B5EF4-FFF2-40B4-BE49-F238E27FC236}">
+                <a16:creationId xmlns:a16="http://schemas.microsoft.com/office/drawing/2014/main" id="{E4EBC4AD-FD7E-2FF8-7F36-24EBA4712358}"/>
+              </a:ext>
+            </a:extLst>
+          </p:cNvPr>
+          <p:cNvSpPr txBox="1"/>
+          <p:nvPr/>
+        </p:nvSpPr>
+        <p:spPr>
+          <a:xfrm>
+            <a:off x="5740400" y="4317760"/>
+            <a:ext cx="6096000" cy="369332"/>
+          </a:xfrm>
+          <a:prstGeom prst="rect">
+            <a:avLst/>
+          </a:prstGeom>
+          <a:noFill/>
+        </p:spPr>
+        <p:txBody>
+          <a:bodyPr wrap="square">
+            <a:spAutoFit/>
+          </a:bodyPr>
+          <a:lstStyle/>
+          <a:p>
             <a:r>
               <a:rPr lang="en-US" dirty="0" err="1">
                 <a:solidFill>
                   <a:srgbClr val="FF0000"/>
                 </a:solidFill>
               </a:rPr>
-              <a:t>bukan</a:t>
+              <a:t>Sekarang</a:t>
             </a:r>
             <a:r>
               <a:rPr lang="en-US" dirty="0">
@@ -16018,39 +18299,7 @@
                   <a:srgbClr val="FF0000"/>
                 </a:solidFill>
               </a:rPr>
-              <a:t>sekedar</a:t>
-            </a:r>
-            <a:r>
-              <a:rPr lang="en-US" dirty="0">
-                <a:solidFill>
-                  <a:srgbClr val="FF0000"/>
-                </a:solidFill>
-              </a:rPr>
-              <a:t> tools, </a:t>
-            </a:r>
-            <a:r>
-              <a:rPr lang="en-US" dirty="0" err="1">
-                <a:solidFill>
-                  <a:srgbClr val="FF0000"/>
-                </a:solidFill>
-              </a:rPr>
-              <a:t>tapi</a:t>
-            </a:r>
-            <a:r>
-              <a:rPr lang="en-US" dirty="0">
-                <a:solidFill>
-                  <a:srgbClr val="FF0000"/>
-                </a:solidFill>
-              </a:rPr>
-              <a:t> investment </a:t>
-            </a:r>
-            <a:r>
-              <a:rPr lang="en-US" dirty="0" err="1">
-                <a:solidFill>
-                  <a:srgbClr val="FF0000"/>
-                </a:solidFill>
-              </a:rPr>
-              <a:t>jangka</a:t>
+              <a:t>mari</a:t>
             </a:r>
             <a:r>
               <a:rPr lang="en-US" dirty="0">
@@ -16066,20 +18315,87 @@
                   <a:srgbClr val="FF0000"/>
                 </a:solidFill>
               </a:rPr>
-              <a:t>panjang</a:t>
-            </a:r>
-            <a:endParaRPr lang="en-US" dirty="0">
-              <a:solidFill>
-                <a:srgbClr val="FF0000"/>
-              </a:solidFill>
-            </a:endParaRPr>
+              <a:t>lihat</a:t>
+            </a:r>
+            <a:r>
+              <a:rPr lang="en-US" dirty="0">
+                <a:solidFill>
+                  <a:srgbClr val="FF0000"/>
+                </a:solidFill>
+              </a:rPr>
+              <a:t> </a:t>
+            </a:r>
+            <a:r>
+              <a:rPr lang="en-US" dirty="0" err="1">
+                <a:solidFill>
+                  <a:srgbClr val="FF0000"/>
+                </a:solidFill>
+              </a:rPr>
+              <a:t>bagaimana</a:t>
+            </a:r>
+            <a:r>
+              <a:rPr lang="en-US" dirty="0">
+                <a:solidFill>
+                  <a:srgbClr val="FF0000"/>
+                </a:solidFill>
+              </a:rPr>
+              <a:t> tools </a:t>
+            </a:r>
+            <a:r>
+              <a:rPr lang="en-US" dirty="0" err="1">
+                <a:solidFill>
+                  <a:srgbClr val="FF0000"/>
+                </a:solidFill>
+              </a:rPr>
+              <a:t>ini</a:t>
+            </a:r>
+            <a:r>
+              <a:rPr lang="en-US" dirty="0">
+                <a:solidFill>
+                  <a:srgbClr val="FF0000"/>
+                </a:solidFill>
+              </a:rPr>
+              <a:t> </a:t>
+            </a:r>
+            <a:r>
+              <a:rPr lang="en-US" dirty="0" err="1">
+                <a:solidFill>
+                  <a:srgbClr val="FF0000"/>
+                </a:solidFill>
+              </a:rPr>
+              <a:t>bekerja</a:t>
+            </a:r>
+            <a:r>
+              <a:rPr lang="en-US" dirty="0">
+                <a:solidFill>
+                  <a:srgbClr val="FF0000"/>
+                </a:solidFill>
+              </a:rPr>
+              <a:t> </a:t>
+            </a:r>
+            <a:r>
+              <a:rPr lang="en-US" dirty="0" err="1">
+                <a:solidFill>
+                  <a:srgbClr val="FF0000"/>
+                </a:solidFill>
+              </a:rPr>
+              <a:t>dalam</a:t>
+            </a:r>
+            <a:r>
+              <a:rPr lang="en-US" dirty="0">
+                <a:solidFill>
+                  <a:srgbClr val="FF0000"/>
+                </a:solidFill>
+              </a:rPr>
+              <a:t> action</a:t>
+            </a:r>
           </a:p>
         </p:txBody>
       </p:sp>
     </p:spTree>
     <p:extLst>
       <p:ext uri="{BB962C8B-B14F-4D97-AF65-F5344CB8AC3E}">
-        <p14:creationId xmlns:p14="http://schemas.microsoft.com/office/powerpoint/2010/main" val="2498021767"/>
+        <p14:creationId xmlns:p14="http://schemas.microsoft.com/office/powerpoint/2010/main" val="4024820025"/>
       </p:ext>
     </p:extLst>
   </p:cSld>
@@ -16417,11 +18733,7 @@
                                           </p:stCondLst>
                                         </p:cTn>
                                         <p:tgtEl>
-                                          <p:spTgt spid="3">
-                                            <p:txEl>
-                                              <p:pRg st="4" end="4"/>
-                                            </p:txEl>
-                                          </p:spTgt>
+                                          <p:spTgt spid="5"/>
                                         </p:tgtEl>
                                         <p:attrNameLst>
                                           <p:attrName>style.visibility</p:attrName>
@@ -16435,11 +18747,7 @@
                                       <p:cBhvr>
                                         <p:cTn id="32" dur="500"/>
                                         <p:tgtEl>
-                                          <p:spTgt spid="3">
-                                            <p:txEl>
-                                              <p:pRg st="4" end="4"/>
-                                            </p:txEl>
-                                          </p:spTgt>
+                                          <p:spTgt spid="5"/>
                                         </p:tgtEl>
                                       </p:cBhvr>
                                     </p:animEffect>
@@ -16478,11 +18786,7 @@
                                           </p:stCondLst>
                                         </p:cTn>
                                         <p:tgtEl>
-                                          <p:spTgt spid="3">
-                                            <p:txEl>
-                                              <p:pRg st="5" end="5"/>
-                                            </p:txEl>
-                                          </p:spTgt>
+                                          <p:spTgt spid="7"/>
                                         </p:tgtEl>
                                         <p:attrNameLst>
                                           <p:attrName>style.visibility</p:attrName>
@@ -16496,11 +18800,7 @@
                                       <p:cBhvr>
                                         <p:cTn id="37" dur="500"/>
                                         <p:tgtEl>
-                                          <p:spTgt spid="3">
-                                            <p:txEl>
-                                              <p:pRg st="5" end="5"/>
-                                            </p:txEl>
-                                          </p:spTgt>
+                                          <p:spTgt spid="7"/>
                                         </p:tgtEl>
                                       </p:cBhvr>
                                     </p:animEffect>
@@ -16539,11 +18839,7 @@
                                           </p:stCondLst>
                                         </p:cTn>
                                         <p:tgtEl>
-                                          <p:spTgt spid="3">
-                                            <p:txEl>
-                                              <p:pRg st="6" end="6"/>
-                                            </p:txEl>
-                                          </p:spTgt>
+                                          <p:spTgt spid="9"/>
                                         </p:tgtEl>
                                         <p:attrNameLst>
                                           <p:attrName>style.visibility</p:attrName>
@@ -16557,11 +18853,7 @@
                                       <p:cBhvr>
                                         <p:cTn id="42" dur="500"/>
                                         <p:tgtEl>
-                                          <p:spTgt spid="3">
-                                            <p:txEl>
-                                              <p:pRg st="6" end="6"/>
-                                            </p:txEl>
-                                          </p:spTgt>
+                                          <p:spTgt spid="9"/>
                                         </p:tgtEl>
                                       </p:cBhvr>
                                     </p:animEffect>
@@ -16587,7 +18879,7 @@
                             </p:stCondLst>
                             <p:childTnLst>
                               <p:par>
-                                <p:cTn id="45" presetID="10" presetClass="entr" presetSubtype="0" fill="hold" grpId="0" nodeType="clickEffect">
+                                <p:cTn id="45" presetID="16" presetClass="entr" presetSubtype="21" fill="hold" grpId="0" nodeType="clickEffect">
                                   <p:stCondLst>
                                     <p:cond delay="0"/>
                                   </p:stCondLst>
@@ -16600,60 +18892,7 @@
                                           </p:stCondLst>
                                         </p:cTn>
                                         <p:tgtEl>
-                                          <p:spTgt spid="5"/>
-                                        </p:tgtEl>
-                                        <p:attrNameLst>
-                                          <p:attrName>style.visibility</p:attrName>
-                                        </p:attrNameLst>
-                                      </p:cBhvr>
-                                      <p:to>
-                                        <p:strVal val="visible"/>
-                                      </p:to>
-                                    </p:set>
-                                    <p:animEffect transition="in" filter="fade">
-                                      <p:cBhvr>
-                                        <p:cTn id="47" dur="500"/>
-                                        <p:tgtEl>
-                                          <p:spTgt spid="5"/>
-                                        </p:tgtEl>
-                                      </p:cBhvr>
-                                    </p:animEffect>
-                                  </p:childTnLst>
-                                </p:cTn>
-                              </p:par>
-                            </p:childTnLst>
-                          </p:cTn>
-                        </p:par>
-                      </p:childTnLst>
-                    </p:cTn>
-                  </p:par>
-                  <p:par>
-                    <p:cTn id="48" fill="hold">
-                      <p:stCondLst>
-                        <p:cond delay="indefinite"/>
-                      </p:stCondLst>
-                      <p:childTnLst>
-                        <p:par>
-                          <p:cTn id="49" fill="hold">
-                            <p:stCondLst>
-                              <p:cond delay="0"/>
-                            </p:stCondLst>
-                            <p:childTnLst>
-                              <p:par>
-                                <p:cTn id="50" presetID="16" presetClass="entr" presetSubtype="21" fill="hold" grpId="0" nodeType="clickEffect">
-                                  <p:stCondLst>
-                                    <p:cond delay="0"/>
-                                  </p:stCondLst>
-                                  <p:childTnLst>
-                                    <p:set>
-                                      <p:cBhvr>
-                                        <p:cTn id="51" dur="1" fill="hold">
-                                          <p:stCondLst>
-                                            <p:cond delay="0"/>
-                                          </p:stCondLst>
-                                        </p:cTn>
-                                        <p:tgtEl>
-                                          <p:spTgt spid="9"/>
+                                          <p:spTgt spid="11"/>
                                         </p:tgtEl>
                                         <p:attrNameLst>
                                           <p:attrName>style.visibility</p:attrName>
@@ -16665,9 +18904,9 @@
                                     </p:set>
                                     <p:animEffect transition="in" filter="barn(inVertical)">
                                       <p:cBhvr>
-                                        <p:cTn id="52" dur="500"/>
-                                        <p:tgtEl>
-                                          <p:spTgt spid="9"/>
+                                        <p:cTn id="47" dur="500"/>
+                                        <p:tgtEl>
+                                          <p:spTgt spid="11"/>
                                         </p:tgtEl>
                                       </p:cBhvr>
                                     </p:animEffect>
@@ -16705,7 +18944,9 @@
       <p:bldP spid="2" grpId="0"/>
       <p:bldP spid="3" grpId="0" build="p"/>
       <p:bldP spid="5" grpId="0"/>
+      <p:bldP spid="7" grpId="0"/>
       <p:bldP spid="9" grpId="0"/>
+      <p:bldP spid="11" grpId="0"/>
     </p:bldLst>
   </p:timing>
 </p:sld>
@@ -17617,15 +19858,6 @@
 </file>
 
 <file path=customXml/item1.xml><?xml version="1.0" encoding="utf-8"?>
-<?mso-contentType ?>
-<FormTemplates xmlns="http://schemas.microsoft.com/sharepoint/v3/contenttype/forms">
-  <Display>DocumentLibraryForm</Display>
-  <Edit>DocumentLibraryForm</Edit>
-  <New>DocumentLibraryForm</New>
-</FormTemplates>
-</file>
-
-<file path=customXml/item2.xml><?xml version="1.0" encoding="utf-8"?>
 <ct:contentTypeSchema xmlns:ct="http://schemas.microsoft.com/office/2006/metadata/contentType" xmlns:ma="http://schemas.microsoft.com/office/2006/metadata/properties/metaAttributes" ct:_="" ma:_="" ma:contentTypeName="Document" ma:contentTypeID="0x010100D08546F1AD3C594799D8571F2892DFE9" ma:contentTypeVersion="18" ma:contentTypeDescription="Create a new document." ma:contentTypeScope="" ma:versionID="c8a878a69dd791973665234d71ff2bad">
   <xsd:schema xmlns:xsd="http://www.w3.org/2001/XMLSchema" xmlns:xs="http://www.w3.org/2001/XMLSchema" xmlns:p="http://schemas.microsoft.com/office/2006/metadata/properties" xmlns:ns2="4e851f84-edfc-415f-9755-6d8013d698fa" xmlns:ns3="4415450d-0ef6-4fef-bfeb-c9d257979e7a" targetNamespace="http://schemas.microsoft.com/office/2006/metadata/properties" ma:root="true" ma:fieldsID="899faba9e8635afee4c7ea5846ee0bde" ns2:_="" ns3:_="">
     <xsd:import namespace="4e851f84-edfc-415f-9755-6d8013d698fa"/>
@@ -17880,15 +20112,16 @@
 </ct:contentTypeSchema>
 </file>
 
-<file path=customXml/itemProps1.xml><?xml version="1.0" encoding="utf-8"?>
-<ds:datastoreItem xmlns:ds="http://schemas.openxmlformats.org/officeDocument/2006/customXml" ds:itemID="{F834B71A-881A-4806-8375-A0CC84D5F9CF}">
-  <ds:schemaRefs>
-    <ds:schemaRef ds:uri="http://schemas.microsoft.com/sharepoint/v3/contenttype/forms"/>
-  </ds:schemaRefs>
-</ds:datastoreItem>
+<file path=customXml/item2.xml><?xml version="1.0" encoding="utf-8"?>
+<?mso-contentType ?>
+<FormTemplates xmlns="http://schemas.microsoft.com/sharepoint/v3/contenttype/forms">
+  <Display>DocumentLibraryForm</Display>
+  <Edit>DocumentLibraryForm</Edit>
+  <New>DocumentLibraryForm</New>
+</FormTemplates>
 </file>
 
-<file path=customXml/itemProps2.xml><?xml version="1.0" encoding="utf-8"?>
+<file path=customXml/itemProps1.xml><?xml version="1.0" encoding="utf-8"?>
 <ds:datastoreItem xmlns:ds="http://schemas.openxmlformats.org/officeDocument/2006/customXml" ds:itemID="{4FABFA44-AA44-4BBD-844A-5865AB6B4E35}">
   <ds:schemaRefs>
     <ds:schemaRef ds:uri="http://schemas.microsoft.com/office/2006/metadata/contentType"/>
@@ -17905,4 +20138,12 @@
     <ds:schemaRef ds:uri="http://schemas.microsoft.com/internal/obd"/>
   </ds:schemaRefs>
 </ds:datastoreItem>
+</file>
+
+<file path=customXml/itemProps2.xml><?xml version="1.0" encoding="utf-8"?>
+<ds:datastoreItem xmlns:ds="http://schemas.openxmlformats.org/officeDocument/2006/customXml" ds:itemID="{F834B71A-881A-4806-8375-A0CC84D5F9CF}">
+  <ds:schemaRefs>
+    <ds:schemaRef ds:uri="http://schemas.microsoft.com/sharepoint/v3/contenttype/forms"/>
+  </ds:schemaRefs>
+</ds:datastoreItem>
 </file>
</xml_diff>